<commit_message>
Final draft of poster (pre adjust)
</commit_message>
<xml_diff>
--- a/Poster/DP Poster.pptx
+++ b/Poster/DP Poster.pptx
@@ -310,16 +310,16 @@
                 <c:formatCode>General</c:formatCode>
                 <c:ptCount val="4"/>
                 <c:pt idx="0">
-                  <c:v>130000</c:v>
+                  <c:v>339884</c:v>
                 </c:pt>
                 <c:pt idx="1">
-                  <c:v>1000</c:v>
+                  <c:v>10011</c:v>
                 </c:pt>
                 <c:pt idx="2">
-                  <c:v>6000</c:v>
+                  <c:v>45693</c:v>
                 </c:pt>
                 <c:pt idx="3">
-                  <c:v>4000</c:v>
+                  <c:v>2007</c:v>
                 </c:pt>
               </c:numCache>
             </c:numRef>
@@ -4422,12 +4422,12 @@
         </p:nvSpPr>
         <p:spPr>
           <a:xfrm>
-            <a:off x="193884" y="161925"/>
-            <a:ext cx="43395388" cy="3543883"/>
+            <a:off x="0" y="-39794"/>
+            <a:ext cx="43891200" cy="3623986"/>
           </a:xfrm>
           <a:prstGeom prst="roundRect">
             <a:avLst>
-              <a:gd name="adj" fmla="val 5269"/>
+              <a:gd name="adj" fmla="val 0"/>
             </a:avLst>
           </a:prstGeom>
           <a:solidFill>
@@ -4611,8 +4611,8 @@
         </p:nvSpPr>
         <p:spPr>
           <a:xfrm>
-            <a:off x="192836" y="3887060"/>
-            <a:ext cx="10819969" cy="13228134"/>
+            <a:off x="192837" y="3857563"/>
+            <a:ext cx="10718163" cy="12963859"/>
           </a:xfrm>
           <a:prstGeom prst="rect">
             <a:avLst/>
@@ -4663,8 +4663,8 @@
         </p:nvSpPr>
         <p:spPr>
           <a:xfrm>
-            <a:off x="281519" y="4036175"/>
-            <a:ext cx="10546457" cy="12947540"/>
+            <a:off x="281519" y="4006678"/>
+            <a:ext cx="10546457" cy="12702475"/>
           </a:xfrm>
           <a:prstGeom prst="rect">
             <a:avLst/>
@@ -4718,8 +4718,8 @@
         </p:nvSpPr>
         <p:spPr>
           <a:xfrm>
-            <a:off x="936890" y="3983142"/>
-            <a:ext cx="10004699" cy="1088172"/>
+            <a:off x="1016000" y="4011433"/>
+            <a:ext cx="10105187" cy="1088172"/>
           </a:xfrm>
           <a:prstGeom prst="snip2DiagRect">
             <a:avLst>
@@ -4766,11 +4766,10 @@
           <a:p>
             <a:pPr algn="ctr"/>
             <a:r>
-              <a:rPr lang="en-US" sz="4800" b="1" dirty="0">
+              <a:rPr lang="en-US" sz="5400" b="1" dirty="0">
                 <a:solidFill>
                   <a:schemeClr val="tx1"/>
                 </a:solidFill>
-                <a:latin typeface="helvetica" panose="020B0604020202020204" pitchFamily="34" charset="0"/>
                 <a:ea typeface="Verdana" panose="020B0604030504040204" pitchFamily="34" charset="0"/>
                 <a:cs typeface="helvetica" panose="020B0604020202020204" pitchFamily="34" charset="0"/>
               </a:rPr>
@@ -4793,7 +4792,7 @@
         </p:nvSpPr>
         <p:spPr>
           <a:xfrm>
-            <a:off x="11423480" y="3837263"/>
+            <a:off x="11438565" y="3836434"/>
             <a:ext cx="10734052" cy="8549292"/>
           </a:xfrm>
           <a:prstGeom prst="rect">
@@ -4845,8 +4844,8 @@
         </p:nvSpPr>
         <p:spPr>
           <a:xfrm>
-            <a:off x="11563475" y="5177544"/>
-            <a:ext cx="10467184" cy="7001975"/>
+            <a:off x="11557626" y="5102657"/>
+            <a:ext cx="10502249" cy="7172555"/>
           </a:xfrm>
           <a:prstGeom prst="rect">
             <a:avLst/>
@@ -4897,8 +4896,8 @@
         </p:nvSpPr>
         <p:spPr>
           <a:xfrm>
-            <a:off x="22379736" y="27377207"/>
-            <a:ext cx="10582377" cy="5437708"/>
+            <a:off x="33160498" y="4009809"/>
+            <a:ext cx="10582377" cy="5494749"/>
           </a:xfrm>
           <a:prstGeom prst="rect">
             <a:avLst/>
@@ -4949,8 +4948,8 @@
         </p:nvSpPr>
         <p:spPr>
           <a:xfrm>
-            <a:off x="22470420" y="27453991"/>
-            <a:ext cx="10366876" cy="5216577"/>
+            <a:off x="33251182" y="4086593"/>
+            <a:ext cx="10366876" cy="5295532"/>
           </a:xfrm>
           <a:prstGeom prst="rect">
             <a:avLst/>
@@ -5001,8 +5000,8 @@
         </p:nvSpPr>
         <p:spPr>
           <a:xfrm>
-            <a:off x="11410131" y="3986216"/>
-            <a:ext cx="10608507" cy="1088172"/>
+            <a:off x="11640223" y="3986217"/>
+            <a:ext cx="10516454" cy="1088172"/>
           </a:xfrm>
           <a:prstGeom prst="snip2DiagRect">
             <a:avLst>
@@ -5011,7 +5010,7 @@
             </a:avLst>
           </a:prstGeom>
           <a:solidFill>
-            <a:schemeClr val="accent4">
+            <a:schemeClr val="accent2">
               <a:lumMod val="40000"/>
               <a:lumOff val="60000"/>
             </a:schemeClr>
@@ -5049,11 +5048,10 @@
           <a:p>
             <a:pPr algn="ctr"/>
             <a:r>
-              <a:rPr lang="en-US" sz="4800" b="1" dirty="0">
+              <a:rPr lang="en-US" sz="5400" b="1" dirty="0">
                 <a:solidFill>
                   <a:schemeClr val="tx1"/>
                 </a:solidFill>
-                <a:latin typeface="helvetica" panose="020B0604020202020204" pitchFamily="34" charset="0"/>
                 <a:ea typeface="Verdana" panose="020B0604030504040204" pitchFamily="34" charset="0"/>
                 <a:cs typeface="helvetica" panose="020B0604020202020204" pitchFamily="34" charset="0"/>
               </a:rPr>
@@ -5076,8 +5074,8 @@
         </p:nvSpPr>
         <p:spPr>
           <a:xfrm>
-            <a:off x="22973925" y="27453991"/>
-            <a:ext cx="9863372" cy="1088172"/>
+            <a:off x="33754686" y="4086593"/>
+            <a:ext cx="9954055" cy="1088172"/>
           </a:xfrm>
           <a:prstGeom prst="snip2DiagRect">
             <a:avLst>
@@ -5086,7 +5084,7 @@
             </a:avLst>
           </a:prstGeom>
           <a:solidFill>
-            <a:srgbClr val="FA7272"/>
+            <a:srgbClr val="FB8D8D"/>
           </a:solidFill>
           <a:ln>
             <a:noFill/>
@@ -5121,11 +5119,10 @@
           <a:p>
             <a:pPr algn="ctr"/>
             <a:r>
-              <a:rPr lang="en-US" sz="4800" b="1" dirty="0">
+              <a:rPr lang="en-US" sz="5400" b="1" dirty="0">
                 <a:solidFill>
                   <a:schemeClr val="tx1"/>
                 </a:solidFill>
-                <a:latin typeface="helvetica" panose="020B0604020202020204" pitchFamily="34" charset="0"/>
                 <a:ea typeface="Verdana" panose="020B0604030504040204" pitchFamily="34" charset="0"/>
                 <a:cs typeface="helvetica" panose="020B0604020202020204" pitchFamily="34" charset="0"/>
               </a:rPr>
@@ -5148,7 +5145,7 @@
         </p:nvSpPr>
         <p:spPr>
           <a:xfrm>
-            <a:off x="111803" y="3827914"/>
+            <a:off x="188003" y="3856473"/>
             <a:ext cx="1543448" cy="1398628"/>
           </a:xfrm>
           <a:prstGeom prst="homePlate">
@@ -5197,7 +5194,6 @@
                 <a:solidFill>
                   <a:schemeClr val="tx1"/>
                 </a:solidFill>
-                <a:latin typeface="helvetica" panose="020B0604020202020204" pitchFamily="34" charset="0"/>
                 <a:ea typeface="Gadugi" panose="020B0502040204020203" pitchFamily="34" charset="0"/>
                 <a:cs typeface="helvetica" panose="020B0604020202020204" pitchFamily="34" charset="0"/>
               </a:rPr>
@@ -5220,14 +5216,14 @@
         </p:nvSpPr>
         <p:spPr>
           <a:xfrm>
-            <a:off x="11194353" y="3806429"/>
+            <a:off x="11441209" y="3834628"/>
             <a:ext cx="1543448" cy="1398628"/>
           </a:xfrm>
           <a:prstGeom prst="homePlate">
             <a:avLst/>
           </a:prstGeom>
           <a:solidFill>
-            <a:schemeClr val="accent4">
+            <a:schemeClr val="accent2">
               <a:lumMod val="60000"/>
               <a:lumOff val="40000"/>
             </a:schemeClr>
@@ -5269,7 +5265,6 @@
                 <a:solidFill>
                   <a:schemeClr val="tx1"/>
                 </a:solidFill>
-                <a:latin typeface="helvetica" panose="020B0604020202020204" pitchFamily="34" charset="0"/>
                 <a:ea typeface="Gadugi" panose="020B0502040204020203" pitchFamily="34" charset="0"/>
                 <a:cs typeface="helvetica" panose="020B0604020202020204" pitchFamily="34" charset="0"/>
               </a:rPr>
@@ -5292,7 +5287,7 @@
         </p:nvSpPr>
         <p:spPr>
           <a:xfrm>
-            <a:off x="22338302" y="27298763"/>
+            <a:off x="33119064" y="3931365"/>
             <a:ext cx="1294127" cy="1398628"/>
           </a:xfrm>
           <a:prstGeom prst="homePlate">
@@ -5338,7 +5333,6 @@
                 <a:solidFill>
                   <a:schemeClr val="tx1"/>
                 </a:solidFill>
-                <a:latin typeface="helvetica" panose="020B0604020202020204" pitchFamily="34" charset="0"/>
                 <a:ea typeface="Gadugi" panose="020B0502040204020203" pitchFamily="34" charset="0"/>
                 <a:cs typeface="helvetica" panose="020B0604020202020204" pitchFamily="34" charset="0"/>
               </a:rPr>
@@ -5362,7 +5356,7 @@
         <p:spPr>
           <a:xfrm>
             <a:off x="22328144" y="3871567"/>
-            <a:ext cx="10621466" cy="23271967"/>
+            <a:ext cx="10621466" cy="28943348"/>
           </a:xfrm>
           <a:prstGeom prst="rect">
             <a:avLst/>
@@ -5413,8 +5407,8 @@
         </p:nvSpPr>
         <p:spPr>
           <a:xfrm>
-            <a:off x="22418827" y="4086593"/>
-            <a:ext cx="10405966" cy="22911111"/>
+            <a:off x="22439711" y="4086593"/>
+            <a:ext cx="10380940" cy="28630788"/>
           </a:xfrm>
           <a:prstGeom prst="rect">
             <a:avLst/>
@@ -5466,7 +5460,7 @@
         <p:spPr>
           <a:xfrm>
             <a:off x="22922332" y="3936637"/>
-            <a:ext cx="9902462" cy="1088172"/>
+            <a:ext cx="9993144" cy="1088172"/>
           </a:xfrm>
           <a:prstGeom prst="snip2DiagRect">
             <a:avLst>
@@ -5510,11 +5504,10 @@
           <a:p>
             <a:pPr algn="ctr"/>
             <a:r>
-              <a:rPr lang="en-US" sz="4800" b="1" dirty="0">
+              <a:rPr lang="en-US" sz="5400" b="1" dirty="0">
                 <a:solidFill>
                   <a:schemeClr val="tx1"/>
                 </a:solidFill>
-                <a:latin typeface="helvetica" panose="020B0604020202020204" pitchFamily="34" charset="0"/>
                 <a:ea typeface="Verdana" panose="020B0604030504040204" pitchFamily="34" charset="0"/>
                 <a:cs typeface="helvetica" panose="020B0604020202020204" pitchFamily="34" charset="0"/>
               </a:rPr>
@@ -5583,7 +5576,6 @@
                 <a:solidFill>
                   <a:schemeClr val="tx1"/>
                 </a:solidFill>
-                <a:latin typeface="helvetica" panose="020B0604020202020204" pitchFamily="34" charset="0"/>
                 <a:ea typeface="Gadugi" panose="020B0502040204020203" pitchFamily="34" charset="0"/>
                 <a:cs typeface="helvetica" panose="020B0604020202020204" pitchFamily="34" charset="0"/>
               </a:rPr>
@@ -5606,8 +5598,8 @@
         </p:nvSpPr>
         <p:spPr>
           <a:xfrm>
-            <a:off x="359561" y="4980243"/>
-            <a:ext cx="10352902" cy="4893647"/>
+            <a:off x="359561" y="4950746"/>
+            <a:ext cx="10352902" cy="4524315"/>
           </a:xfrm>
           <a:prstGeom prst="rect">
             <a:avLst/>
@@ -5671,7 +5663,7 @@
             </a:r>
             <a:r>
               <a:rPr lang="en-US" sz="2400" dirty="0"/>
-              <a:t>: happen every day that there are matches, and never last more than a day</a:t>
+              <a:t> means the competitions happen every day that there are matches</a:t>
             </a:r>
           </a:p>
           <a:p>
@@ -5681,11 +5673,11 @@
             </a:pPr>
             <a:r>
               <a:rPr lang="en-US" sz="2400" b="1" dirty="0"/>
-              <a:t>Fantasy</a:t>
+              <a:t>Fantasy </a:t>
             </a:r>
             <a:r>
               <a:rPr lang="en-US" sz="2400" dirty="0"/>
-              <a:t>: uses an artificial points system (e.g. 1.2 points for a rebound)</a:t>
+              <a:t>means they use a contrived points system</a:t>
             </a:r>
           </a:p>
           <a:p>
@@ -5695,11 +5687,11 @@
             </a:pPr>
             <a:r>
               <a:rPr lang="en-US" sz="2400" b="1" dirty="0"/>
-              <a:t>NBA</a:t>
+              <a:t>NBA </a:t>
             </a:r>
             <a:r>
               <a:rPr lang="en-US" sz="2400" dirty="0"/>
-              <a:t>: based on actual NBA games</a:t>
+              <a:t>means that they are based on actual NBA games</a:t>
             </a:r>
           </a:p>
           <a:p>
@@ -5709,11 +5701,11 @@
             </a:pPr>
             <a:r>
               <a:rPr lang="en-US" sz="2400" b="1" dirty="0"/>
-              <a:t>Competitions</a:t>
+              <a:t>Competition </a:t>
             </a:r>
             <a:r>
               <a:rPr lang="en-US" sz="2400" dirty="0"/>
-              <a:t>: Actively competing against other real people (or machines?)</a:t>
+              <a:t>means we are competing against other people (machines?)</a:t>
             </a:r>
             <a:br>
               <a:rPr lang="en-US" sz="2400" dirty="0"/>
@@ -5725,6 +5717,11 @@
               <a:rPr lang="en-US" sz="2400" dirty="0"/>
               <a:t>In these competitions, you have to select 9 basketball players of specific positions (center, forward, etc.) who are playing tonight, in real games, across any teams. Each player has a salary, and you have a budget. The goal of the competition is to maximize the amount of fantasy points your lineup gets.</a:t>
             </a:r>
+            <a:r>
+              <a:rPr lang="en-US" sz="2400" baseline="30000" dirty="0"/>
+              <a:t>[1]</a:t>
+            </a:r>
+            <a:endParaRPr lang="en-US" sz="2400" dirty="0"/>
           </a:p>
         </p:txBody>
       </p:sp>
@@ -5742,7 +5739,7 @@
         </p:nvGrpSpPr>
         <p:grpSpPr>
           <a:xfrm>
-            <a:off x="461547" y="9779551"/>
+            <a:off x="461547" y="9750054"/>
             <a:ext cx="9976556" cy="5293385"/>
             <a:chOff x="117731" y="10011171"/>
             <a:chExt cx="11436866" cy="6068200"/>
@@ -6003,7 +6000,7 @@
         </p:nvSpPr>
         <p:spPr>
           <a:xfrm>
-            <a:off x="418153" y="15517877"/>
+            <a:off x="418153" y="15488380"/>
             <a:ext cx="10218110" cy="1101615"/>
           </a:xfrm>
           <a:prstGeom prst="roundRect">
@@ -6012,13 +6009,13 @@
         </p:spPr>
         <p:style>
           <a:lnRef idx="1">
-            <a:schemeClr val="accent5"/>
+            <a:schemeClr val="accent3"/>
           </a:lnRef>
           <a:fillRef idx="2">
-            <a:schemeClr val="accent5"/>
+            <a:schemeClr val="accent3"/>
           </a:fillRef>
           <a:effectRef idx="1">
-            <a:schemeClr val="accent5"/>
+            <a:schemeClr val="accent3"/>
           </a:effectRef>
           <a:fontRef idx="minor">
             <a:schemeClr val="dk1"/>
@@ -6051,7 +6048,7 @@
         </p:nvSpPr>
         <p:spPr>
           <a:xfrm>
-            <a:off x="11781522" y="5382847"/>
+            <a:off x="11796607" y="5382018"/>
             <a:ext cx="10064307" cy="1569660"/>
           </a:xfrm>
           <a:prstGeom prst="rect">
@@ -6067,7 +6064,7 @@
           <a:p>
             <a:r>
               <a:rPr lang="en-US" sz="2400" dirty="0"/>
-              <a:t>With the model for our system chosen, we could begin collecting our data. The inputs to our system are NBA statistics. We built a scraper to grab data from the NBA website. We scraped partial data from games back to 1970, and complete back to 2004:</a:t>
+              <a:t>With the model for our system chosen, we could begin collecting our data. The inputs to our system are NBA statistics. We built a scraper to obtain data from the NBA website (chosen for reliability). We scraped partial data from games back to 1970, and complete back to 2004:</a:t>
             </a:r>
           </a:p>
         </p:txBody>
@@ -6085,13 +6082,13 @@
           <p:nvPr>
             <p:extLst>
               <p:ext uri="{D42A27DB-BD31-4B8C-83A1-F6EECF244321}">
-                <p14:modId xmlns:p14="http://schemas.microsoft.com/office/powerpoint/2010/main" val="747138512"/>
+                <p14:modId xmlns:p14="http://schemas.microsoft.com/office/powerpoint/2010/main" val="1480426070"/>
               </p:ext>
             </p:extLst>
           </p:nvPr>
         </p:nvGraphicFramePr>
         <p:xfrm>
-          <a:off x="13060489" y="6930339"/>
+          <a:off x="13075574" y="6988504"/>
           <a:ext cx="7758045" cy="2858242"/>
         </p:xfrm>
         <a:graphic>
@@ -6114,12 +6111,89 @@
         </p:nvGrpSpPr>
         <p:grpSpPr>
           <a:xfrm>
-            <a:off x="11873018" y="9937143"/>
-            <a:ext cx="8018319" cy="2131337"/>
+            <a:off x="11888103" y="10054302"/>
+            <a:ext cx="9497279" cy="2126944"/>
             <a:chOff x="595579" y="23651717"/>
-            <a:chExt cx="8018319" cy="2131337"/>
+            <a:chExt cx="9497279" cy="2126944"/>
           </a:xfrm>
         </p:grpSpPr>
+        <p:sp>
+          <p:nvSpPr>
+            <p:cNvPr id="36" name="TextBox 35">
+              <a:extLst>
+                <a:ext uri="{FF2B5EF4-FFF2-40B4-BE49-F238E27FC236}">
+                  <a16:creationId xmlns:a16="http://schemas.microsoft.com/office/drawing/2014/main" id="{7BD44FCF-BF61-4F62-81D1-12FD0EA4DC20}"/>
+                </a:ext>
+              </a:extLst>
+            </p:cNvPr>
+            <p:cNvSpPr txBox="1"/>
+            <p:nvPr/>
+          </p:nvSpPr>
+          <p:spPr>
+            <a:xfrm>
+              <a:off x="595579" y="23729128"/>
+              <a:ext cx="8271430" cy="1938992"/>
+            </a:xfrm>
+            <a:prstGeom prst="rect">
+              <a:avLst/>
+            </a:prstGeom>
+            <a:noFill/>
+          </p:spPr>
+          <p:txBody>
+            <a:bodyPr wrap="square" rtlCol="0">
+              <a:spAutoFit/>
+            </a:bodyPr>
+            <a:lstStyle/>
+            <a:p>
+              <a:r>
+                <a:rPr lang="en-US" sz="2400" dirty="0"/>
+                <a:t>We used Python to power our scraper</a:t>
+              </a:r>
+            </a:p>
+            <a:p>
+              <a:endParaRPr lang="en-US" sz="2400" dirty="0"/>
+            </a:p>
+            <a:p>
+              <a:r>
+                <a:rPr lang="en-US" sz="2400" dirty="0"/>
+                <a:t>We used B</a:t>
+              </a:r>
+              <a:r>
+                <a:rPr lang="en-CA" sz="2400" dirty="0" err="1"/>
+                <a:t>eautifulSoup</a:t>
+              </a:r>
+              <a:r>
+                <a:rPr lang="en-CA" sz="2400" baseline="30000" dirty="0"/>
+                <a:t>[4]</a:t>
+              </a:r>
+              <a:r>
+                <a:rPr lang="en-CA" sz="2400" dirty="0"/>
+                <a:t> to access and retrieve the NBA website</a:t>
+              </a:r>
+            </a:p>
+            <a:p>
+              <a:endParaRPr lang="en-US" sz="2400" dirty="0"/>
+            </a:p>
+            <a:p>
+              <a:r>
+                <a:rPr lang="en-US" sz="2400" dirty="0"/>
+                <a:t>We used S</a:t>
+              </a:r>
+              <a:r>
+                <a:rPr lang="en-CA" sz="2400" dirty="0" err="1"/>
+                <a:t>elenium</a:t>
+              </a:r>
+              <a:r>
+                <a:rPr lang="en-CA" sz="2400" baseline="30000" dirty="0"/>
+                <a:t>[5]</a:t>
+              </a:r>
+              <a:r>
+                <a:rPr lang="en-CA" sz="2400" dirty="0"/>
+                <a:t> to control the NBA website</a:t>
+              </a:r>
+            </a:p>
+          </p:txBody>
+        </p:sp>
         <p:pic>
           <p:nvPicPr>
             <p:cNvPr id="61" name="Shape 221">
@@ -6142,7 +6216,7 @@
           </p:blipFill>
           <p:spPr>
             <a:xfrm>
-              <a:off x="5889208" y="24986487"/>
+              <a:off x="6641970" y="24982094"/>
               <a:ext cx="880188" cy="796567"/>
             </a:xfrm>
             <a:prstGeom prst="rect">
@@ -6176,7 +6250,7 @@
           </p:blipFill>
           <p:spPr>
             <a:xfrm>
-              <a:off x="7293173" y="24154356"/>
+              <a:off x="8772133" y="24115442"/>
               <a:ext cx="1320725" cy="941019"/>
             </a:xfrm>
             <a:prstGeom prst="rect">
@@ -6222,75 +6296,6 @@
             </a:ln>
           </p:spPr>
         </p:pic>
-        <p:sp>
-          <p:nvSpPr>
-            <p:cNvPr id="36" name="TextBox 35">
-              <a:extLst>
-                <a:ext uri="{FF2B5EF4-FFF2-40B4-BE49-F238E27FC236}">
-                  <a16:creationId xmlns:a16="http://schemas.microsoft.com/office/drawing/2014/main" id="{7BD44FCF-BF61-4F62-81D1-12FD0EA4DC20}"/>
-                </a:ext>
-              </a:extLst>
-            </p:cNvPr>
-            <p:cNvSpPr txBox="1"/>
-            <p:nvPr/>
-          </p:nvSpPr>
-          <p:spPr>
-            <a:xfrm>
-              <a:off x="595579" y="23729128"/>
-              <a:ext cx="6684246" cy="1938992"/>
-            </a:xfrm>
-            <a:prstGeom prst="rect">
-              <a:avLst/>
-            </a:prstGeom>
-            <a:noFill/>
-          </p:spPr>
-          <p:txBody>
-            <a:bodyPr wrap="square" rtlCol="0">
-              <a:spAutoFit/>
-            </a:bodyPr>
-            <a:lstStyle/>
-            <a:p>
-              <a:r>
-                <a:rPr lang="en-US" sz="2400" dirty="0"/>
-                <a:t>We used Python to power our scraper,</a:t>
-              </a:r>
-            </a:p>
-            <a:p>
-              <a:endParaRPr lang="en-US" sz="2400" dirty="0"/>
-            </a:p>
-            <a:p>
-              <a:r>
-                <a:rPr lang="en-US" sz="2400" dirty="0"/>
-                <a:t>the B</a:t>
-              </a:r>
-              <a:r>
-                <a:rPr lang="en-CA" sz="2400" dirty="0" err="1"/>
-                <a:t>eautifulSoup</a:t>
-              </a:r>
-              <a:r>
-                <a:rPr lang="en-CA" sz="2400" dirty="0"/>
-                <a:t> library to access the NBA website,</a:t>
-              </a:r>
-            </a:p>
-            <a:p>
-              <a:endParaRPr lang="en-US" sz="2400" dirty="0"/>
-            </a:p>
-            <a:p>
-              <a:r>
-                <a:rPr lang="en-US" sz="2400" dirty="0"/>
-                <a:t>and S</a:t>
-              </a:r>
-              <a:r>
-                <a:rPr lang="en-CA" sz="2400" dirty="0" err="1"/>
-                <a:t>elenium</a:t>
-              </a:r>
-              <a:r>
-                <a:rPr lang="en-CA" sz="2400" dirty="0"/>
-                <a:t> to control the NBA website</a:t>
-              </a:r>
-            </a:p>
-          </p:txBody>
-        </p:sp>
       </p:grpSp>
       <p:sp>
         <p:nvSpPr>
@@ -6306,8 +6311,8 @@
         </p:nvSpPr>
         <p:spPr>
           <a:xfrm>
-            <a:off x="194025" y="17276696"/>
-            <a:ext cx="10812838" cy="15554197"/>
+            <a:off x="190837" y="17276696"/>
+            <a:ext cx="10723651" cy="15554197"/>
           </a:xfrm>
           <a:prstGeom prst="rect">
             <a:avLst/>
@@ -6358,8 +6363,8 @@
         </p:nvSpPr>
         <p:spPr>
           <a:xfrm>
-            <a:off x="312821" y="17710187"/>
-            <a:ext cx="10515155" cy="14910468"/>
+            <a:off x="281520" y="17710187"/>
+            <a:ext cx="10538675" cy="15007194"/>
           </a:xfrm>
           <a:prstGeom prst="rect">
             <a:avLst/>
@@ -6410,8 +6415,8 @@
         </p:nvSpPr>
         <p:spPr>
           <a:xfrm>
-            <a:off x="1024480" y="17425650"/>
-            <a:ext cx="9988325" cy="1088172"/>
+            <a:off x="281520" y="17425650"/>
+            <a:ext cx="10725343" cy="1088172"/>
           </a:xfrm>
           <a:prstGeom prst="snip2DiagRect">
             <a:avLst>
@@ -6458,15 +6463,14 @@
           <a:p>
             <a:pPr algn="ctr"/>
             <a:r>
-              <a:rPr lang="en-US" sz="4800" b="1" dirty="0">
+              <a:rPr lang="en-US" sz="5400" b="1" dirty="0">
                 <a:solidFill>
                   <a:schemeClr val="tx1"/>
                 </a:solidFill>
-                <a:latin typeface="helvetica" panose="020B0604020202020204" pitchFamily="34" charset="0"/>
                 <a:ea typeface="Verdana" panose="020B0604030504040204" pitchFamily="34" charset="0"/>
                 <a:cs typeface="helvetica" panose="020B0604020202020204" pitchFamily="34" charset="0"/>
               </a:rPr>
-              <a:t>Concept: Neural Networks</a:t>
+              <a:t>Neural Networks</a:t>
             </a:r>
           </a:p>
         </p:txBody>
@@ -6534,7 +6538,6 @@
                 <a:solidFill>
                   <a:schemeClr val="tx1"/>
                 </a:solidFill>
-                <a:latin typeface="helvetica" panose="020B0604020202020204" pitchFamily="34" charset="0"/>
                 <a:ea typeface="Gadugi" panose="020B0502040204020203" pitchFamily="34" charset="0"/>
                 <a:cs typeface="helvetica" panose="020B0604020202020204" pitchFamily="34" charset="0"/>
               </a:rPr>
@@ -6558,7 +6561,7 @@
         <p:spPr>
           <a:xfrm>
             <a:off x="500786" y="18760057"/>
-            <a:ext cx="10032791" cy="4893647"/>
+            <a:ext cx="10032791" cy="4678204"/>
           </a:xfrm>
           <a:prstGeom prst="rect">
             <a:avLst/>
@@ -6607,9 +6610,11 @@
             </a:r>
           </a:p>
           <a:p>
-            <a:endParaRPr lang="en-US" sz="2400" dirty="0"/>
-          </a:p>
-          <a:p>
+            <a:pPr>
+              <a:spcBef>
+                <a:spcPts val="1200"/>
+              </a:spcBef>
+            </a:pPr>
             <a:r>
               <a:rPr lang="en-US" sz="2400" b="1" dirty="0"/>
               <a:t>But what is a neural network?</a:t>
@@ -6618,76 +6623,245 @@
           <a:p>
             <a:r>
               <a:rPr lang="en-US" sz="2400" dirty="0"/>
-              <a:t>Below is a graphic of a simple NN, with one hidden layer, two outputs, and three inputs. This network, for example, could be attempting to find the relationship between the age, weight, and height of a person and their country of birth and gender.</a:t>
-            </a:r>
-          </a:p>
-        </p:txBody>
-      </p:sp>
-      <p:sp>
-        <p:nvSpPr>
-          <p:cNvPr id="33" name="TextBox 32">
-            <a:extLst>
-              <a:ext uri="{FF2B5EF4-FFF2-40B4-BE49-F238E27FC236}">
-                <a16:creationId xmlns:a16="http://schemas.microsoft.com/office/drawing/2014/main" id="{E82B1971-562C-4F83-86B6-09BECC42CC78}"/>
-              </a:ext>
-            </a:extLst>
-          </p:cNvPr>
-          <p:cNvSpPr txBox="1"/>
-          <p:nvPr/>
-        </p:nvSpPr>
-        <p:spPr>
-          <a:xfrm>
-            <a:off x="418185" y="27206474"/>
-            <a:ext cx="10140728" cy="4893647"/>
-          </a:xfrm>
-          <a:prstGeom prst="rect">
-            <a:avLst/>
-          </a:prstGeom>
-          <a:noFill/>
-        </p:spPr>
-        <p:txBody>
-          <a:bodyPr wrap="square" rtlCol="0">
-            <a:spAutoFit/>
-          </a:bodyPr>
-          <a:lstStyle/>
-          <a:p>
+              <a:t>Below is a graphic of a simple NN, with one hidden layer, two outputs, and three inputs.</a:t>
+            </a:r>
+            <a:r>
+              <a:rPr lang="en-US" sz="2400" baseline="30000" dirty="0"/>
+              <a:t>[2]</a:t>
+            </a:r>
             <a:r>
               <a:rPr lang="en-US" sz="2400" dirty="0"/>
-              <a:t>There are two main "stages" of a Neural network.</a:t>
-            </a:r>
-          </a:p>
-          <a:p>
-            <a:r>
-              <a:rPr lang="en-US" sz="2400" b="1" dirty="0"/>
-              <a:t>1. Feed forward, or how outputs are computed from inputs</a:t>
-            </a:r>
-          </a:p>
-          <a:p>
-            <a:pPr lvl="1"/>
-            <a:r>
-              <a:rPr lang="en-US" sz="2400" dirty="0"/>
-              <a:t>When feeding an input through the network, every edge (line) is a weight to multiply the value by, and every node (circle) is an "activation function" on the incoming value.</a:t>
-            </a:r>
-          </a:p>
-          <a:p>
-            <a:pPr lvl="1"/>
-            <a:endParaRPr lang="en-US" sz="2400" dirty="0"/>
-          </a:p>
-          <a:p>
-            <a:r>
-              <a:rPr lang="en-US" sz="2400" b="1" dirty="0"/>
-              <a:t>2. Back propagation, or how the system learns</a:t>
-            </a:r>
-          </a:p>
-          <a:p>
-            <a:pPr lvl="1"/>
-            <a:r>
-              <a:rPr lang="en-US" sz="2400" dirty="0"/>
-              <a:t>Once an input is fed through the network, the error or cost of the input can be calculated. &lt;&lt;Equation&gt;&gt; The goal then is to change the weight values on the edges to reduce this error! We do this by "backpropagating" the error through the network. Then, the weights are changed, and the network will perform better on the input. The amount of impact the error has on the weights is called the learning rate.</a:t>
-            </a:r>
-          </a:p>
-        </p:txBody>
-      </p:sp>
+              <a:t> This network, for example, could be attempting to find the relationship between the age, weight, and height of a person and their country of birth and gender.</a:t>
+            </a:r>
+          </a:p>
+        </p:txBody>
+      </p:sp>
+      <mc:AlternateContent xmlns:mc="http://schemas.openxmlformats.org/markup-compatibility/2006">
+        <mc:Choice xmlns:a14="http://schemas.microsoft.com/office/drawing/2010/main" Requires="a14">
+          <p:sp>
+            <p:nvSpPr>
+              <p:cNvPr id="33" name="TextBox 32">
+                <a:extLst>
+                  <a:ext uri="{FF2B5EF4-FFF2-40B4-BE49-F238E27FC236}">
+                    <a16:creationId xmlns:a16="http://schemas.microsoft.com/office/drawing/2014/main" id="{E82B1971-562C-4F83-86B6-09BECC42CC78}"/>
+                  </a:ext>
+                </a:extLst>
+              </p:cNvPr>
+              <p:cNvSpPr txBox="1"/>
+              <p:nvPr/>
+            </p:nvSpPr>
+            <p:spPr>
+              <a:xfrm>
+                <a:off x="418153" y="27032257"/>
+                <a:ext cx="10140728" cy="5000343"/>
+              </a:xfrm>
+              <a:prstGeom prst="rect">
+                <a:avLst/>
+              </a:prstGeom>
+              <a:noFill/>
+            </p:spPr>
+            <p:txBody>
+              <a:bodyPr wrap="square" rtlCol="0">
+                <a:spAutoFit/>
+              </a:bodyPr>
+              <a:lstStyle/>
+              <a:p>
+                <a:r>
+                  <a:rPr lang="en-US" sz="2400" dirty="0"/>
+                  <a:t>There are two main "stages" of a Neural network.</a:t>
+                </a:r>
+              </a:p>
+              <a:p>
+                <a:r>
+                  <a:rPr lang="en-US" sz="2400" b="1" dirty="0"/>
+                  <a:t>1. Feed forward, or how outputs are computed from inputs</a:t>
+                </a:r>
+              </a:p>
+              <a:p>
+                <a:pPr lvl="1"/>
+                <a:r>
+                  <a:rPr lang="en-US" sz="2400" dirty="0"/>
+                  <a:t>When feeding an input through the network, every edge (line) is a weight to multiply the value by, and every node (circle) is an "activation function" on the incoming value.</a:t>
+                </a:r>
+              </a:p>
+              <a:p>
+                <a:pPr>
+                  <a:spcBef>
+                    <a:spcPts val="1200"/>
+                  </a:spcBef>
+                </a:pPr>
+                <a:r>
+                  <a:rPr lang="en-US" sz="2400" b="1" dirty="0"/>
+                  <a:t>2. Back propagation, or how the system learns</a:t>
+                </a:r>
+              </a:p>
+              <a:p>
+                <a:pPr lvl="1"/>
+                <a:r>
+                  <a:rPr lang="en-US" sz="2400" dirty="0"/>
+                  <a:t>Once an input is fed through the network, the error can be calculated.</a:t>
+                </a:r>
+                <a:r>
+                  <a:rPr lang="en-US" sz="2400" baseline="30000" dirty="0"/>
+                  <a:t>[3]</a:t>
+                </a:r>
+                <a:endParaRPr lang="en-US" sz="2400" dirty="0"/>
+              </a:p>
+              <a:p>
+                <a:pPr lvl="1"/>
+                <a14:m>
+                  <m:oMathPara xmlns:m="http://schemas.openxmlformats.org/officeDocument/2006/math">
+                    <m:oMathParaPr>
+                      <m:jc m:val="centerGroup"/>
+                    </m:oMathParaPr>
+                    <m:oMath xmlns:m="http://schemas.openxmlformats.org/officeDocument/2006/math">
+                      <m:r>
+                        <a:rPr lang="en-US" sz="2400" b="0" i="1" smtClean="0">
+                          <a:latin typeface="Cambria Math" panose="02040503050406030204" pitchFamily="18" charset="0"/>
+                        </a:rPr>
+                        <m:t>𝐸</m:t>
+                      </m:r>
+                      <m:r>
+                        <a:rPr lang="en-US" sz="2400" b="0" i="1" smtClean="0">
+                          <a:latin typeface="Cambria Math" panose="02040503050406030204" pitchFamily="18" charset="0"/>
+                        </a:rPr>
+                        <m:t>=</m:t>
+                      </m:r>
+                      <m:f>
+                        <m:fPr>
+                          <m:ctrlPr>
+                            <a:rPr lang="en-US" sz="2400" b="0" i="1" smtClean="0">
+                              <a:latin typeface="Cambria Math" panose="02040503050406030204" pitchFamily="18" charset="0"/>
+                            </a:rPr>
+                          </m:ctrlPr>
+                        </m:fPr>
+                        <m:num>
+                          <m:r>
+                            <a:rPr lang="en-US" sz="2400" b="0" i="1" smtClean="0">
+                              <a:latin typeface="Cambria Math" panose="02040503050406030204" pitchFamily="18" charset="0"/>
+                            </a:rPr>
+                            <m:t>1</m:t>
+                          </m:r>
+                        </m:num>
+                        <m:den>
+                          <m:r>
+                            <a:rPr lang="en-US" sz="2400" b="0" i="1" smtClean="0">
+                              <a:latin typeface="Cambria Math" panose="02040503050406030204" pitchFamily="18" charset="0"/>
+                            </a:rPr>
+                            <m:t>2</m:t>
+                          </m:r>
+                        </m:den>
+                      </m:f>
+                      <m:d>
+                        <m:dPr>
+                          <m:begChr m:val="‖"/>
+                          <m:endChr m:val="‖"/>
+                          <m:ctrlPr>
+                            <a:rPr lang="en-US" sz="2400" b="0" i="1" smtClean="0">
+                              <a:latin typeface="Cambria Math" panose="02040503050406030204" pitchFamily="18" charset="0"/>
+                            </a:rPr>
+                          </m:ctrlPr>
+                        </m:dPr>
+                        <m:e>
+                          <m:r>
+                            <a:rPr lang="en-US" sz="2400" b="0" i="1" smtClean="0">
+                              <a:latin typeface="Cambria Math" panose="02040503050406030204" pitchFamily="18" charset="0"/>
+                            </a:rPr>
+                            <m:t>𝑦</m:t>
+                          </m:r>
+                          <m:r>
+                            <a:rPr lang="en-US" sz="2400" b="0" i="1" smtClean="0">
+                              <a:latin typeface="Cambria Math" panose="02040503050406030204" pitchFamily="18" charset="0"/>
+                            </a:rPr>
+                            <m:t>−</m:t>
+                          </m:r>
+                          <m:sSup>
+                            <m:sSupPr>
+                              <m:ctrlPr>
+                                <a:rPr lang="en-US" sz="2400" b="0" i="1" smtClean="0">
+                                  <a:latin typeface="Cambria Math" panose="02040503050406030204" pitchFamily="18" charset="0"/>
+                                </a:rPr>
+                              </m:ctrlPr>
+                            </m:sSupPr>
+                            <m:e>
+                              <m:r>
+                                <a:rPr lang="en-US" sz="2400" b="0" i="1" smtClean="0">
+                                  <a:latin typeface="Cambria Math" panose="02040503050406030204" pitchFamily="18" charset="0"/>
+                                </a:rPr>
+                                <m:t>𝑦</m:t>
+                              </m:r>
+                            </m:e>
+                            <m:sup>
+                              <m:r>
+                                <a:rPr lang="en-US" sz="2400" b="0" i="1" smtClean="0">
+                                  <a:latin typeface="Cambria Math" panose="02040503050406030204" pitchFamily="18" charset="0"/>
+                                </a:rPr>
+                                <m:t>′</m:t>
+                              </m:r>
+                            </m:sup>
+                          </m:sSup>
+                        </m:e>
+                      </m:d>
+                    </m:oMath>
+                  </m:oMathPara>
+                </a14:m>
+                <a:endParaRPr lang="en-US" sz="2400" dirty="0"/>
+              </a:p>
+              <a:p>
+                <a:pPr lvl="1"/>
+                <a:r>
+                  <a:rPr lang="en-US" sz="2400" dirty="0"/>
+                  <a:t>Where y is the actual output and y’ is our feed-forward prediction. The goal is to adjust the weights of the edges to reduce this error. This is done by "backpropagating" the error through the network. Then, the weights are adjusted, and the network’s performance will increase.</a:t>
+                </a:r>
+              </a:p>
+            </p:txBody>
+          </p:sp>
+        </mc:Choice>
+        <mc:Fallback>
+          <p:sp>
+            <p:nvSpPr>
+              <p:cNvPr id="33" name="TextBox 32">
+                <a:extLst>
+                  <a:ext uri="{FF2B5EF4-FFF2-40B4-BE49-F238E27FC236}">
+                    <a16:creationId xmlns:a16="http://schemas.microsoft.com/office/drawing/2014/main" id="{E82B1971-562C-4F83-86B6-09BECC42CC78}"/>
+                  </a:ext>
+                </a:extLst>
+              </p:cNvPr>
+              <p:cNvSpPr txBox="1">
+                <a:spLocks noRot="1" noChangeAspect="1" noMove="1" noResize="1" noEditPoints="1" noAdjustHandles="1" noChangeArrowheads="1" noChangeShapeType="1" noTextEdit="1"/>
+              </p:cNvSpPr>
+              <p:nvPr/>
+            </p:nvSpPr>
+            <p:spPr>
+              <a:xfrm>
+                <a:off x="418153" y="27032257"/>
+                <a:ext cx="10140728" cy="5000343"/>
+              </a:xfrm>
+              <a:prstGeom prst="rect">
+                <a:avLst/>
+              </a:prstGeom>
+              <a:blipFill>
+                <a:blip r:embed="rId9"/>
+                <a:stretch>
+                  <a:fillRect l="-962" t="-974" r="-481" b="-1705"/>
+                </a:stretch>
+              </a:blipFill>
+            </p:spPr>
+            <p:txBody>
+              <a:bodyPr/>
+              <a:lstStyle/>
+              <a:p>
+                <a:r>
+                  <a:rPr lang="en-CA">
+                    <a:noFill/>
+                  </a:rPr>
+                  <a:t> </a:t>
+                </a:r>
+              </a:p>
+            </p:txBody>
+          </p:sp>
+        </mc:Fallback>
+      </mc:AlternateContent>
       <p:grpSp>
         <p:nvGrpSpPr>
           <p:cNvPr id="38" name="Group 37">
@@ -6702,7 +6876,7 @@
         </p:nvGrpSpPr>
         <p:grpSpPr>
           <a:xfrm>
-            <a:off x="3066517" y="23645269"/>
+            <a:off x="3083543" y="23512472"/>
             <a:ext cx="4867275" cy="3333750"/>
             <a:chOff x="3594023" y="23258503"/>
             <a:chExt cx="4867275" cy="3333750"/>
@@ -6723,7 +6897,7 @@
             <p:nvPr/>
           </p:nvPicPr>
           <p:blipFill>
-            <a:blip r:embed="rId9">
+            <a:blip r:embed="rId10">
               <a:extLst>
                 <a:ext uri="{28A0092B-C50C-407E-A947-70E740481C1C}">
                   <a14:useLocalDpi xmlns:a14="http://schemas.microsoft.com/office/drawing/2010/main" val="0"/>
@@ -6991,8 +7165,8 @@
         </p:nvSpPr>
         <p:spPr>
           <a:xfrm>
-            <a:off x="11626750" y="14066129"/>
-            <a:ext cx="10409823" cy="18554526"/>
+            <a:off x="11579130" y="14066129"/>
+            <a:ext cx="10457443" cy="18651252"/>
           </a:xfrm>
           <a:prstGeom prst="rect">
             <a:avLst/>
@@ -7044,7 +7218,7 @@
         <p:spPr>
           <a:xfrm>
             <a:off x="11473407" y="12874801"/>
-            <a:ext cx="10545231" cy="1088172"/>
+            <a:ext cx="10669908" cy="1088172"/>
           </a:xfrm>
           <a:prstGeom prst="snip2DiagRect">
             <a:avLst>
@@ -7053,7 +7227,7 @@
             </a:avLst>
           </a:prstGeom>
           <a:solidFill>
-            <a:schemeClr val="accent4">
+            <a:schemeClr val="accent6">
               <a:lumMod val="40000"/>
               <a:lumOff val="60000"/>
             </a:schemeClr>
@@ -7091,11 +7265,10 @@
           <a:p>
             <a:pPr algn="ctr"/>
             <a:r>
-              <a:rPr lang="en-US" sz="4800" b="1" dirty="0">
+              <a:rPr lang="en-US" sz="5400" b="1" dirty="0">
                 <a:solidFill>
                   <a:schemeClr val="tx1"/>
                 </a:solidFill>
-                <a:latin typeface="helvetica" panose="020B0604020202020204" pitchFamily="34" charset="0"/>
                 <a:ea typeface="Verdana" panose="020B0604030504040204" pitchFamily="34" charset="0"/>
                 <a:cs typeface="helvetica" panose="020B0604020202020204" pitchFamily="34" charset="0"/>
               </a:rPr>
@@ -7125,7 +7298,7 @@
             <a:avLst/>
           </a:prstGeom>
           <a:solidFill>
-            <a:schemeClr val="accent4">
+            <a:schemeClr val="accent6">
               <a:lumMod val="60000"/>
               <a:lumOff val="40000"/>
             </a:schemeClr>
@@ -7167,7 +7340,6 @@
                 <a:solidFill>
                   <a:schemeClr val="tx1"/>
                 </a:solidFill>
-                <a:latin typeface="helvetica" panose="020B0604020202020204" pitchFamily="34" charset="0"/>
                 <a:ea typeface="Gadugi" panose="020B0502040204020203" pitchFamily="34" charset="0"/>
                 <a:cs typeface="helvetica" panose="020B0604020202020204" pitchFamily="34" charset="0"/>
               </a:rPr>
@@ -7190,8 +7362,8 @@
         </p:nvSpPr>
         <p:spPr>
           <a:xfrm>
-            <a:off x="33202382" y="3997563"/>
-            <a:ext cx="10582377" cy="26000361"/>
+            <a:off x="33162511" y="9840802"/>
+            <a:ext cx="10582377" cy="20659248"/>
           </a:xfrm>
           <a:prstGeom prst="rect">
             <a:avLst/>
@@ -7242,8 +7414,8 @@
         </p:nvSpPr>
         <p:spPr>
           <a:xfrm>
-            <a:off x="33293066" y="4074349"/>
-            <a:ext cx="10366876" cy="25768346"/>
+            <a:off x="33253195" y="9917586"/>
+            <a:ext cx="10366876" cy="20448113"/>
           </a:xfrm>
           <a:prstGeom prst="rect">
             <a:avLst/>
@@ -7294,8 +7466,8 @@
         </p:nvSpPr>
         <p:spPr>
           <a:xfrm>
-            <a:off x="33796571" y="4074348"/>
-            <a:ext cx="9863372" cy="1088172"/>
+            <a:off x="33756699" y="9917586"/>
+            <a:ext cx="9952041" cy="1088172"/>
           </a:xfrm>
           <a:prstGeom prst="snip2DiagRect">
             <a:avLst>
@@ -7304,7 +7476,7 @@
             </a:avLst>
           </a:prstGeom>
           <a:solidFill>
-            <a:srgbClr val="FA7272"/>
+            <a:srgbClr val="9DDEED"/>
           </a:solidFill>
           <a:ln>
             <a:noFill/>
@@ -7339,11 +7511,10 @@
           <a:p>
             <a:pPr algn="ctr"/>
             <a:r>
-              <a:rPr lang="en-US" sz="6600" b="1" dirty="0">
+              <a:rPr lang="en-US" sz="5400" b="1" dirty="0">
                 <a:solidFill>
                   <a:schemeClr val="tx1"/>
                 </a:solidFill>
-                <a:latin typeface="helvetica" panose="020B0604020202020204" pitchFamily="34" charset="0"/>
                 <a:ea typeface="Verdana" panose="020B0604030504040204" pitchFamily="34" charset="0"/>
                 <a:cs typeface="helvetica" panose="020B0604020202020204" pitchFamily="34" charset="0"/>
               </a:rPr>
@@ -7366,14 +7537,14 @@
         </p:nvSpPr>
         <p:spPr>
           <a:xfrm>
-            <a:off x="33160948" y="3919120"/>
+            <a:off x="33121077" y="9762358"/>
             <a:ext cx="1294127" cy="1398628"/>
           </a:xfrm>
           <a:prstGeom prst="homePlate">
             <a:avLst/>
           </a:prstGeom>
           <a:solidFill>
-            <a:srgbClr val="E95959"/>
+            <a:srgbClr val="5BBCE7"/>
           </a:solidFill>
           <a:ln>
             <a:noFill/>
@@ -7412,7 +7583,6 @@
                 <a:solidFill>
                   <a:schemeClr val="tx1"/>
                 </a:solidFill>
-                <a:latin typeface="helvetica" panose="020B0604020202020204" pitchFamily="34" charset="0"/>
                 <a:ea typeface="Gadugi" panose="020B0502040204020203" pitchFamily="34" charset="0"/>
                 <a:cs typeface="helvetica" panose="020B0604020202020204" pitchFamily="34" charset="0"/>
               </a:rPr>
@@ -7421,36 +7591,6 @@
           </a:p>
         </p:txBody>
       </p:sp>
-      <p:pic>
-        <p:nvPicPr>
-          <p:cNvPr id="16" name="Picture 23" descr="A close up of a logo&#10;&#10;Description generated with high confidence">
-            <a:extLst>
-              <a:ext uri="{FF2B5EF4-FFF2-40B4-BE49-F238E27FC236}">
-                <a16:creationId xmlns:a16="http://schemas.microsoft.com/office/drawing/2014/main" id="{D59AE7B8-C5F4-4224-A824-50D451CDC699}"/>
-              </a:ext>
-            </a:extLst>
-          </p:cNvPr>
-          <p:cNvPicPr>
-            <a:picLocks noChangeAspect="1"/>
-          </p:cNvPicPr>
-          <p:nvPr/>
-        </p:nvPicPr>
-        <p:blipFill>
-          <a:blip r:embed="rId10"/>
-          <a:stretch>
-            <a:fillRect/>
-          </a:stretch>
-        </p:blipFill>
-        <p:spPr>
-          <a:xfrm rot="5400000">
-            <a:off x="26391429" y="13336394"/>
-            <a:ext cx="24170147" cy="8842453"/>
-          </a:xfrm>
-          <a:prstGeom prst="rect">
-            <a:avLst/>
-          </a:prstGeom>
-        </p:spPr>
-      </p:pic>
       <p:sp>
         <p:nvSpPr>
           <p:cNvPr id="39" name="TextBox 38">
@@ -7552,7 +7692,7 @@
           <a:p>
             <a:r>
               <a:rPr lang="en-US" sz="2400" dirty="0"/>
-              <a:t>This model had limitations:</a:t>
+              <a:t>This preliminary model had limitations:</a:t>
             </a:r>
           </a:p>
           <a:p>
@@ -7572,7 +7712,7 @@
             </a:pPr>
             <a:r>
               <a:rPr lang="en-US" sz="2400" dirty="0"/>
-              <a:t>Active players by nature have limited data (can’t use 1995 data)</a:t>
+              <a:t>Active players by nature mean we can’t use data from old games</a:t>
             </a:r>
           </a:p>
           <a:p>
@@ -7598,7 +7738,7 @@
           <a:p>
             <a:r>
               <a:rPr lang="en-US" sz="2400" dirty="0"/>
-              <a:t>Instead, we spent time on architecture, and came up with a much better solution:</a:t>
+              <a:t>Instead, we spent time on architecture, and came up with a much better solution, composed of 3 Systems:</a:t>
             </a:r>
           </a:p>
         </p:txBody>
@@ -9066,7 +9206,7 @@
             <p:spPr>
               <a:xfrm>
                 <a:off x="22476518" y="5270196"/>
-                <a:ext cx="10348275" cy="18912934"/>
+                <a:ext cx="10348275" cy="3901517"/>
               </a:xfrm>
               <a:prstGeom prst="rect">
                 <a:avLst/>
@@ -9085,6 +9225,7 @@
                 </a:r>
               </a:p>
               <a:p>
+                <a:pPr/>
                 <a14:m>
                   <m:oMathPara xmlns:m="http://schemas.openxmlformats.org/officeDocument/2006/math">
                     <m:oMathParaPr>
@@ -9268,191 +9409,13 @@
                 </a:pPr>
                 <a:r>
                   <a:rPr lang="en-US" sz="2400" dirty="0"/>
-                  <a:t>By looking at current competitions, we determined that this heuristic implies profitability at around 80% and greater.</a:t>
-                </a:r>
-              </a:p>
-              <a:p>
-                <a:r>
-                  <a:rPr lang="en-US" sz="2400" dirty="0"/>
-                  <a:t>&lt;&lt; show example&gt;&gt;</a:t>
-                </a:r>
-              </a:p>
-              <a:p>
-                <a:endParaRPr lang="en-US" sz="2400" dirty="0"/>
-              </a:p>
-              <a:p>
-                <a:r>
-                  <a:rPr lang="en-US" sz="2400" dirty="0"/>
-                  <a:t>After </a:t>
+                  <a:t>By looking at current competitions, we determined that this heuristic implies profitability at around 80% and greater. In other words, if we can score 80% of the maximum possible score, we can win. The figure below shows this relationship, where the last winning score is roughly 79</a:t>
                 </a:r>
                 <a:r>
-                  <a:rPr lang="en-US" sz="2400" dirty="0" err="1"/>
-                  <a:t>definining</a:t>
+                  <a:rPr lang="en-CA" sz="2400" dirty="0"/>
+                  <a:t>% of the maximum.</a:t>
                 </a:r>
-                <a:r>
-                  <a:rPr lang="en-US" sz="2400" dirty="0"/>
-                  <a:t> our success metric, we decided it was time to perform cross-validation. Cross-validation is a method of selecting the best hyperparameters of a machine learning system. It is a way to choose the number of hidden nodes, hidden layers, learning rate, and any other aspects of the system that will maximize the accuracy of the system. This is a computationally heavy process, and so we rented a GPU from </a:t>
-                </a:r>
-                <a:r>
-                  <a:rPr lang="en-US" sz="2400" dirty="0" err="1"/>
-                  <a:t>PaperSpace</a:t>
-                </a:r>
-                <a:r>
-                  <a:rPr lang="en-US" sz="2400" dirty="0"/>
-                  <a:t>.</a:t>
-                </a:r>
-              </a:p>
-              <a:p>
                 <a:endParaRPr lang="en-US" sz="2400" dirty="0"/>
-              </a:p>
-              <a:p>
-                <a:r>
-                  <a:rPr lang="en-US" sz="2400" dirty="0"/>
-                  <a:t>Once cross-validation was complete, we started joining competitions. We ran into some issues:</a:t>
-                </a:r>
-              </a:p>
-              <a:p>
-                <a:r>
-                  <a:rPr lang="en-US" sz="2400" dirty="0"/>
-                  <a:t>	- Non-updated database</a:t>
-                </a:r>
-              </a:p>
-              <a:p>
-                <a:r>
-                  <a:rPr lang="en-US" sz="2400" dirty="0"/>
-                  <a:t>	- Players who weren't likely to play that night</a:t>
-                </a:r>
-              </a:p>
-              <a:p>
-                <a:r>
-                  <a:rPr lang="en-US" sz="2400" dirty="0"/>
-                  <a:t>	- The system throwing out games without certain positions</a:t>
-                </a:r>
-              </a:p>
-              <a:p>
-                <a:r>
-                  <a:rPr lang="en-US" sz="2400" dirty="0"/>
-                  <a:t>	- Using the wrong data for a player</a:t>
-                </a:r>
-              </a:p>
-              <a:p>
-                <a:endParaRPr lang="en-US" sz="2400" dirty="0"/>
-              </a:p>
-              <a:p>
-                <a:r>
-                  <a:rPr lang="en-US" sz="2400" dirty="0"/>
-                  <a:t>We solved these issues and kept going. To our surprise, the system was successful. Below are screenshots of each of the competitions we played in where all of our players played.</a:t>
-                </a:r>
-              </a:p>
-              <a:p>
-                <a:endParaRPr lang="en-US" sz="2400" dirty="0"/>
-              </a:p>
-              <a:p>
-                <a:r>
-                  <a:rPr lang="en-US" sz="2400" dirty="0"/>
-                  <a:t>&lt;&lt;screenshots&gt;&gt;</a:t>
-                </a:r>
-              </a:p>
-              <a:p>
-                <a:r>
-                  <a:rPr lang="en-US" sz="2400" dirty="0"/>
-                  <a:t>One can see that, even in the competitions we lose, we do not perform that poorly. </a:t>
-                </a:r>
-              </a:p>
-              <a:p>
-                <a:endParaRPr lang="en-US" sz="2400" dirty="0"/>
-              </a:p>
-              <a:p>
-                <a:r>
-                  <a:rPr lang="en-US" sz="2400" dirty="0"/>
-                  <a:t>There are also some really cool takeaways:</a:t>
-                </a:r>
-              </a:p>
-              <a:p>
-                <a:r>
-                  <a:rPr lang="en-US" sz="2400" dirty="0"/>
-                  <a:t>	- Sometimes predictions are really neat</a:t>
-                </a:r>
-              </a:p>
-              <a:p>
-                <a:r>
-                  <a:rPr lang="en-US" sz="2400" dirty="0"/>
-                  <a:t>		- &lt;&lt;</a:t>
-                </a:r>
-                <a:r>
-                  <a:rPr lang="en-US" sz="2400" dirty="0" err="1"/>
-                  <a:t>covington</a:t>
-                </a:r>
-                <a:r>
-                  <a:rPr lang="en-US" sz="2400" dirty="0"/>
-                  <a:t> two days in a row&gt;&gt;</a:t>
-                </a:r>
-              </a:p>
-              <a:p>
-                <a:r>
-                  <a:rPr lang="en-US" sz="2400" dirty="0"/>
-                  <a:t>	- Sometimes we guess people who other people don't guess (our NN sees something!)</a:t>
-                </a:r>
-              </a:p>
-              <a:p>
-                <a:r>
-                  <a:rPr lang="en-US" sz="2400" dirty="0"/>
-                  <a:t>		- &lt;&lt;high scoring barely picked&gt;&gt;</a:t>
-                </a:r>
-              </a:p>
-              <a:p>
-                <a:endParaRPr lang="en-US" sz="2400" dirty="0"/>
-              </a:p>
-              <a:p>
-                <a:r>
-                  <a:rPr lang="en-US" sz="2400" dirty="0"/>
-                  <a:t>But who are we up against? Pros!</a:t>
-                </a:r>
-              </a:p>
-              <a:p>
-                <a:r>
-                  <a:rPr lang="en-US" sz="2400" dirty="0"/>
-                  <a:t>&lt;&lt;screenshot&gt;&gt;</a:t>
-                </a:r>
-              </a:p>
-              <a:p>
-                <a:r>
-                  <a:rPr lang="en-US" sz="2400" dirty="0"/>
-                  <a:t>A blue star means they have been in over 1000 competitions and have won money</a:t>
-                </a:r>
-              </a:p>
-              <a:p>
-                <a:r>
-                  <a:rPr lang="en-US" sz="2400" dirty="0"/>
-                  <a:t>A white star means they have been in at least 500</a:t>
-                </a:r>
-              </a:p>
-              <a:p>
-                <a:endParaRPr lang="en-US" sz="2400" dirty="0"/>
-              </a:p>
-              <a:p>
-                <a:r>
-                  <a:rPr lang="en-US" sz="2400" dirty="0"/>
-                  <a:t>By empirically looking, we found that ~85% of people are experienced in these competitions! There are beginner competitions, but that is not scalable!</a:t>
-                </a:r>
-              </a:p>
-              <a:p>
-                <a:endParaRPr lang="en-US" sz="2400" dirty="0"/>
-              </a:p>
-              <a:p>
-                <a:r>
-                  <a:rPr lang="en-US" sz="2400" dirty="0"/>
-                  <a:t>Our neural network was able to break even </a:t>
-                </a:r>
-                <a:r>
-                  <a:rPr lang="en-US" sz="2400" dirty="0" err="1"/>
-                  <a:t>even</a:t>
-                </a:r>
-                <a:r>
-                  <a:rPr lang="en-US" sz="2400" dirty="0"/>
-                  <a:t> at a level dominated by competitive players. </a:t>
-                </a:r>
-                <a:endParaRPr lang="en-CA" sz="2400" dirty="0"/>
               </a:p>
             </p:txBody>
           </p:sp>
@@ -9475,7 +9438,7 @@
             <p:spPr>
               <a:xfrm>
                 <a:off x="22476518" y="5270196"/>
-                <a:ext cx="10348275" cy="18912934"/>
+                <a:ext cx="10348275" cy="3901517"/>
               </a:xfrm>
               <a:prstGeom prst="rect">
                 <a:avLst/>
@@ -9483,7 +9446,7 @@
               <a:blipFill>
                 <a:blip r:embed="rId14"/>
                 <a:stretch>
-                  <a:fillRect l="-883" t="-258" r="-1413"/>
+                  <a:fillRect l="-883" t="-1250" r="-942" b="-2656"/>
                 </a:stretch>
               </a:blipFill>
             </p:spPr>
@@ -9516,7 +9479,7 @@
         </p:nvSpPr>
         <p:spPr>
           <a:xfrm>
-            <a:off x="22634891" y="28807972"/>
+            <a:off x="33415653" y="5440574"/>
             <a:ext cx="9862558" cy="3862596"/>
           </a:xfrm>
           <a:prstGeom prst="rect">
@@ -9537,7 +9500,7 @@
             </a:pPr>
             <a:r>
               <a:rPr lang="en-US" sz="2400" dirty="0"/>
-              <a:t>We did not think our network was going to be nearly as successful, but it is still far from perfect, and not completely profitable. We plan to continue to pursue and improve this project. Some ways to improve include:</a:t>
+              <a:t>We did not think our network was going to be nearly as successful as it was, but it is still far from perfect, and not reliably profitable. We plan to continue to pursue and improve this project. Some ways to improve include:</a:t>
             </a:r>
           </a:p>
           <a:p>
@@ -9626,8 +9589,8 @@
         </p:nvSpPr>
         <p:spPr>
           <a:xfrm>
-            <a:off x="33293064" y="31420326"/>
-            <a:ext cx="10366876" cy="1200329"/>
+            <a:off x="33251182" y="30655278"/>
+            <a:ext cx="10366876" cy="2062103"/>
           </a:xfrm>
           <a:prstGeom prst="rect">
             <a:avLst/>
@@ -9641,26 +9604,61 @@
           <a:lstStyle/>
           <a:p>
             <a:r>
-              <a:rPr lang="en-US" dirty="0"/>
+              <a:rPr lang="en-US" sz="1600" dirty="0"/>
               <a:t>Referenced within:</a:t>
             </a:r>
           </a:p>
           <a:p>
             <a:r>
-              <a:rPr lang="en-US" dirty="0"/>
-              <a:t>[1]</a:t>
-            </a:r>
-          </a:p>
-          <a:p>
-            <a:r>
-              <a:rPr lang="en-US" dirty="0"/>
-              <a:t>[2]</a:t>
-            </a:r>
-          </a:p>
-          <a:p>
-            <a:r>
-              <a:rPr lang="en-US" dirty="0"/>
-              <a:t>[3]</a:t>
+              <a:rPr lang="en-US" sz="1600" dirty="0"/>
+              <a:t>[1] https://www.fanduel.com/contests</a:t>
+            </a:r>
+          </a:p>
+          <a:p>
+            <a:r>
+              <a:rPr lang="en-US" sz="1600" dirty="0"/>
+              <a:t>[2] </a:t>
+            </a:r>
+            <a:r>
+              <a:rPr lang="en-US" sz="1600" dirty="0" err="1"/>
+              <a:t>Karpathy</a:t>
+            </a:r>
+            <a:r>
+              <a:rPr lang="en-US" sz="1600" dirty="0"/>
+              <a:t>, "Convolutional Neural Networks for Visual Recognition", Stanford. [Online]. Available: http://cs231n.github.io/neural-networks-1/</a:t>
+            </a:r>
+          </a:p>
+          <a:p>
+            <a:r>
+              <a:rPr lang="en-US" sz="1600" dirty="0"/>
+              <a:t>[3] Abu-Mostafa, </a:t>
+            </a:r>
+            <a:r>
+              <a:rPr lang="en-US" sz="1600" dirty="0" err="1"/>
+              <a:t>Yaser</a:t>
+            </a:r>
+            <a:r>
+              <a:rPr lang="en-US" sz="1600" dirty="0"/>
+              <a:t>. "Learning From Data", Caltech, 2012. [Online]. Available: https://work.caltech.edu/telecourse.</a:t>
+            </a:r>
+          </a:p>
+          <a:p>
+            <a:r>
+              <a:rPr lang="en-US" sz="1600" dirty="0"/>
+              <a:t>[4] https://www.crummy.com/software/BeautifulSoup/</a:t>
+            </a:r>
+          </a:p>
+          <a:p>
+            <a:r>
+              <a:rPr lang="en-US" sz="1600" dirty="0"/>
+              <a:t>[5] https://www.seleniumhq.org/</a:t>
+            </a:r>
+            <a:br>
+              <a:rPr lang="en-US" sz="1600" dirty="0"/>
+            </a:br>
+            <a:r>
+              <a:rPr lang="en-US" sz="1600" dirty="0"/>
+              <a:t>[6] https://www.paperspace.com/</a:t>
             </a:r>
           </a:p>
         </p:txBody>
@@ -9734,6 +9732,488 @@
               <a:t>Psaromiligkos</a:t>
             </a:r>
             <a:endParaRPr lang="en-CA" sz="4000" dirty="0"/>
+          </a:p>
+        </p:txBody>
+      </p:sp>
+      <p:pic>
+        <p:nvPicPr>
+          <p:cNvPr id="12" name="Picture 11">
+            <a:extLst>
+              <a:ext uri="{FF2B5EF4-FFF2-40B4-BE49-F238E27FC236}">
+                <a16:creationId xmlns:a16="http://schemas.microsoft.com/office/drawing/2014/main" id="{AE1981BF-720B-43A5-95FB-B86E46EB6FE7}"/>
+              </a:ext>
+            </a:extLst>
+          </p:cNvPr>
+          <p:cNvPicPr>
+            <a:picLocks noChangeAspect="1"/>
+          </p:cNvPicPr>
+          <p:nvPr/>
+        </p:nvPicPr>
+        <p:blipFill>
+          <a:blip r:embed="rId15">
+            <a:extLst>
+              <a:ext uri="{28A0092B-C50C-407E-A947-70E740481C1C}">
+                <a14:useLocalDpi xmlns:a14="http://schemas.microsoft.com/office/drawing/2010/main" val="0"/>
+              </a:ext>
+            </a:extLst>
+          </a:blip>
+          <a:stretch>
+            <a:fillRect/>
+          </a:stretch>
+        </p:blipFill>
+        <p:spPr>
+          <a:xfrm>
+            <a:off x="24257589" y="9225744"/>
+            <a:ext cx="6383507" cy="1174437"/>
+          </a:xfrm>
+          <a:prstGeom prst="rect">
+            <a:avLst/>
+          </a:prstGeom>
+        </p:spPr>
+      </p:pic>
+      <p:sp>
+        <p:nvSpPr>
+          <p:cNvPr id="17" name="TextBox 16">
+            <a:extLst>
+              <a:ext uri="{FF2B5EF4-FFF2-40B4-BE49-F238E27FC236}">
+                <a16:creationId xmlns:a16="http://schemas.microsoft.com/office/drawing/2014/main" id="{F225BCD7-F608-499B-9429-80240FC62DB0}"/>
+              </a:ext>
+            </a:extLst>
+          </p:cNvPr>
+          <p:cNvSpPr txBox="1"/>
+          <p:nvPr/>
+        </p:nvSpPr>
+        <p:spPr>
+          <a:xfrm>
+            <a:off x="22550935" y="10410992"/>
+            <a:ext cx="9990505" cy="5786199"/>
+          </a:xfrm>
+          <a:prstGeom prst="rect">
+            <a:avLst/>
+          </a:prstGeom>
+          <a:noFill/>
+        </p:spPr>
+        <p:txBody>
+          <a:bodyPr wrap="square" rtlCol="0">
+            <a:spAutoFit/>
+          </a:bodyPr>
+          <a:lstStyle/>
+          <a:p>
+            <a:r>
+              <a:rPr lang="en-US" sz="2400" dirty="0"/>
+              <a:t>In order to improve performance, we performed cross-validation – a method of selecting the best hyperparameters of our NN. These hyperparameters include the number of hidden nodes, hidden layers, and the learning rate. This is a computationally heavy process, and so we rented a GPU from </a:t>
+            </a:r>
+            <a:r>
+              <a:rPr lang="en-US" sz="2400" dirty="0" err="1"/>
+              <a:t>Paperspace</a:t>
+            </a:r>
+            <a:r>
+              <a:rPr lang="en-US" sz="2400" dirty="0"/>
+              <a:t>.</a:t>
+            </a:r>
+            <a:r>
+              <a:rPr lang="en-US" sz="2400" baseline="30000" dirty="0"/>
+              <a:t>[6]</a:t>
+            </a:r>
+            <a:endParaRPr lang="en-US" sz="2400" dirty="0"/>
+          </a:p>
+          <a:p>
+            <a:endParaRPr lang="en-US" sz="2400" dirty="0"/>
+          </a:p>
+          <a:p>
+            <a:r>
+              <a:rPr lang="en-US" sz="2400" dirty="0"/>
+              <a:t>With cross-validation, we were able to hit a success metric of 82% - just above the minimum profitability line. Thus, we started joining competitions, and immediately ran into some initial issues:</a:t>
+            </a:r>
+          </a:p>
+          <a:p>
+            <a:pPr marL="800100" lvl="1" indent="-342900">
+              <a:buFont typeface="Arial" panose="020B0604020202020204" pitchFamily="34" charset="0"/>
+              <a:buChar char="•"/>
+            </a:pPr>
+            <a:r>
+              <a:rPr lang="en-US" sz="2400" dirty="0"/>
+              <a:t>Non-updated database</a:t>
+            </a:r>
+          </a:p>
+          <a:p>
+            <a:pPr marL="800100" lvl="1" indent="-342900">
+              <a:buFont typeface="Arial" panose="020B0604020202020204" pitchFamily="34" charset="0"/>
+              <a:buChar char="•"/>
+            </a:pPr>
+            <a:r>
+              <a:rPr lang="en-US" sz="2400" dirty="0"/>
+              <a:t>Players who didn’t end up playing that night</a:t>
+            </a:r>
+          </a:p>
+          <a:p>
+            <a:pPr marL="800100" lvl="1" indent="-342900">
+              <a:buFont typeface="Arial" panose="020B0604020202020204" pitchFamily="34" charset="0"/>
+              <a:buChar char="•"/>
+            </a:pPr>
+            <a:r>
+              <a:rPr lang="en-US" sz="2400" dirty="0"/>
+              <a:t>Accidentally ignoring players in some games</a:t>
+            </a:r>
+          </a:p>
+          <a:p>
+            <a:pPr marL="800100" lvl="1" indent="-342900">
+              <a:buFont typeface="Arial" panose="020B0604020202020204" pitchFamily="34" charset="0"/>
+              <a:buChar char="•"/>
+            </a:pPr>
+            <a:r>
+              <a:rPr lang="en-US" sz="2400" dirty="0"/>
+              <a:t>Using the wrong data for a player</a:t>
+            </a:r>
+          </a:p>
+          <a:p>
+            <a:pPr>
+              <a:spcBef>
+                <a:spcPts val="1200"/>
+              </a:spcBef>
+            </a:pPr>
+            <a:r>
+              <a:rPr lang="en-US" sz="2400" dirty="0"/>
+              <a:t>We solved these issues and continued testing. To our surprise, the system was somewhat successful. Below are screenshots of the competition summaries for all of the competitions we played in where all of our players played.</a:t>
+            </a:r>
+          </a:p>
+        </p:txBody>
+      </p:sp>
+      <p:pic>
+        <p:nvPicPr>
+          <p:cNvPr id="19" name="Picture 18">
+            <a:extLst>
+              <a:ext uri="{FF2B5EF4-FFF2-40B4-BE49-F238E27FC236}">
+                <a16:creationId xmlns:a16="http://schemas.microsoft.com/office/drawing/2014/main" id="{87CDC245-AA7B-4A89-A635-4036D80AD9CA}"/>
+              </a:ext>
+            </a:extLst>
+          </p:cNvPr>
+          <p:cNvPicPr>
+            <a:picLocks noChangeAspect="1"/>
+          </p:cNvPicPr>
+          <p:nvPr/>
+        </p:nvPicPr>
+        <p:blipFill rotWithShape="1">
+          <a:blip r:embed="rId16">
+            <a:extLst>
+              <a:ext uri="{28A0092B-C50C-407E-A947-70E740481C1C}">
+                <a14:useLocalDpi xmlns:a14="http://schemas.microsoft.com/office/drawing/2010/main" val="0"/>
+              </a:ext>
+            </a:extLst>
+          </a:blip>
+          <a:srcRect l="9432" r="7057"/>
+          <a:stretch/>
+        </p:blipFill>
+        <p:spPr>
+          <a:xfrm>
+            <a:off x="23146800" y="16317294"/>
+            <a:ext cx="8798773" cy="2600688"/>
+          </a:xfrm>
+          <a:prstGeom prst="rect">
+            <a:avLst/>
+          </a:prstGeom>
+        </p:spPr>
+      </p:pic>
+      <p:sp>
+        <p:nvSpPr>
+          <p:cNvPr id="20" name="TextBox 19">
+            <a:extLst>
+              <a:ext uri="{FF2B5EF4-FFF2-40B4-BE49-F238E27FC236}">
+                <a16:creationId xmlns:a16="http://schemas.microsoft.com/office/drawing/2014/main" id="{E8EFC17A-9394-4FD4-923E-B96A30D37C9B}"/>
+              </a:ext>
+            </a:extLst>
+          </p:cNvPr>
+          <p:cNvSpPr txBox="1"/>
+          <p:nvPr/>
+        </p:nvSpPr>
+        <p:spPr>
+          <a:xfrm>
+            <a:off x="22550594" y="19016019"/>
+            <a:ext cx="10101106" cy="1200329"/>
+          </a:xfrm>
+          <a:prstGeom prst="rect">
+            <a:avLst/>
+          </a:prstGeom>
+          <a:noFill/>
+        </p:spPr>
+        <p:txBody>
+          <a:bodyPr wrap="square" rtlCol="0">
+            <a:spAutoFit/>
+          </a:bodyPr>
+          <a:lstStyle/>
+          <a:p>
+            <a:r>
+              <a:rPr lang="en-US" sz="2400" b="1" dirty="0"/>
+              <a:t>Sometimes our predictions are neat: </a:t>
+            </a:r>
+            <a:r>
+              <a:rPr lang="en-US" sz="2400" dirty="0"/>
+              <a:t>We make good picks that others miss! In our best lineup, our players were picked on average 7.5% by others. The nearest competitor in score averaged 27%. Three of these neat picks:</a:t>
+            </a:r>
+          </a:p>
+        </p:txBody>
+      </p:sp>
+      <p:sp>
+        <p:nvSpPr>
+          <p:cNvPr id="23" name="TextBox 22">
+            <a:extLst>
+              <a:ext uri="{FF2B5EF4-FFF2-40B4-BE49-F238E27FC236}">
+                <a16:creationId xmlns:a16="http://schemas.microsoft.com/office/drawing/2014/main" id="{5BFE957C-7C09-4AD7-8814-7FD6F7483B37}"/>
+              </a:ext>
+            </a:extLst>
+          </p:cNvPr>
+          <p:cNvSpPr txBox="1"/>
+          <p:nvPr/>
+        </p:nvSpPr>
+        <p:spPr>
+          <a:xfrm>
+            <a:off x="22550594" y="22893293"/>
+            <a:ext cx="10219341" cy="830997"/>
+          </a:xfrm>
+          <a:prstGeom prst="rect">
+            <a:avLst/>
+          </a:prstGeom>
+          <a:noFill/>
+        </p:spPr>
+        <p:txBody>
+          <a:bodyPr wrap="square" rtlCol="0">
+            <a:spAutoFit/>
+          </a:bodyPr>
+          <a:lstStyle/>
+          <a:p>
+            <a:r>
+              <a:rPr lang="en-US" sz="2400" dirty="0"/>
+              <a:t>As well, one can see that, even in the competitions we lose, we do not perform that poorly (always top 50%). But who are we up against? </a:t>
+            </a:r>
+            <a:r>
+              <a:rPr lang="en-US" sz="2400" b="1" dirty="0"/>
+              <a:t>Pros!</a:t>
+            </a:r>
+          </a:p>
+        </p:txBody>
+      </p:sp>
+      <p:pic>
+        <p:nvPicPr>
+          <p:cNvPr id="26" name="Picture 25">
+            <a:extLst>
+              <a:ext uri="{FF2B5EF4-FFF2-40B4-BE49-F238E27FC236}">
+                <a16:creationId xmlns:a16="http://schemas.microsoft.com/office/drawing/2014/main" id="{C5C7CF87-A08E-439E-8425-B5DF29C5A90D}"/>
+              </a:ext>
+            </a:extLst>
+          </p:cNvPr>
+          <p:cNvPicPr>
+            <a:picLocks noChangeAspect="1"/>
+          </p:cNvPicPr>
+          <p:nvPr/>
+        </p:nvPicPr>
+        <p:blipFill>
+          <a:blip r:embed="rId17" cstate="print">
+            <a:extLst>
+              <a:ext uri="{28A0092B-C50C-407E-A947-70E740481C1C}">
+                <a14:useLocalDpi xmlns:a14="http://schemas.microsoft.com/office/drawing/2010/main" val="0"/>
+              </a:ext>
+            </a:extLst>
+          </a:blip>
+          <a:stretch>
+            <a:fillRect/>
+          </a:stretch>
+        </p:blipFill>
+        <p:spPr>
+          <a:xfrm>
+            <a:off x="24867205" y="20342888"/>
+            <a:ext cx="4402708" cy="2486455"/>
+          </a:xfrm>
+          <a:prstGeom prst="rect">
+            <a:avLst/>
+          </a:prstGeom>
+        </p:spPr>
+      </p:pic>
+      <p:pic>
+        <p:nvPicPr>
+          <p:cNvPr id="28" name="Picture 27">
+            <a:extLst>
+              <a:ext uri="{FF2B5EF4-FFF2-40B4-BE49-F238E27FC236}">
+                <a16:creationId xmlns:a16="http://schemas.microsoft.com/office/drawing/2014/main" id="{4F115063-D51F-4148-9142-463AB5F27CC3}"/>
+              </a:ext>
+            </a:extLst>
+          </p:cNvPr>
+          <p:cNvPicPr>
+            <a:picLocks noChangeAspect="1"/>
+          </p:cNvPicPr>
+          <p:nvPr/>
+        </p:nvPicPr>
+        <p:blipFill>
+          <a:blip r:embed="rId18">
+            <a:extLst>
+              <a:ext uri="{28A0092B-C50C-407E-A947-70E740481C1C}">
+                <a14:useLocalDpi xmlns:a14="http://schemas.microsoft.com/office/drawing/2010/main" val="0"/>
+              </a:ext>
+            </a:extLst>
+          </a:blip>
+          <a:stretch>
+            <a:fillRect/>
+          </a:stretch>
+        </p:blipFill>
+        <p:spPr>
+          <a:xfrm>
+            <a:off x="33472871" y="11160986"/>
+            <a:ext cx="10153656" cy="18572835"/>
+          </a:xfrm>
+          <a:prstGeom prst="rect">
+            <a:avLst/>
+          </a:prstGeom>
+        </p:spPr>
+      </p:pic>
+      <p:pic>
+        <p:nvPicPr>
+          <p:cNvPr id="40" name="Picture 39">
+            <a:extLst>
+              <a:ext uri="{FF2B5EF4-FFF2-40B4-BE49-F238E27FC236}">
+                <a16:creationId xmlns:a16="http://schemas.microsoft.com/office/drawing/2014/main" id="{B74E3F15-7723-4A55-AD69-3EF33529F0B5}"/>
+              </a:ext>
+            </a:extLst>
+          </p:cNvPr>
+          <p:cNvPicPr>
+            <a:picLocks noChangeAspect="1"/>
+          </p:cNvPicPr>
+          <p:nvPr/>
+        </p:nvPicPr>
+        <p:blipFill>
+          <a:blip r:embed="rId19">
+            <a:extLst>
+              <a:ext uri="{28A0092B-C50C-407E-A947-70E740481C1C}">
+                <a14:useLocalDpi xmlns:a14="http://schemas.microsoft.com/office/drawing/2010/main" val="0"/>
+              </a:ext>
+            </a:extLst>
+          </a:blip>
+          <a:stretch>
+            <a:fillRect/>
+          </a:stretch>
+        </p:blipFill>
+        <p:spPr>
+          <a:xfrm>
+            <a:off x="23020542" y="23808005"/>
+            <a:ext cx="8715282" cy="3793966"/>
+          </a:xfrm>
+          <a:prstGeom prst="rect">
+            <a:avLst/>
+          </a:prstGeom>
+        </p:spPr>
+      </p:pic>
+      <p:sp>
+        <p:nvSpPr>
+          <p:cNvPr id="41" name="TextBox 40">
+            <a:extLst>
+              <a:ext uri="{FF2B5EF4-FFF2-40B4-BE49-F238E27FC236}">
+                <a16:creationId xmlns:a16="http://schemas.microsoft.com/office/drawing/2014/main" id="{FEAFA2AF-4E05-4BB1-BAF3-80D330419A8A}"/>
+              </a:ext>
+            </a:extLst>
+          </p:cNvPr>
+          <p:cNvSpPr txBox="1"/>
+          <p:nvPr/>
+        </p:nvSpPr>
+        <p:spPr>
+          <a:xfrm>
+            <a:off x="22577010" y="27635651"/>
+            <a:ext cx="10147290" cy="5262979"/>
+          </a:xfrm>
+          <a:prstGeom prst="rect">
+            <a:avLst/>
+          </a:prstGeom>
+          <a:noFill/>
+        </p:spPr>
+        <p:txBody>
+          <a:bodyPr wrap="square" rtlCol="0">
+            <a:spAutoFit/>
+          </a:bodyPr>
+          <a:lstStyle/>
+          <a:p>
+            <a:r>
+              <a:rPr lang="en-US" sz="2400" dirty="0"/>
+              <a:t>A white star in blue means they have been in over 1000 competitions and have won at least $1000 across four contests.</a:t>
+            </a:r>
+          </a:p>
+          <a:p>
+            <a:r>
+              <a:rPr lang="en-US" sz="2400" dirty="0"/>
+              <a:t>A blue star in white means they have been in at least 500 competitions or have won at least $1000 across four contests.</a:t>
+            </a:r>
+          </a:p>
+          <a:p>
+            <a:endParaRPr lang="en-US" sz="2400" dirty="0"/>
+          </a:p>
+          <a:p>
+            <a:r>
+              <a:rPr lang="en-US" sz="2400" dirty="0"/>
+              <a:t>Looking through by hand, we found that ~85% of people have one type of these star in these competitions! This is true of the winners and the losers.</a:t>
+            </a:r>
+          </a:p>
+          <a:p>
+            <a:endParaRPr lang="en-US" sz="2400" dirty="0"/>
+          </a:p>
+          <a:p>
+            <a:r>
+              <a:rPr lang="en-US" sz="2400" dirty="0"/>
+              <a:t>Our neural network was able to perform quite well against these experienced players, turning a profit in lineups that had all players active.</a:t>
+            </a:r>
+          </a:p>
+          <a:p>
+            <a:endParaRPr lang="en-US" sz="2400" dirty="0"/>
+          </a:p>
+          <a:p>
+            <a:r>
+              <a:rPr lang="en-US" sz="2400" dirty="0"/>
+              <a:t>However, the system is still far from being reliably profitable, as its outputs are high in variance. There are still improvements to be made!</a:t>
+            </a:r>
+            <a:endParaRPr lang="en-CA" sz="2400" dirty="0"/>
+          </a:p>
+          <a:p>
+            <a:endParaRPr lang="en-CA" sz="2400" dirty="0"/>
+          </a:p>
+        </p:txBody>
+      </p:sp>
+      <p:sp>
+        <p:nvSpPr>
+          <p:cNvPr id="48" name="AutoShape 4" descr="{\displaystyle E(y,y')={\tfrac {1}{2}}\lVert y-y'\rVert ^{2}}">
+            <a:extLst>
+              <a:ext uri="{FF2B5EF4-FFF2-40B4-BE49-F238E27FC236}">
+                <a16:creationId xmlns:a16="http://schemas.microsoft.com/office/drawing/2014/main" id="{E6D94C3F-1583-4F03-9F62-982B168CD902}"/>
+              </a:ext>
+            </a:extLst>
+          </p:cNvPr>
+          <p:cNvSpPr>
+            <a:spLocks noChangeAspect="1" noChangeArrowheads="1"/>
+          </p:cNvSpPr>
+          <p:nvPr/>
+        </p:nvSpPr>
+        <p:spPr bwMode="auto">
+          <a:xfrm>
+            <a:off x="21793200" y="16306800"/>
+            <a:ext cx="304800" cy="304800"/>
+          </a:xfrm>
+          <a:prstGeom prst="rect">
+            <a:avLst/>
+          </a:prstGeom>
+          <a:noFill/>
+          <a:extLst>
+            <a:ext uri="{909E8E84-426E-40DD-AFC4-6F175D3DCCD1}">
+              <a14:hiddenFill xmlns:a14="http://schemas.microsoft.com/office/drawing/2010/main">
+                <a:solidFill>
+                  <a:srgbClr val="FFFFFF"/>
+                </a:solidFill>
+              </a14:hiddenFill>
+            </a:ext>
+          </a:extLst>
+        </p:spPr>
+        <p:txBody>
+          <a:bodyPr vert="horz" wrap="square" lIns="91440" tIns="45720" rIns="91440" bIns="45720" numCol="1" anchor="t" anchorCtr="0" compatLnSpc="1">
+            <a:prstTxWarp prst="textNoShape">
+              <a:avLst/>
+            </a:prstTxWarp>
+          </a:bodyPr>
+          <a:lstStyle/>
+          <a:p>
+            <a:endParaRPr lang="en-CA"/>
           </a:p>
         </p:txBody>
       </p:sp>

</xml_diff>

<commit_message>
Final draft of poster
</commit_message>
<xml_diff>
--- a/Poster/DP Poster.pptx
+++ b/Poster/DP Poster.pptx
@@ -4480,7 +4480,7 @@
         </p:nvSpPr>
         <p:spPr>
           <a:xfrm>
-            <a:off x="9101140" y="405722"/>
+            <a:off x="9101140" y="346728"/>
             <a:ext cx="27716758" cy="1200329"/>
           </a:xfrm>
           <a:prstGeom prst="rect">
@@ -4553,7 +4553,7 @@
         <p:spPr>
           <a:xfrm>
             <a:off x="39021582" y="641203"/>
-            <a:ext cx="4456804" cy="3416320"/>
+            <a:ext cx="4456804" cy="2308324"/>
           </a:xfrm>
           <a:prstGeom prst="rect">
             <a:avLst/>
@@ -4570,7 +4570,7 @@
           <a:p>
             <a:pPr algn="r"/>
             <a:r>
-              <a:rPr lang="en-US" sz="5400" b="1" dirty="0">
+              <a:rPr lang="en-US" sz="4800" b="1" dirty="0">
                 <a:latin typeface="Lato" panose="020F0502020204030203" pitchFamily="34" charset="0"/>
                 <a:cs typeface="Calibri" panose="020F0502020204030204" pitchFamily="34" charset="0"/>
               </a:rPr>
@@ -4580,7 +4580,7 @@
           <a:p>
             <a:pPr algn="r"/>
             <a:r>
-              <a:rPr lang="en-US" sz="5400" b="1" dirty="0">
+              <a:rPr lang="en-US" sz="4800" b="1" dirty="0">
                 <a:latin typeface="Lato" panose="020F0502020204030203" pitchFamily="34" charset="0"/>
                 <a:cs typeface="Calibri" panose="020F0502020204030204" pitchFamily="34" charset="0"/>
               </a:rPr>
@@ -4590,7 +4590,7 @@
           <a:p>
             <a:pPr algn="r"/>
             <a:r>
-              <a:rPr lang="en-US" sz="5400" b="1" dirty="0">
+              <a:rPr lang="en-US" sz="4800" b="1" dirty="0">
                 <a:latin typeface="Lato" panose="020F0502020204030203" pitchFamily="34" charset="0"/>
                 <a:cs typeface="Calibri" panose="020F0502020204030204" pitchFamily="34" charset="0"/>
               </a:rPr>
@@ -4771,7 +4771,7 @@
           <a:p>
             <a:pPr algn="ctr"/>
             <a:r>
-              <a:rPr lang="en-US" sz="5400" b="1" dirty="0">
+              <a:rPr lang="en-US" sz="4800" b="1" dirty="0">
                 <a:solidFill>
                   <a:schemeClr val="tx1"/>
                 </a:solidFill>
@@ -4798,7 +4798,7 @@
         </p:nvSpPr>
         <p:spPr>
           <a:xfrm>
-            <a:off x="11175698" y="3853070"/>
+            <a:off x="11233754" y="3853070"/>
             <a:ext cx="10728284" cy="8532656"/>
           </a:xfrm>
           <a:prstGeom prst="rect">
@@ -4852,7 +4852,7 @@
         </p:nvSpPr>
         <p:spPr>
           <a:xfrm>
-            <a:off x="11288991" y="5102657"/>
+            <a:off x="11347047" y="5102657"/>
             <a:ext cx="10497603" cy="7172555"/>
           </a:xfrm>
           <a:prstGeom prst="rect">
@@ -5195,7 +5195,7 @@
         <p:spPr>
           <a:xfrm>
             <a:off x="359561" y="4950746"/>
-            <a:ext cx="10352902" cy="5262979"/>
+            <a:ext cx="10352902" cy="4893647"/>
           </a:xfrm>
           <a:prstGeom prst="rect">
             <a:avLst/>
@@ -5283,7 +5283,7 @@
               <a:rPr lang="en-US" sz="2400" dirty="0">
                 <a:latin typeface="Lato" panose="020F0502020204030203" pitchFamily="34" charset="0"/>
               </a:rPr>
-              <a:t> means the competitions happen every day that there are matches</a:t>
+              <a:t> means the competitions happen every day that there are matches (not fantasy leagues)</a:t>
             </a:r>
           </a:p>
           <a:p>
@@ -5301,7 +5301,7 @@
               <a:rPr lang="en-US" sz="2400" dirty="0">
                 <a:latin typeface="Lato" panose="020F0502020204030203" pitchFamily="34" charset="0"/>
               </a:rPr>
-              <a:t>means they use a contrived points system</a:t>
+              <a:t>means that they use a contrived points system</a:t>
             </a:r>
           </a:p>
           <a:p>
@@ -5337,13 +5337,10 @@
               <a:rPr lang="en-US" sz="2400" dirty="0">
                 <a:latin typeface="Lato" panose="020F0502020204030203" pitchFamily="34" charset="0"/>
               </a:rPr>
-              <a:t>means we are competing against other people (machines?)</a:t>
-            </a:r>
-            <a:br>
-              <a:rPr lang="en-US" sz="2400" dirty="0">
-                <a:latin typeface="Lato" panose="020F0502020204030203" pitchFamily="34" charset="0"/>
-              </a:rPr>
-            </a:br>
+              <a:t>means we are competing against real people</a:t>
+            </a:r>
+          </a:p>
+          <a:p>
             <a:endParaRPr lang="en-US" sz="2400" dirty="0">
               <a:latin typeface="Lato" panose="020F0502020204030203" pitchFamily="34" charset="0"/>
             </a:endParaRPr>
@@ -5353,7 +5350,7 @@
               <a:rPr lang="en-US" sz="2400" dirty="0">
                 <a:latin typeface="Lato" panose="020F0502020204030203" pitchFamily="34" charset="0"/>
               </a:rPr>
-              <a:t>In these competitions, you have to select 9 basketball players of specific positions (center, forward, etc.) who are playing tonight, in real games, across any teams. Each player has a salary, and you have a budget. The goal of the competition is to maximize the amount of fantasy points your lineup gets.</a:t>
+              <a:t>In these competitions, you have to select 9 basketball players of specific positions (e.g. center) who are playing tonight in real games, across any teams. Each player has a salary, and you have a budget. The goal of the competition is to maximize the amount of fantasy points your lineup gets.</a:t>
             </a:r>
             <a:r>
               <a:rPr lang="en-US" sz="2400" baseline="30000" dirty="0">
@@ -5381,10 +5378,10 @@
         </p:nvGrpSpPr>
         <p:grpSpPr>
           <a:xfrm>
-            <a:off x="461547" y="9750054"/>
-            <a:ext cx="9976556" cy="5293385"/>
-            <a:chOff x="117731" y="10011171"/>
-            <a:chExt cx="11436866" cy="6068200"/>
+            <a:off x="314584" y="9863061"/>
+            <a:ext cx="10270454" cy="5293385"/>
+            <a:chOff x="-219186" y="10011171"/>
+            <a:chExt cx="11773783" cy="6068200"/>
           </a:xfrm>
         </p:grpSpPr>
         <p:pic>
@@ -5437,7 +5434,7 @@
           </p:nvSpPr>
           <p:spPr>
             <a:xfrm>
-              <a:off x="4666846" y="10484307"/>
+              <a:off x="4666846" y="10396953"/>
               <a:ext cx="1247758" cy="811502"/>
             </a:xfrm>
             <a:prstGeom prst="rect">
@@ -5485,7 +5482,7 @@
           </p:nvSpPr>
           <p:spPr>
             <a:xfrm>
-              <a:off x="6436544" y="10484308"/>
+              <a:off x="6327352" y="10396955"/>
               <a:ext cx="1242613" cy="811502"/>
             </a:xfrm>
             <a:prstGeom prst="rect">
@@ -5533,7 +5530,7 @@
           </p:nvSpPr>
           <p:spPr>
             <a:xfrm>
-              <a:off x="7620114" y="10482097"/>
+              <a:off x="7510922" y="10394743"/>
               <a:ext cx="1421967" cy="811502"/>
             </a:xfrm>
             <a:prstGeom prst="rect">
@@ -5581,7 +5578,7 @@
           </p:nvSpPr>
           <p:spPr>
             <a:xfrm>
-              <a:off x="9936018" y="10675720"/>
+              <a:off x="9783149" y="10675720"/>
               <a:ext cx="1161757" cy="458676"/>
             </a:xfrm>
             <a:prstGeom prst="rect">
@@ -5621,7 +5618,7 @@
           </p:nvSpPr>
           <p:spPr>
             <a:xfrm>
-              <a:off x="117731" y="13619394"/>
+              <a:off x="-219186" y="13467003"/>
               <a:ext cx="1190792" cy="811502"/>
             </a:xfrm>
             <a:prstGeom prst="rect">
@@ -5697,12 +5694,12 @@
           <a:p>
             <a:pPr algn="ctr"/>
             <a:r>
-              <a:rPr lang="en-US" sz="2900" dirty="0">
-                <a:latin typeface="Lato" panose="020F0502020204030203" pitchFamily="34" charset="0"/>
-              </a:rPr>
-              <a:t>Our goal was to build a machine learning system that could predict these lineups and maybe even win some money (unlikely!)</a:t>
-            </a:r>
-            <a:endParaRPr lang="en-CA" sz="2900" dirty="0">
+              <a:rPr lang="en-US" sz="2800" dirty="0">
+                <a:latin typeface="Lato" panose="020F0502020204030203" pitchFamily="34" charset="0"/>
+              </a:rPr>
+              <a:t>Our goal was to build a machine learning system to predict these lineups and maybe even win some money (unlikely!)</a:t>
+            </a:r>
+            <a:endParaRPr lang="en-CA" sz="2800" dirty="0">
               <a:latin typeface="Lato" panose="020F0502020204030203" pitchFamily="34" charset="0"/>
             </a:endParaRPr>
           </a:p>
@@ -5722,7 +5719,7 @@
         </p:nvSpPr>
         <p:spPr>
           <a:xfrm>
-            <a:off x="11527972" y="5382018"/>
+            <a:off x="11586028" y="5286768"/>
             <a:ext cx="10064307" cy="1569660"/>
           </a:xfrm>
           <a:prstGeom prst="rect">
@@ -5758,13 +5755,13 @@
           <p:nvPr>
             <p:extLst>
               <p:ext uri="{D42A27DB-BD31-4B8C-83A1-F6EECF244321}">
-                <p14:modId xmlns:p14="http://schemas.microsoft.com/office/powerpoint/2010/main" val="1409956334"/>
+                <p14:modId xmlns:p14="http://schemas.microsoft.com/office/powerpoint/2010/main" val="1354097773"/>
               </p:ext>
             </p:extLst>
           </p:nvPr>
         </p:nvGraphicFramePr>
         <p:xfrm>
-          <a:off x="12806939" y="6988504"/>
+          <a:off x="12864995" y="6988504"/>
           <a:ext cx="7758045" cy="2858242"/>
         </p:xfrm>
         <a:graphic>
@@ -5787,10 +5784,10 @@
         </p:nvGrpSpPr>
         <p:grpSpPr>
           <a:xfrm>
-            <a:off x="11619468" y="10054302"/>
-            <a:ext cx="9497279" cy="2385735"/>
-            <a:chOff x="595579" y="23651717"/>
-            <a:chExt cx="9497279" cy="2385735"/>
+            <a:off x="11677524" y="10016297"/>
+            <a:ext cx="8945516" cy="2185540"/>
+            <a:chOff x="595579" y="23613712"/>
+            <a:chExt cx="8945516" cy="2185540"/>
           </a:xfrm>
         </p:grpSpPr>
         <p:sp>
@@ -5808,7 +5805,7 @@
           <p:spPr>
             <a:xfrm>
               <a:off x="595579" y="23729128"/>
-              <a:ext cx="8271430" cy="2308324"/>
+              <a:ext cx="8945516" cy="1938992"/>
             </a:xfrm>
             <a:prstGeom prst="rect">
               <a:avLst/>
@@ -5856,7 +5853,7 @@
                 <a:rPr lang="en-CA" sz="2400" dirty="0">
                   <a:latin typeface="Lato" panose="020F0502020204030203" pitchFamily="34" charset="0"/>
                 </a:rPr>
-                <a:t> to access and retrieve the NBA website</a:t>
+                <a:t> to retrieve the NBA website</a:t>
               </a:r>
             </a:p>
             <a:p>
@@ -5914,7 +5911,7 @@
           </p:blipFill>
           <p:spPr>
             <a:xfrm>
-              <a:off x="6641970" y="24982094"/>
+              <a:off x="7152526" y="25002685"/>
               <a:ext cx="880188" cy="796567"/>
             </a:xfrm>
             <a:prstGeom prst="rect">
@@ -5948,7 +5945,7 @@
           </p:blipFill>
           <p:spPr>
             <a:xfrm>
-              <a:off x="8772133" y="24115442"/>
+              <a:off x="8026844" y="24136311"/>
               <a:ext cx="1320725" cy="941019"/>
             </a:xfrm>
             <a:prstGeom prst="rect">
@@ -5982,7 +5979,7 @@
           </p:blipFill>
           <p:spPr>
             <a:xfrm>
-              <a:off x="5094841" y="23651717"/>
+              <a:off x="5450891" y="23613712"/>
               <a:ext cx="1514396" cy="757198"/>
             </a:xfrm>
             <a:prstGeom prst="rect">
@@ -6118,7 +6115,7 @@
         <p:spPr>
           <a:xfrm>
             <a:off x="500786" y="18760057"/>
-            <a:ext cx="10032791" cy="5047536"/>
+            <a:ext cx="10032791" cy="4678204"/>
           </a:xfrm>
           <a:prstGeom prst="rect">
             <a:avLst/>
@@ -6147,7 +6144,7 @@
               <a:rPr lang="en-US" sz="2400" dirty="0">
                 <a:latin typeface="Lato" panose="020F0502020204030203" pitchFamily="34" charset="0"/>
               </a:rPr>
-              <a:t>There has to be a distinguishable pattern between the inputs (player stats, games happening) and the outputs (lineups) of the system. </a:t>
+              <a:t>There has to be a distinguishable pattern between the inputs (player stats, games) and the outputs (lineups) of the system </a:t>
             </a:r>
           </a:p>
           <a:p>
@@ -6209,8 +6206,8 @@
           </a:p>
         </p:txBody>
       </p:sp>
-      <mc:AlternateContent xmlns:mc="http://schemas.openxmlformats.org/markup-compatibility/2006">
-        <mc:Choice xmlns:a14="http://schemas.microsoft.com/office/drawing/2010/main" Requires="a14">
+      <mc:AlternateContent xmlns:mc="http://schemas.openxmlformats.org/markup-compatibility/2006" xmlns:a14="http://schemas.microsoft.com/office/drawing/2010/main">
+        <mc:Choice Requires="a14">
           <p:sp>
             <p:nvSpPr>
               <p:cNvPr id="33" name="TextBox 32">
@@ -6408,7 +6405,7 @@
             </p:txBody>
           </p:sp>
         </mc:Choice>
-        <mc:Fallback>
+        <mc:Fallback xmlns="">
           <p:sp>
             <p:nvSpPr>
               <p:cNvPr id="33" name="TextBox 32">
@@ -6724,7 +6721,7 @@
         </p:nvSpPr>
         <p:spPr>
           <a:xfrm>
-            <a:off x="11223910" y="12725847"/>
+            <a:off x="11281966" y="12725847"/>
             <a:ext cx="10664987" cy="20105046"/>
           </a:xfrm>
           <a:prstGeom prst="rect">
@@ -6778,7 +6775,7 @@
         </p:nvSpPr>
         <p:spPr>
           <a:xfrm>
-            <a:off x="11310495" y="13478704"/>
+            <a:off x="11368551" y="13478704"/>
             <a:ext cx="10476099" cy="19238677"/>
           </a:xfrm>
           <a:prstGeom prst="rect">
@@ -6940,8 +6937,8 @@
         </p:nvSpPr>
         <p:spPr>
           <a:xfrm>
-            <a:off x="11512887" y="14242596"/>
-            <a:ext cx="10064307" cy="1569660"/>
+            <a:off x="11494743" y="14242596"/>
+            <a:ext cx="10286565" cy="1154162"/>
           </a:xfrm>
           <a:prstGeom prst="rect">
             <a:avLst/>
@@ -6955,50 +6952,14 @@
           <a:lstStyle/>
           <a:p>
             <a:r>
-              <a:rPr lang="en-US" sz="2400" dirty="0">
-                <a:latin typeface="Lato" panose="020F0502020204030203" pitchFamily="34" charset="0"/>
-              </a:rPr>
-              <a:t>Our first idea was to have a NN with many inputs per active player in the NBA: their stats, and an “are they playing tonight” indicator. The NN would have one output per player: a value indicating if the player should be in the lineup.</a:t>
-            </a:r>
-          </a:p>
-        </p:txBody>
-      </p:sp>
-      <p:pic>
-        <p:nvPicPr>
-          <p:cNvPr id="44" name="Picture 43">
-            <a:extLst>
-              <a:ext uri="{FF2B5EF4-FFF2-40B4-BE49-F238E27FC236}">
-                <a16:creationId xmlns:a16="http://schemas.microsoft.com/office/drawing/2014/main" id="{7AB3D377-34C5-4C7C-9FA3-07B1FCCA1DCC}"/>
-              </a:ext>
-            </a:extLst>
-          </p:cNvPr>
-          <p:cNvPicPr>
-            <a:picLocks noChangeAspect="1"/>
-          </p:cNvPicPr>
-          <p:nvPr/>
-        </p:nvPicPr>
-        <p:blipFill>
-          <a:blip r:embed="rId11">
-            <a:extLst>
-              <a:ext uri="{28A0092B-C50C-407E-A947-70E740481C1C}">
-                <a14:useLocalDpi xmlns:a14="http://schemas.microsoft.com/office/drawing/2010/main" val="0"/>
-              </a:ext>
-            </a:extLst>
-          </a:blip>
-          <a:stretch>
-            <a:fillRect/>
-          </a:stretch>
-        </p:blipFill>
-        <p:spPr>
-          <a:xfrm>
-            <a:off x="14157861" y="15591879"/>
-            <a:ext cx="4305701" cy="1618370"/>
-          </a:xfrm>
-          <a:prstGeom prst="rect">
-            <a:avLst/>
-          </a:prstGeom>
-        </p:spPr>
-      </p:pic>
+              <a:rPr lang="en-US" sz="2300" dirty="0">
+                <a:latin typeface="Lato" panose="020F0502020204030203" pitchFamily="34" charset="0"/>
+              </a:rPr>
+              <a:t>Our first architecture was a NN with multiple inputs for all active NBA players: their stats, and an “are they playing tonight” indicator. The NN had one output per player: a value indicating if the player should be in the lineup.</a:t>
+            </a:r>
+          </a:p>
+        </p:txBody>
+      </p:sp>
       <p:sp>
         <p:nvSpPr>
           <p:cNvPr id="45" name="TextBox 44">
@@ -7013,8 +6974,8 @@
         </p:nvSpPr>
         <p:spPr>
           <a:xfrm>
-            <a:off x="11496278" y="17525909"/>
-            <a:ext cx="10064307" cy="3046988"/>
+            <a:off x="11549836" y="17240634"/>
+            <a:ext cx="10064307" cy="2800767"/>
           </a:xfrm>
           <a:prstGeom prst="rect">
             <a:avLst/>
@@ -7028,7 +6989,7 @@
           <a:lstStyle/>
           <a:p>
             <a:r>
-              <a:rPr lang="en-US" sz="2400" dirty="0">
+              <a:rPr lang="en-US" sz="2300" dirty="0">
                 <a:latin typeface="Lato" panose="020F0502020204030203" pitchFamily="34" charset="0"/>
               </a:rPr>
               <a:t>This preliminary model had limitations:</a:t>
@@ -7040,7 +7001,7 @@
               <a:buAutoNum type="arabicPeriod"/>
             </a:pPr>
             <a:r>
-              <a:rPr lang="en-US" sz="2400" dirty="0">
+              <a:rPr lang="en-US" sz="2300" dirty="0">
                 <a:latin typeface="Lato" panose="020F0502020204030203" pitchFamily="34" charset="0"/>
               </a:rPr>
               <a:t>It would be tough for the network learn what the inputs mean</a:t>
@@ -7052,7 +7013,7 @@
               <a:buAutoNum type="arabicPeriod"/>
             </a:pPr>
             <a:r>
-              <a:rPr lang="en-US" sz="2400" dirty="0">
+              <a:rPr lang="en-US" sz="2300" dirty="0">
                 <a:latin typeface="Lato" panose="020F0502020204030203" pitchFamily="34" charset="0"/>
               </a:rPr>
               <a:t>Active players by nature mean we can’t use data from old games</a:t>
@@ -7064,10 +7025,10 @@
               <a:buAutoNum type="arabicPeriod"/>
             </a:pPr>
             <a:r>
-              <a:rPr lang="en-US" sz="2400" dirty="0">
-                <a:latin typeface="Lato" panose="020F0502020204030203" pitchFamily="34" charset="0"/>
-              </a:rPr>
-              <a:t>The network will find correlations between players in different games</a:t>
+              <a:rPr lang="en-US" sz="2300" dirty="0">
+                <a:latin typeface="Lato" panose="020F0502020204030203" pitchFamily="34" charset="0"/>
+              </a:rPr>
+              <a:t>The network will find correlations between unrelated players</a:t>
             </a:r>
           </a:p>
           <a:p>
@@ -7076,327 +7037,389 @@
               <a:buAutoNum type="arabicPeriod"/>
             </a:pPr>
             <a:r>
-              <a:rPr lang="en-US" sz="2400" dirty="0">
+              <a:rPr lang="en-US" sz="2300" dirty="0">
                 <a:latin typeface="Lato" panose="020F0502020204030203" pitchFamily="34" charset="0"/>
               </a:rPr>
               <a:t>The salary constraint is not handled</a:t>
             </a:r>
           </a:p>
           <a:p>
-            <a:r>
-              <a:rPr lang="en-US" sz="2400" dirty="0">
-                <a:latin typeface="Lato" panose="020F0502020204030203" pitchFamily="34" charset="0"/>
-              </a:rPr>
-              <a:t>Instead, we spent time on architecture, and came up with a much better solution, composed of 3 Systems:</a:t>
-            </a:r>
-          </a:p>
-        </p:txBody>
-      </p:sp>
-      <p:sp>
-        <p:nvSpPr>
-          <p:cNvPr id="46" name="TextBox 45">
+            <a:pPr>
+              <a:spcBef>
+                <a:spcPts val="1800"/>
+              </a:spcBef>
+            </a:pPr>
+            <a:r>
+              <a:rPr lang="en-US" sz="2300" dirty="0">
+                <a:latin typeface="Lato" panose="020F0502020204030203" pitchFamily="34" charset="0"/>
+              </a:rPr>
+              <a:t>Instead, we spent time on architecture, and came up with a much better second solution, composed of 3 Systems:</a:t>
+            </a:r>
+          </a:p>
+        </p:txBody>
+      </p:sp>
+      <p:grpSp>
+        <p:nvGrpSpPr>
+          <p:cNvPr id="11" name="Group 10">
             <a:extLst>
               <a:ext uri="{FF2B5EF4-FFF2-40B4-BE49-F238E27FC236}">
-                <a16:creationId xmlns:a16="http://schemas.microsoft.com/office/drawing/2014/main" id="{905F1E5B-7DFB-497B-B322-B7565590ABB9}"/>
+                <a16:creationId xmlns:a16="http://schemas.microsoft.com/office/drawing/2014/main" id="{8159CBC3-8908-47F4-942F-A1E17B227CEB}"/>
               </a:ext>
             </a:extLst>
           </p:cNvPr>
-          <p:cNvSpPr txBox="1"/>
+          <p:cNvGrpSpPr/>
           <p:nvPr/>
-        </p:nvSpPr>
-        <p:spPr>
+        </p:nvGrpSpPr>
+        <p:grpSpPr>
           <a:xfrm>
-            <a:off x="12982584" y="15672330"/>
-            <a:ext cx="2133655" cy="646331"/>
+            <a:off x="13037650" y="15537307"/>
+            <a:ext cx="5839210" cy="1663526"/>
+            <a:chOff x="12982584" y="15591879"/>
+            <a:chExt cx="5839210" cy="1663526"/>
           </a:xfrm>
-          <a:prstGeom prst="rect">
-            <a:avLst/>
-          </a:prstGeom>
-          <a:noFill/>
-        </p:spPr>
-        <p:txBody>
-          <a:bodyPr wrap="square" rtlCol="0">
-            <a:spAutoFit/>
-          </a:bodyPr>
-          <a:lstStyle/>
-          <a:p>
-            <a:pPr algn="ctr"/>
-            <a:r>
-              <a:rPr lang="en-US" dirty="0">
-                <a:latin typeface="Lato" panose="020F0502020204030203" pitchFamily="34" charset="0"/>
-              </a:rPr>
-              <a:t>All currently active players’ stats</a:t>
-            </a:r>
-            <a:endParaRPr lang="en-CA" dirty="0">
-              <a:latin typeface="Lato" panose="020F0502020204030203" pitchFamily="34" charset="0"/>
-            </a:endParaRPr>
-          </a:p>
-        </p:txBody>
-      </p:sp>
-      <p:sp>
-        <p:nvSpPr>
-          <p:cNvPr id="110" name="TextBox 109">
-            <a:extLst>
-              <a:ext uri="{FF2B5EF4-FFF2-40B4-BE49-F238E27FC236}">
-                <a16:creationId xmlns:a16="http://schemas.microsoft.com/office/drawing/2014/main" id="{E808DBBE-10AC-4D6F-AE17-5325C702CEC6}"/>
-              </a:ext>
-            </a:extLst>
-          </p:cNvPr>
-          <p:cNvSpPr txBox="1"/>
-          <p:nvPr/>
-        </p:nvSpPr>
-        <p:spPr>
-          <a:xfrm>
-            <a:off x="13083827" y="16628124"/>
-            <a:ext cx="2133655" cy="646331"/>
-          </a:xfrm>
-          <a:prstGeom prst="rect">
-            <a:avLst/>
-          </a:prstGeom>
-          <a:noFill/>
-        </p:spPr>
-        <p:txBody>
-          <a:bodyPr wrap="square" rtlCol="0">
-            <a:spAutoFit/>
-          </a:bodyPr>
-          <a:lstStyle/>
-          <a:p>
-            <a:pPr algn="ctr"/>
-            <a:r>
-              <a:rPr lang="en-US" dirty="0">
-                <a:latin typeface="Lato" panose="020F0502020204030203" pitchFamily="34" charset="0"/>
-              </a:rPr>
-              <a:t>“Who’s Playing” indicators</a:t>
-            </a:r>
-            <a:endParaRPr lang="en-CA" dirty="0">
-              <a:latin typeface="Lato" panose="020F0502020204030203" pitchFamily="34" charset="0"/>
-            </a:endParaRPr>
-          </a:p>
-        </p:txBody>
-      </p:sp>
-      <p:sp>
-        <p:nvSpPr>
-          <p:cNvPr id="111" name="TextBox 110">
-            <a:extLst>
-              <a:ext uri="{FF2B5EF4-FFF2-40B4-BE49-F238E27FC236}">
-                <a16:creationId xmlns:a16="http://schemas.microsoft.com/office/drawing/2014/main" id="{C616E66E-27D7-45F7-8287-395CBDFBFDE9}"/>
-              </a:ext>
-            </a:extLst>
-          </p:cNvPr>
-          <p:cNvSpPr txBox="1"/>
-          <p:nvPr/>
-        </p:nvSpPr>
-        <p:spPr>
-          <a:xfrm>
-            <a:off x="15261916" y="16092319"/>
-            <a:ext cx="2133655" cy="646331"/>
-          </a:xfrm>
-          <a:prstGeom prst="rect">
-            <a:avLst/>
-          </a:prstGeom>
-          <a:noFill/>
-        </p:spPr>
-        <p:txBody>
-          <a:bodyPr wrap="square" rtlCol="0">
-            <a:spAutoFit/>
-          </a:bodyPr>
-          <a:lstStyle/>
-          <a:p>
-            <a:pPr algn="ctr"/>
-            <a:r>
-              <a:rPr lang="en-US" dirty="0">
-                <a:latin typeface="Lato" panose="020F0502020204030203" pitchFamily="34" charset="0"/>
-              </a:rPr>
-              <a:t>Neural</a:t>
-            </a:r>
-          </a:p>
-          <a:p>
-            <a:pPr algn="ctr"/>
-            <a:r>
-              <a:rPr lang="en-US" dirty="0">
-                <a:latin typeface="Lato" panose="020F0502020204030203" pitchFamily="34" charset="0"/>
-              </a:rPr>
-              <a:t>Network</a:t>
-            </a:r>
-            <a:endParaRPr lang="en-CA" dirty="0">
-              <a:latin typeface="Lato" panose="020F0502020204030203" pitchFamily="34" charset="0"/>
-            </a:endParaRPr>
-          </a:p>
-        </p:txBody>
-      </p:sp>
-      <p:sp>
-        <p:nvSpPr>
-          <p:cNvPr id="112" name="TextBox 111">
-            <a:extLst>
-              <a:ext uri="{FF2B5EF4-FFF2-40B4-BE49-F238E27FC236}">
-                <a16:creationId xmlns:a16="http://schemas.microsoft.com/office/drawing/2014/main" id="{AE571E21-55D1-4FBA-8984-075DBFF48AF5}"/>
-              </a:ext>
-            </a:extLst>
-          </p:cNvPr>
-          <p:cNvSpPr txBox="1"/>
-          <p:nvPr/>
-        </p:nvSpPr>
-        <p:spPr>
-          <a:xfrm>
-            <a:off x="17587081" y="16077898"/>
-            <a:ext cx="1234713" cy="646331"/>
-          </a:xfrm>
-          <a:prstGeom prst="rect">
-            <a:avLst/>
-          </a:prstGeom>
-          <a:noFill/>
-        </p:spPr>
-        <p:txBody>
-          <a:bodyPr wrap="square" rtlCol="0">
-            <a:spAutoFit/>
-          </a:bodyPr>
-          <a:lstStyle/>
-          <a:p>
-            <a:pPr algn="ctr"/>
-            <a:r>
-              <a:rPr lang="en-US" dirty="0">
-                <a:latin typeface="Lato" panose="020F0502020204030203" pitchFamily="34" charset="0"/>
-              </a:rPr>
-              <a:t>Lineup</a:t>
-            </a:r>
-          </a:p>
-          <a:p>
-            <a:pPr algn="ctr"/>
-            <a:r>
-              <a:rPr lang="en-US" dirty="0">
-                <a:latin typeface="Lato" panose="020F0502020204030203" pitchFamily="34" charset="0"/>
-              </a:rPr>
-              <a:t>indicators</a:t>
-            </a:r>
-            <a:endParaRPr lang="en-CA" dirty="0">
-              <a:latin typeface="Lato" panose="020F0502020204030203" pitchFamily="34" charset="0"/>
-            </a:endParaRPr>
-          </a:p>
-        </p:txBody>
-      </p:sp>
-      <p:sp>
-        <p:nvSpPr>
-          <p:cNvPr id="113" name="TextBox 112">
-            <a:extLst>
-              <a:ext uri="{FF2B5EF4-FFF2-40B4-BE49-F238E27FC236}">
-                <a16:creationId xmlns:a16="http://schemas.microsoft.com/office/drawing/2014/main" id="{A6C43F66-9731-4BDD-A860-F7C4F8927B4E}"/>
-              </a:ext>
-            </a:extLst>
-          </p:cNvPr>
-          <p:cNvSpPr txBox="1"/>
-          <p:nvPr/>
-        </p:nvSpPr>
-        <p:spPr>
-          <a:xfrm>
-            <a:off x="15156389" y="15748940"/>
-            <a:ext cx="340956" cy="369332"/>
-          </a:xfrm>
-          <a:prstGeom prst="rect">
-            <a:avLst/>
-          </a:prstGeom>
-          <a:noFill/>
-        </p:spPr>
-        <p:txBody>
-          <a:bodyPr wrap="square" rtlCol="0">
-            <a:spAutoFit/>
-          </a:bodyPr>
-          <a:lstStyle/>
-          <a:p>
-            <a:pPr algn="ctr"/>
-            <a:r>
-              <a:rPr lang="en-US" dirty="0">
-                <a:latin typeface="Lato" panose="020F0502020204030203" pitchFamily="34" charset="0"/>
-              </a:rPr>
-              <a:t>…</a:t>
-            </a:r>
-            <a:endParaRPr lang="en-CA" dirty="0">
-              <a:latin typeface="Lato" panose="020F0502020204030203" pitchFamily="34" charset="0"/>
-            </a:endParaRPr>
-          </a:p>
-        </p:txBody>
-      </p:sp>
-      <p:sp>
-        <p:nvSpPr>
-          <p:cNvPr id="114" name="TextBox 113">
-            <a:extLst>
-              <a:ext uri="{FF2B5EF4-FFF2-40B4-BE49-F238E27FC236}">
-                <a16:creationId xmlns:a16="http://schemas.microsoft.com/office/drawing/2014/main" id="{03D1A768-5B11-4F10-A6DD-9129B88014D5}"/>
-              </a:ext>
-            </a:extLst>
-          </p:cNvPr>
-          <p:cNvSpPr txBox="1"/>
-          <p:nvPr/>
-        </p:nvSpPr>
-        <p:spPr>
-          <a:xfrm>
-            <a:off x="15166469" y="16712697"/>
-            <a:ext cx="340956" cy="369332"/>
-          </a:xfrm>
-          <a:prstGeom prst="rect">
-            <a:avLst/>
-          </a:prstGeom>
-          <a:noFill/>
-        </p:spPr>
-        <p:txBody>
-          <a:bodyPr wrap="square" rtlCol="0">
-            <a:spAutoFit/>
-          </a:bodyPr>
-          <a:lstStyle/>
-          <a:p>
-            <a:pPr algn="ctr"/>
-            <a:r>
-              <a:rPr lang="en-US" dirty="0">
-                <a:latin typeface="Lato" panose="020F0502020204030203" pitchFamily="34" charset="0"/>
-              </a:rPr>
-              <a:t>…</a:t>
-            </a:r>
-            <a:endParaRPr lang="en-CA" dirty="0">
-              <a:latin typeface="Lato" panose="020F0502020204030203" pitchFamily="34" charset="0"/>
-            </a:endParaRPr>
-          </a:p>
-        </p:txBody>
-      </p:sp>
-      <p:sp>
-        <p:nvSpPr>
-          <p:cNvPr id="115" name="TextBox 114">
-            <a:extLst>
-              <a:ext uri="{FF2B5EF4-FFF2-40B4-BE49-F238E27FC236}">
-                <a16:creationId xmlns:a16="http://schemas.microsoft.com/office/drawing/2014/main" id="{B25D524C-2CC1-40F3-BF8B-9F43916B1A3D}"/>
-              </a:ext>
-            </a:extLst>
-          </p:cNvPr>
-          <p:cNvSpPr txBox="1"/>
-          <p:nvPr/>
-        </p:nvSpPr>
-        <p:spPr>
-          <a:xfrm>
-            <a:off x="17188301" y="16187301"/>
-            <a:ext cx="340956" cy="369332"/>
-          </a:xfrm>
-          <a:prstGeom prst="rect">
-            <a:avLst/>
-          </a:prstGeom>
-          <a:noFill/>
-        </p:spPr>
-        <p:txBody>
-          <a:bodyPr wrap="square" rtlCol="0">
-            <a:spAutoFit/>
-          </a:bodyPr>
-          <a:lstStyle/>
-          <a:p>
-            <a:pPr algn="ctr"/>
-            <a:r>
-              <a:rPr lang="en-US" dirty="0">
-                <a:latin typeface="Lato" panose="020F0502020204030203" pitchFamily="34" charset="0"/>
-              </a:rPr>
-              <a:t>…</a:t>
-            </a:r>
-            <a:endParaRPr lang="en-CA" dirty="0">
-              <a:latin typeface="Lato" panose="020F0502020204030203" pitchFamily="34" charset="0"/>
-            </a:endParaRPr>
-          </a:p>
-        </p:txBody>
-      </p:sp>
+        </p:grpSpPr>
+        <p:pic>
+          <p:nvPicPr>
+            <p:cNvPr id="44" name="Picture 43">
+              <a:extLst>
+                <a:ext uri="{FF2B5EF4-FFF2-40B4-BE49-F238E27FC236}">
+                  <a16:creationId xmlns:a16="http://schemas.microsoft.com/office/drawing/2014/main" id="{7AB3D377-34C5-4C7C-9FA3-07B1FCCA1DCC}"/>
+                </a:ext>
+              </a:extLst>
+            </p:cNvPr>
+            <p:cNvPicPr>
+              <a:picLocks noChangeAspect="1"/>
+            </p:cNvPicPr>
+            <p:nvPr/>
+          </p:nvPicPr>
+          <p:blipFill>
+            <a:blip r:embed="rId11">
+              <a:extLst>
+                <a:ext uri="{28A0092B-C50C-407E-A947-70E740481C1C}">
+                  <a14:useLocalDpi xmlns:a14="http://schemas.microsoft.com/office/drawing/2010/main" val="0"/>
+                </a:ext>
+              </a:extLst>
+            </a:blip>
+            <a:stretch>
+              <a:fillRect/>
+            </a:stretch>
+          </p:blipFill>
+          <p:spPr>
+            <a:xfrm>
+              <a:off x="14157861" y="15591879"/>
+              <a:ext cx="4305701" cy="1618370"/>
+            </a:xfrm>
+            <a:prstGeom prst="rect">
+              <a:avLst/>
+            </a:prstGeom>
+          </p:spPr>
+        </p:pic>
+        <p:sp>
+          <p:nvSpPr>
+            <p:cNvPr id="46" name="TextBox 45">
+              <a:extLst>
+                <a:ext uri="{FF2B5EF4-FFF2-40B4-BE49-F238E27FC236}">
+                  <a16:creationId xmlns:a16="http://schemas.microsoft.com/office/drawing/2014/main" id="{905F1E5B-7DFB-497B-B322-B7565590ABB9}"/>
+                </a:ext>
+              </a:extLst>
+            </p:cNvPr>
+            <p:cNvSpPr txBox="1"/>
+            <p:nvPr/>
+          </p:nvSpPr>
+          <p:spPr>
+            <a:xfrm>
+              <a:off x="12982584" y="15653280"/>
+              <a:ext cx="2133655" cy="646331"/>
+            </a:xfrm>
+            <a:prstGeom prst="rect">
+              <a:avLst/>
+            </a:prstGeom>
+            <a:noFill/>
+          </p:spPr>
+          <p:txBody>
+            <a:bodyPr wrap="square" rtlCol="0">
+              <a:spAutoFit/>
+            </a:bodyPr>
+            <a:lstStyle/>
+            <a:p>
+              <a:pPr algn="ctr"/>
+              <a:r>
+                <a:rPr lang="en-US" dirty="0">
+                  <a:latin typeface="Lato" panose="020F0502020204030203" pitchFamily="34" charset="0"/>
+                </a:rPr>
+                <a:t>All currently active players’ stats</a:t>
+              </a:r>
+              <a:endParaRPr lang="en-CA" dirty="0">
+                <a:latin typeface="Lato" panose="020F0502020204030203" pitchFamily="34" charset="0"/>
+              </a:endParaRPr>
+            </a:p>
+          </p:txBody>
+        </p:sp>
+        <p:sp>
+          <p:nvSpPr>
+            <p:cNvPr id="110" name="TextBox 109">
+              <a:extLst>
+                <a:ext uri="{FF2B5EF4-FFF2-40B4-BE49-F238E27FC236}">
+                  <a16:creationId xmlns:a16="http://schemas.microsoft.com/office/drawing/2014/main" id="{E808DBBE-10AC-4D6F-AE17-5325C702CEC6}"/>
+                </a:ext>
+              </a:extLst>
+            </p:cNvPr>
+            <p:cNvSpPr txBox="1"/>
+            <p:nvPr/>
+          </p:nvSpPr>
+          <p:spPr>
+            <a:xfrm>
+              <a:off x="13083827" y="16609074"/>
+              <a:ext cx="2133655" cy="646331"/>
+            </a:xfrm>
+            <a:prstGeom prst="rect">
+              <a:avLst/>
+            </a:prstGeom>
+            <a:noFill/>
+          </p:spPr>
+          <p:txBody>
+            <a:bodyPr wrap="square" rtlCol="0">
+              <a:spAutoFit/>
+            </a:bodyPr>
+            <a:lstStyle/>
+            <a:p>
+              <a:pPr algn="ctr"/>
+              <a:r>
+                <a:rPr lang="en-US" dirty="0">
+                  <a:latin typeface="Lato" panose="020F0502020204030203" pitchFamily="34" charset="0"/>
+                </a:rPr>
+                <a:t>“Who’s Playing” indicators</a:t>
+              </a:r>
+              <a:endParaRPr lang="en-CA" dirty="0">
+                <a:latin typeface="Lato" panose="020F0502020204030203" pitchFamily="34" charset="0"/>
+              </a:endParaRPr>
+            </a:p>
+          </p:txBody>
+        </p:sp>
+        <p:sp>
+          <p:nvSpPr>
+            <p:cNvPr id="111" name="TextBox 110">
+              <a:extLst>
+                <a:ext uri="{FF2B5EF4-FFF2-40B4-BE49-F238E27FC236}">
+                  <a16:creationId xmlns:a16="http://schemas.microsoft.com/office/drawing/2014/main" id="{C616E66E-27D7-45F7-8287-395CBDFBFDE9}"/>
+                </a:ext>
+              </a:extLst>
+            </p:cNvPr>
+            <p:cNvSpPr txBox="1"/>
+            <p:nvPr/>
+          </p:nvSpPr>
+          <p:spPr>
+            <a:xfrm>
+              <a:off x="15261916" y="16092319"/>
+              <a:ext cx="2133655" cy="646331"/>
+            </a:xfrm>
+            <a:prstGeom prst="rect">
+              <a:avLst/>
+            </a:prstGeom>
+            <a:noFill/>
+          </p:spPr>
+          <p:txBody>
+            <a:bodyPr wrap="square" rtlCol="0">
+              <a:spAutoFit/>
+            </a:bodyPr>
+            <a:lstStyle/>
+            <a:p>
+              <a:pPr algn="ctr"/>
+              <a:r>
+                <a:rPr lang="en-US" dirty="0">
+                  <a:latin typeface="Lato" panose="020F0502020204030203" pitchFamily="34" charset="0"/>
+                </a:rPr>
+                <a:t>Neural</a:t>
+              </a:r>
+            </a:p>
+            <a:p>
+              <a:pPr algn="ctr"/>
+              <a:r>
+                <a:rPr lang="en-US" dirty="0">
+                  <a:latin typeface="Lato" panose="020F0502020204030203" pitchFamily="34" charset="0"/>
+                </a:rPr>
+                <a:t>Network</a:t>
+              </a:r>
+              <a:endParaRPr lang="en-CA" dirty="0">
+                <a:latin typeface="Lato" panose="020F0502020204030203" pitchFamily="34" charset="0"/>
+              </a:endParaRPr>
+            </a:p>
+          </p:txBody>
+        </p:sp>
+        <p:sp>
+          <p:nvSpPr>
+            <p:cNvPr id="112" name="TextBox 111">
+              <a:extLst>
+                <a:ext uri="{FF2B5EF4-FFF2-40B4-BE49-F238E27FC236}">
+                  <a16:creationId xmlns:a16="http://schemas.microsoft.com/office/drawing/2014/main" id="{AE571E21-55D1-4FBA-8984-075DBFF48AF5}"/>
+                </a:ext>
+              </a:extLst>
+            </p:cNvPr>
+            <p:cNvSpPr txBox="1"/>
+            <p:nvPr/>
+          </p:nvSpPr>
+          <p:spPr>
+            <a:xfrm>
+              <a:off x="17587081" y="16058848"/>
+              <a:ext cx="1234713" cy="646331"/>
+            </a:xfrm>
+            <a:prstGeom prst="rect">
+              <a:avLst/>
+            </a:prstGeom>
+            <a:noFill/>
+          </p:spPr>
+          <p:txBody>
+            <a:bodyPr wrap="square" rtlCol="0">
+              <a:spAutoFit/>
+            </a:bodyPr>
+            <a:lstStyle/>
+            <a:p>
+              <a:pPr algn="ctr"/>
+              <a:r>
+                <a:rPr lang="en-US" dirty="0">
+                  <a:latin typeface="Lato" panose="020F0502020204030203" pitchFamily="34" charset="0"/>
+                </a:rPr>
+                <a:t>Lineup</a:t>
+              </a:r>
+            </a:p>
+            <a:p>
+              <a:pPr algn="ctr"/>
+              <a:r>
+                <a:rPr lang="en-US" dirty="0">
+                  <a:latin typeface="Lato" panose="020F0502020204030203" pitchFamily="34" charset="0"/>
+                </a:rPr>
+                <a:t>indicators</a:t>
+              </a:r>
+              <a:endParaRPr lang="en-CA" dirty="0">
+                <a:latin typeface="Lato" panose="020F0502020204030203" pitchFamily="34" charset="0"/>
+              </a:endParaRPr>
+            </a:p>
+          </p:txBody>
+        </p:sp>
+        <p:sp>
+          <p:nvSpPr>
+            <p:cNvPr id="113" name="TextBox 112">
+              <a:extLst>
+                <a:ext uri="{FF2B5EF4-FFF2-40B4-BE49-F238E27FC236}">
+                  <a16:creationId xmlns:a16="http://schemas.microsoft.com/office/drawing/2014/main" id="{A6C43F66-9731-4BDD-A860-F7C4F8927B4E}"/>
+                </a:ext>
+              </a:extLst>
+            </p:cNvPr>
+            <p:cNvSpPr txBox="1"/>
+            <p:nvPr/>
+          </p:nvSpPr>
+          <p:spPr>
+            <a:xfrm>
+              <a:off x="15156389" y="15729890"/>
+              <a:ext cx="340956" cy="369332"/>
+            </a:xfrm>
+            <a:prstGeom prst="rect">
+              <a:avLst/>
+            </a:prstGeom>
+            <a:noFill/>
+          </p:spPr>
+          <p:txBody>
+            <a:bodyPr wrap="square" rtlCol="0">
+              <a:spAutoFit/>
+            </a:bodyPr>
+            <a:lstStyle/>
+            <a:p>
+              <a:pPr algn="ctr"/>
+              <a:r>
+                <a:rPr lang="en-US" dirty="0">
+                  <a:latin typeface="Lato" panose="020F0502020204030203" pitchFamily="34" charset="0"/>
+                </a:rPr>
+                <a:t>…</a:t>
+              </a:r>
+              <a:endParaRPr lang="en-CA" dirty="0">
+                <a:latin typeface="Lato" panose="020F0502020204030203" pitchFamily="34" charset="0"/>
+              </a:endParaRPr>
+            </a:p>
+          </p:txBody>
+        </p:sp>
+        <p:sp>
+          <p:nvSpPr>
+            <p:cNvPr id="114" name="TextBox 113">
+              <a:extLst>
+                <a:ext uri="{FF2B5EF4-FFF2-40B4-BE49-F238E27FC236}">
+                  <a16:creationId xmlns:a16="http://schemas.microsoft.com/office/drawing/2014/main" id="{03D1A768-5B11-4F10-A6DD-9129B88014D5}"/>
+                </a:ext>
+              </a:extLst>
+            </p:cNvPr>
+            <p:cNvSpPr txBox="1"/>
+            <p:nvPr/>
+          </p:nvSpPr>
+          <p:spPr>
+            <a:xfrm>
+              <a:off x="15166469" y="16668247"/>
+              <a:ext cx="340956" cy="369332"/>
+            </a:xfrm>
+            <a:prstGeom prst="rect">
+              <a:avLst/>
+            </a:prstGeom>
+            <a:noFill/>
+          </p:spPr>
+          <p:txBody>
+            <a:bodyPr wrap="square" rtlCol="0">
+              <a:spAutoFit/>
+            </a:bodyPr>
+            <a:lstStyle/>
+            <a:p>
+              <a:pPr algn="ctr"/>
+              <a:r>
+                <a:rPr lang="en-US" dirty="0">
+                  <a:latin typeface="Lato" panose="020F0502020204030203" pitchFamily="34" charset="0"/>
+                </a:rPr>
+                <a:t>…</a:t>
+              </a:r>
+              <a:endParaRPr lang="en-CA" dirty="0">
+                <a:latin typeface="Lato" panose="020F0502020204030203" pitchFamily="34" charset="0"/>
+              </a:endParaRPr>
+            </a:p>
+          </p:txBody>
+        </p:sp>
+        <p:sp>
+          <p:nvSpPr>
+            <p:cNvPr id="115" name="TextBox 114">
+              <a:extLst>
+                <a:ext uri="{FF2B5EF4-FFF2-40B4-BE49-F238E27FC236}">
+                  <a16:creationId xmlns:a16="http://schemas.microsoft.com/office/drawing/2014/main" id="{B25D524C-2CC1-40F3-BF8B-9F43916B1A3D}"/>
+                </a:ext>
+              </a:extLst>
+            </p:cNvPr>
+            <p:cNvSpPr txBox="1"/>
+            <p:nvPr/>
+          </p:nvSpPr>
+          <p:spPr>
+            <a:xfrm>
+              <a:off x="17188301" y="16149201"/>
+              <a:ext cx="340956" cy="369332"/>
+            </a:xfrm>
+            <a:prstGeom prst="rect">
+              <a:avLst/>
+            </a:prstGeom>
+            <a:noFill/>
+          </p:spPr>
+          <p:txBody>
+            <a:bodyPr wrap="square" rtlCol="0">
+              <a:spAutoFit/>
+            </a:bodyPr>
+            <a:lstStyle/>
+            <a:p>
+              <a:pPr algn="ctr"/>
+              <a:r>
+                <a:rPr lang="en-US" dirty="0">
+                  <a:latin typeface="Lato" panose="020F0502020204030203" pitchFamily="34" charset="0"/>
+                </a:rPr>
+                <a:t>…</a:t>
+              </a:r>
+              <a:endParaRPr lang="en-CA" dirty="0">
+                <a:latin typeface="Lato" panose="020F0502020204030203" pitchFamily="34" charset="0"/>
+              </a:endParaRPr>
+            </a:p>
+          </p:txBody>
+        </p:sp>
+      </p:grpSp>
       <p:sp>
         <p:nvSpPr>
           <p:cNvPr id="47" name="TextBox 46">
@@ -7411,8 +7434,8 @@
         </p:nvSpPr>
         <p:spPr>
           <a:xfrm>
-            <a:off x="11517172" y="21397532"/>
-            <a:ext cx="10038915" cy="3570208"/>
+            <a:off x="11575228" y="21226082"/>
+            <a:ext cx="10038915" cy="3077766"/>
           </a:xfrm>
           <a:prstGeom prst="rect">
             <a:avLst/>
@@ -7431,13 +7454,13 @@
               </a:spcAft>
             </a:pPr>
             <a:r>
-              <a:rPr lang="en-US" sz="2400" b="1" dirty="0">
+              <a:rPr lang="en-US" sz="2300" b="1" dirty="0">
                 <a:latin typeface="Lato" panose="020F0502020204030203" pitchFamily="34" charset="0"/>
               </a:rPr>
               <a:t>System 1 </a:t>
             </a:r>
             <a:r>
-              <a:rPr lang="en-US" sz="2400" dirty="0">
+              <a:rPr lang="en-US" sz="2300" dirty="0">
                 <a:latin typeface="Lato" panose="020F0502020204030203" pitchFamily="34" charset="0"/>
               </a:rPr>
               <a:t>is unrelated to the neural network and computes the players' "scores" with a simple function. The scores roughly represent how good the players are at scoring fantasy points.</a:t>
@@ -7445,13 +7468,13 @@
           </a:p>
           <a:p>
             <a:r>
-              <a:rPr lang="en-US" sz="2400" b="1" dirty="0">
+              <a:rPr lang="en-US" sz="2300" b="1" dirty="0">
                 <a:latin typeface="Lato" panose="020F0502020204030203" pitchFamily="34" charset="0"/>
               </a:rPr>
               <a:t>System 2</a:t>
             </a:r>
             <a:r>
-              <a:rPr lang="en-US" sz="2400" dirty="0">
+              <a:rPr lang="en-US" sz="2300" dirty="0">
                 <a:latin typeface="Lato" panose="020F0502020204030203" pitchFamily="34" charset="0"/>
               </a:rPr>
               <a:t>, the neural network, now computes the “game scores” of players: a prediction of how many fantasy points they will get in a specific game. The NN is trained and tested on single matches, with far fewer inputs (42). The inputs are the players’ season scores and their recent scores, both computed by System 1. These inputs are sorted by position, as can be seen below:</a:t>
@@ -7487,8 +7510,8 @@
         </p:blipFill>
         <p:spPr>
           <a:xfrm>
-            <a:off x="12483569" y="20156496"/>
-            <a:ext cx="7778432" cy="1066667"/>
+            <a:off x="12293974" y="20099346"/>
+            <a:ext cx="8185682" cy="1066667"/>
           </a:xfrm>
           <a:prstGeom prst="rect">
             <a:avLst/>
@@ -7509,8 +7532,8 @@
         </p:nvSpPr>
         <p:spPr>
           <a:xfrm>
-            <a:off x="11959002" y="20489288"/>
-            <a:ext cx="628093" cy="646331"/>
+            <a:off x="11722220" y="20393103"/>
+            <a:ext cx="772982" cy="369332"/>
           </a:xfrm>
           <a:prstGeom prst="rect">
             <a:avLst/>
@@ -7549,8 +7572,8 @@
         </p:nvSpPr>
         <p:spPr>
           <a:xfrm>
-            <a:off x="20129450" y="20489289"/>
-            <a:ext cx="1098163" cy="369332"/>
+            <a:off x="20397056" y="20413088"/>
+            <a:ext cx="1110853" cy="369332"/>
           </a:xfrm>
           <a:prstGeom prst="rect">
             <a:avLst/>
@@ -7589,8 +7612,8 @@
         </p:nvSpPr>
         <p:spPr>
           <a:xfrm>
-            <a:off x="13338211" y="20319350"/>
-            <a:ext cx="1422400" cy="923330"/>
+            <a:off x="13148615" y="20262200"/>
+            <a:ext cx="1535753" cy="646331"/>
           </a:xfrm>
           <a:prstGeom prst="rect">
             <a:avLst/>
@@ -7639,8 +7662,8 @@
         </p:nvSpPr>
         <p:spPr>
           <a:xfrm>
-            <a:off x="15661585" y="20358786"/>
-            <a:ext cx="1422400" cy="923330"/>
+            <a:off x="15529141" y="20301636"/>
+            <a:ext cx="1711732" cy="646331"/>
           </a:xfrm>
           <a:prstGeom prst="rect">
             <a:avLst/>
@@ -7689,8 +7712,8 @@
         </p:nvSpPr>
         <p:spPr>
           <a:xfrm>
-            <a:off x="17989176" y="20350789"/>
-            <a:ext cx="1422400" cy="646331"/>
+            <a:off x="18085645" y="20293639"/>
+            <a:ext cx="1471839" cy="646331"/>
           </a:xfrm>
           <a:prstGeom prst="rect">
             <a:avLst/>
@@ -7739,8 +7762,8 @@
         </p:nvSpPr>
         <p:spPr>
           <a:xfrm>
-            <a:off x="11576356" y="27459603"/>
-            <a:ext cx="9954303" cy="6093976"/>
+            <a:off x="11591717" y="27098379"/>
+            <a:ext cx="9954303" cy="5509200"/>
           </a:xfrm>
           <a:prstGeom prst="rect">
             <a:avLst/>
@@ -7754,14 +7777,14 @@
           <a:lstStyle/>
           <a:p>
             <a:r>
-              <a:rPr lang="en-US" sz="2400" dirty="0">
+              <a:rPr lang="en-US" sz="2300" dirty="0">
                 <a:latin typeface="Lato" panose="020F0502020204030203" pitchFamily="34" charset="0"/>
               </a:rPr>
               <a:t>This network is not tied to specific players. We lose this information, but in turn we get to train this on all NBA matches, not just the ones with active players. As well, now that we test matches individually, they are independent, and there is no correlation. We have solved the first three limitations!</a:t>
             </a:r>
           </a:p>
           <a:p>
-            <a:endParaRPr lang="en-US" sz="2400" dirty="0">
+            <a:endParaRPr lang="en-US" sz="2300" dirty="0">
               <a:latin typeface="Lato" panose="020F0502020204030203" pitchFamily="34" charset="0"/>
             </a:endParaRPr>
           </a:p>
@@ -7772,13 +7795,13 @@
               </a:spcAft>
             </a:pPr>
             <a:r>
-              <a:rPr lang="en-US" sz="2400" b="1" dirty="0">
+              <a:rPr lang="en-US" sz="2300" b="1" dirty="0">
                 <a:latin typeface="Lato" panose="020F0502020204030203" pitchFamily="34" charset="0"/>
               </a:rPr>
               <a:t>System 3 </a:t>
             </a:r>
             <a:r>
-              <a:rPr lang="en-US" sz="2400" dirty="0">
+              <a:rPr lang="en-US" sz="2300" dirty="0">
                 <a:latin typeface="Lato" panose="020F0502020204030203" pitchFamily="34" charset="0"/>
               </a:rPr>
               <a:t>solves the fourth limitation: the salary constraint problem. </a:t>
@@ -7791,7 +7814,7 @@
               </a:spcAft>
             </a:pPr>
             <a:r>
-              <a:rPr lang="en-US" sz="2400" dirty="0">
+              <a:rPr lang="en-US" sz="2300" dirty="0">
                 <a:latin typeface="Lato" panose="020F0502020204030203" pitchFamily="34" charset="0"/>
               </a:rPr>
               <a:t>Given a bunch of players with scores, positions, and salaries, under positional constraints and a salary budget, pick a lineup to maximize the total score.</a:t>
@@ -7804,19 +7827,19 @@
               </a:spcAft>
             </a:pPr>
             <a:r>
-              <a:rPr lang="en-US" sz="2400" dirty="0">
+              <a:rPr lang="en-US" sz="2300" dirty="0">
                 <a:latin typeface="Lato" panose="020F0502020204030203" pitchFamily="34" charset="0"/>
               </a:rPr>
               <a:t>We solved this problem using a Python library called </a:t>
             </a:r>
             <a:r>
-              <a:rPr lang="en-US" sz="2400" dirty="0" err="1">
+              <a:rPr lang="en-US" sz="2300" dirty="0" err="1">
                 <a:latin typeface="Lato" panose="020F0502020204030203" pitchFamily="34" charset="0"/>
               </a:rPr>
               <a:t>PuLP</a:t>
             </a:r>
             <a:r>
-              <a:rPr lang="en-US" sz="2400" dirty="0">
+              <a:rPr lang="en-US" sz="2300" dirty="0">
                 <a:latin typeface="Lato" panose="020F0502020204030203" pitchFamily="34" charset="0"/>
               </a:rPr>
               <a:t> – a linear programming optimization solver.</a:t>
@@ -7824,17 +7847,12 @@
           </a:p>
           <a:p>
             <a:r>
-              <a:rPr lang="en-US" sz="2400" dirty="0">
+              <a:rPr lang="en-US" sz="2300" dirty="0">
                 <a:latin typeface="Lato" panose="020F0502020204030203" pitchFamily="34" charset="0"/>
               </a:rPr>
               <a:t>We were then able to get multiple lineups by adding random Gaussian noise to the outputs of the NN before feeding them to the LP problem.</a:t>
             </a:r>
-            <a:endParaRPr lang="en-CA" sz="2400" dirty="0">
-              <a:latin typeface="Lato" panose="020F0502020204030203" pitchFamily="34" charset="0"/>
-            </a:endParaRPr>
-          </a:p>
-          <a:p>
-            <a:endParaRPr lang="en-CA" sz="2400" dirty="0">
+            <a:endParaRPr lang="en-CA" sz="2300" dirty="0">
               <a:latin typeface="Lato" panose="020F0502020204030203" pitchFamily="34" charset="0"/>
             </a:endParaRPr>
           </a:p>
@@ -7854,7 +7872,7 @@
         </p:nvGrpSpPr>
         <p:grpSpPr>
           <a:xfrm>
-            <a:off x="13175108" y="24656812"/>
+            <a:off x="13233164" y="24428212"/>
             <a:ext cx="6271206" cy="2505790"/>
             <a:chOff x="13454912" y="24270148"/>
             <a:chExt cx="6271206" cy="2505790"/>
@@ -7911,7 +7929,7 @@
           <p:spPr>
             <a:xfrm>
               <a:off x="13466694" y="24668578"/>
-              <a:ext cx="1140199" cy="1200329"/>
+              <a:ext cx="1140199" cy="830997"/>
             </a:xfrm>
             <a:prstGeom prst="rect">
               <a:avLst/>
@@ -7926,12 +7944,12 @@
             <a:p>
               <a:pPr algn="ctr"/>
               <a:r>
-                <a:rPr lang="en-US" dirty="0">
+                <a:rPr lang="en-US" sz="1600" dirty="0">
                   <a:latin typeface="Lato" panose="020F0502020204030203" pitchFamily="34" charset="0"/>
                 </a:rPr>
                 <a:t>Inputs for 7 Team A Players</a:t>
               </a:r>
-              <a:endParaRPr lang="en-CA" dirty="0">
+              <a:endParaRPr lang="en-CA" sz="1600" dirty="0">
                 <a:latin typeface="Lato" panose="020F0502020204030203" pitchFamily="34" charset="0"/>
               </a:endParaRPr>
             </a:p>
@@ -7952,7 +7970,7 @@
           <p:spPr>
             <a:xfrm>
               <a:off x="13454912" y="25626670"/>
-              <a:ext cx="1208523" cy="923330"/>
+              <a:ext cx="1208523" cy="830997"/>
             </a:xfrm>
             <a:prstGeom prst="rect">
               <a:avLst/>
@@ -7967,12 +7985,12 @@
             <a:p>
               <a:pPr algn="ctr"/>
               <a:r>
-                <a:rPr lang="en-US" dirty="0">
+                <a:rPr lang="en-US" sz="1600" dirty="0">
                   <a:latin typeface="Lato" panose="020F0502020204030203" pitchFamily="34" charset="0"/>
                 </a:rPr>
                 <a:t>Inputs for 7 Team B Players</a:t>
               </a:r>
-              <a:endParaRPr lang="en-CA" dirty="0">
+              <a:endParaRPr lang="en-CA" sz="1600" dirty="0">
                 <a:latin typeface="Lato" panose="020F0502020204030203" pitchFamily="34" charset="0"/>
               </a:endParaRPr>
             </a:p>
@@ -7992,7 +8010,7 @@
           </p:nvSpPr>
           <p:spPr>
             <a:xfrm>
-              <a:off x="14526879" y="24270148"/>
+              <a:off x="14290659" y="24270148"/>
               <a:ext cx="1908891" cy="369332"/>
             </a:xfrm>
             <a:prstGeom prst="rect">
@@ -8394,8 +8412,8 @@
           </p:nvSpPr>
           <p:spPr>
             <a:xfrm>
-              <a:off x="17850593" y="24900828"/>
-              <a:ext cx="1803549" cy="338554"/>
+              <a:off x="17806143" y="24900828"/>
+              <a:ext cx="1853587" cy="338554"/>
             </a:xfrm>
             <a:prstGeom prst="rect">
               <a:avLst/>
@@ -8434,7 +8452,7 @@
           </p:nvSpPr>
           <p:spPr>
             <a:xfrm>
-              <a:off x="17850592" y="25130243"/>
+              <a:off x="17818842" y="25130243"/>
               <a:ext cx="1803549" cy="338554"/>
             </a:xfrm>
             <a:prstGeom prst="rect">
@@ -8474,7 +8492,7 @@
           </p:nvSpPr>
           <p:spPr>
             <a:xfrm>
-              <a:off x="17850591" y="25641407"/>
+              <a:off x="17818841" y="25666807"/>
               <a:ext cx="1803549" cy="338554"/>
             </a:xfrm>
             <a:prstGeom prst="rect">
@@ -8514,7 +8532,7 @@
           </p:nvSpPr>
           <p:spPr>
             <a:xfrm>
-              <a:off x="17850591" y="25913840"/>
+              <a:off x="17818841" y="25945590"/>
               <a:ext cx="1803549" cy="338554"/>
             </a:xfrm>
             <a:prstGeom prst="rect">
@@ -8702,8 +8720,8 @@
           </p:txBody>
         </p:sp>
       </p:grpSp>
-      <mc:AlternateContent xmlns:mc="http://schemas.openxmlformats.org/markup-compatibility/2006">
-        <mc:Choice xmlns:a14="http://schemas.microsoft.com/office/drawing/2010/main" Requires="a14">
+      <mc:AlternateContent xmlns:mc="http://schemas.openxmlformats.org/markup-compatibility/2006" xmlns:a14="http://schemas.microsoft.com/office/drawing/2010/main">
+        <mc:Choice Requires="a14">
           <p:sp>
             <p:nvSpPr>
               <p:cNvPr id="150" name="TextBox 149">
@@ -8719,7 +8737,7 @@
             <p:spPr>
               <a:xfrm>
                 <a:off x="22419404" y="5270196"/>
-                <a:ext cx="10348275" cy="3901517"/>
+                <a:ext cx="10348275" cy="3978461"/>
               </a:xfrm>
               <a:prstGeom prst="rect">
                 <a:avLst/>
@@ -8732,6 +8750,11 @@
               </a:bodyPr>
               <a:lstStyle/>
               <a:p>
+                <a:pPr>
+                  <a:spcAft>
+                    <a:spcPts val="600"/>
+                  </a:spcAft>
+                </a:pPr>
                 <a:r>
                   <a:rPr lang="en-US" sz="2400" dirty="0">
                     <a:latin typeface="Lato" panose="020F0502020204030203" pitchFamily="34" charset="0"/>
@@ -8748,7 +8771,7 @@
                     </m:oMathParaPr>
                     <m:oMath xmlns:m="http://schemas.openxmlformats.org/officeDocument/2006/math">
                       <m:r>
-                        <a:rPr lang="en-US" sz="2400" b="0" i="1" smtClean="0">
+                        <a:rPr lang="en-US" sz="2000" b="0" i="1" smtClean="0">
                           <a:latin typeface="Cambria Math" panose="02040503050406030204" pitchFamily="18" charset="0"/>
                         </a:rPr>
                         <m:t>𝑆𝑢𝑐𝑒𝑠𝑠</m:t>
@@ -8756,14 +8779,14 @@
                       <m:d>
                         <m:dPr>
                           <m:ctrlPr>
-                            <a:rPr lang="en-US" sz="2400" b="0" i="1" smtClean="0">
+                            <a:rPr lang="en-US" sz="2000" b="0" i="1" smtClean="0">
                               <a:latin typeface="Cambria Math" panose="02040503050406030204" pitchFamily="18" charset="0"/>
                             </a:rPr>
                           </m:ctrlPr>
                         </m:dPr>
                         <m:e>
                           <m:r>
-                            <a:rPr lang="en-US" sz="2400" b="0" i="1" smtClean="0">
+                            <a:rPr lang="en-US" sz="2000" b="0" i="1" smtClean="0">
                               <a:latin typeface="Cambria Math" panose="02040503050406030204" pitchFamily="18" charset="0"/>
                             </a:rPr>
                             <m:t>𝑙𝑖𝑛𝑒𝑢𝑝</m:t>
@@ -8771,7 +8794,7 @@
                         </m:e>
                       </m:d>
                       <m:r>
-                        <a:rPr lang="en-US" sz="2400" b="0" i="1" smtClean="0">
+                        <a:rPr lang="en-US" sz="2000" b="0" i="1" smtClean="0">
                           <a:latin typeface="Cambria Math" panose="02040503050406030204" pitchFamily="18" charset="0"/>
                         </a:rPr>
                         <m:t>= </m:t>
@@ -8779,14 +8802,14 @@
                       <m:f>
                         <m:fPr>
                           <m:ctrlPr>
-                            <a:rPr lang="en-US" sz="2400" b="0" i="1" smtClean="0">
+                            <a:rPr lang="en-US" sz="2000" b="0" i="1" smtClean="0">
                               <a:latin typeface="Cambria Math" panose="02040503050406030204" pitchFamily="18" charset="0"/>
                             </a:rPr>
                           </m:ctrlPr>
                         </m:fPr>
                         <m:num>
                           <m:r>
-                            <a:rPr lang="en-US" sz="2400" b="0" i="1" smtClean="0">
+                            <a:rPr lang="en-US" sz="2000" b="0" i="1" smtClean="0">
                               <a:latin typeface="Cambria Math" panose="02040503050406030204" pitchFamily="18" charset="0"/>
                             </a:rPr>
                             <m:t>𝑙𝑖𝑛𝑒𝑢</m:t>
@@ -8794,14 +8817,14 @@
                           <m:sSup>
                             <m:sSupPr>
                               <m:ctrlPr>
-                                <a:rPr lang="en-US" sz="2400" b="0" i="1" smtClean="0">
+                                <a:rPr lang="en-US" sz="2000" b="0" i="1" smtClean="0">
                                   <a:latin typeface="Cambria Math" panose="02040503050406030204" pitchFamily="18" charset="0"/>
                                 </a:rPr>
                               </m:ctrlPr>
                             </m:sSupPr>
                             <m:e>
                               <m:r>
-                                <a:rPr lang="en-US" sz="2400" b="0" i="1" smtClean="0">
+                                <a:rPr lang="en-US" sz="2000" b="0" i="1" smtClean="0">
                                   <a:latin typeface="Cambria Math" panose="02040503050406030204" pitchFamily="18" charset="0"/>
                                 </a:rPr>
                                 <m:t>𝑝</m:t>
@@ -8809,7 +8832,7 @@
                             </m:e>
                             <m:sup>
                               <m:r>
-                                <a:rPr lang="en-US" sz="2400" b="0" i="1" smtClean="0">
+                                <a:rPr lang="en-US" sz="2000" b="0" i="1" smtClean="0">
                                   <a:latin typeface="Cambria Math" panose="02040503050406030204" pitchFamily="18" charset="0"/>
                                 </a:rPr>
                                 <m:t>′</m:t>
@@ -8817,31 +8840,31 @@
                             </m:sup>
                           </m:sSup>
                           <m:r>
-                            <a:rPr lang="en-US" sz="2400" b="0" i="1" smtClean="0">
+                            <a:rPr lang="en-US" sz="2000" b="0" i="1" smtClean="0">
                               <a:latin typeface="Cambria Math" panose="02040503050406030204" pitchFamily="18" charset="0"/>
                             </a:rPr>
                             <m:t>𝑠</m:t>
                           </m:r>
                           <m:r>
-                            <a:rPr lang="en-US" sz="2400" b="0" i="1" smtClean="0">
+                            <a:rPr lang="en-US" sz="2000" b="0" i="1" smtClean="0">
                               <a:latin typeface="Cambria Math" panose="02040503050406030204" pitchFamily="18" charset="0"/>
                             </a:rPr>
                             <m:t> </m:t>
                           </m:r>
                           <m:r>
-                            <a:rPr lang="en-US" sz="2400" b="0" i="1" smtClean="0">
+                            <a:rPr lang="en-US" sz="2000" b="0" i="1" smtClean="0">
                               <a:latin typeface="Cambria Math" panose="02040503050406030204" pitchFamily="18" charset="0"/>
                             </a:rPr>
                             <m:t>𝑓𝑎𝑛𝑡𝑎𝑠𝑦</m:t>
                           </m:r>
                           <m:r>
-                            <a:rPr lang="en-US" sz="2400" b="0" i="1" smtClean="0">
+                            <a:rPr lang="en-US" sz="2000" b="0" i="1" smtClean="0">
                               <a:latin typeface="Cambria Math" panose="02040503050406030204" pitchFamily="18" charset="0"/>
                             </a:rPr>
                             <m:t> </m:t>
                           </m:r>
                           <m:r>
-                            <a:rPr lang="en-US" sz="2400" b="0" i="1" smtClean="0">
+                            <a:rPr lang="en-US" sz="2000" b="0" i="1" smtClean="0">
                               <a:latin typeface="Cambria Math" panose="02040503050406030204" pitchFamily="18" charset="0"/>
                             </a:rPr>
                             <m:t>𝑠𝑐𝑜𝑟𝑒</m:t>
@@ -8849,19 +8872,19 @@
                         </m:num>
                         <m:den>
                           <m:r>
-                            <a:rPr lang="en-US" sz="2400" b="0" i="1" smtClean="0">
+                            <a:rPr lang="en-US" sz="2000" b="0" i="1" smtClean="0">
                               <a:latin typeface="Cambria Math" panose="02040503050406030204" pitchFamily="18" charset="0"/>
                             </a:rPr>
                             <m:t>𝑏𝑒𝑠𝑡</m:t>
                           </m:r>
                           <m:r>
-                            <a:rPr lang="en-US" sz="2400" b="0" i="1" smtClean="0">
+                            <a:rPr lang="en-US" sz="2000" b="0" i="1" smtClean="0">
                               <a:latin typeface="Cambria Math" panose="02040503050406030204" pitchFamily="18" charset="0"/>
                             </a:rPr>
                             <m:t> </m:t>
                           </m:r>
                           <m:r>
-                            <a:rPr lang="en-US" sz="2400" b="0" i="1" smtClean="0">
+                            <a:rPr lang="en-US" sz="2000" b="0" i="1" smtClean="0">
                               <a:latin typeface="Cambria Math" panose="02040503050406030204" pitchFamily="18" charset="0"/>
                             </a:rPr>
                             <m:t>𝑙𝑖𝑛𝑒𝑢</m:t>
@@ -8869,14 +8892,14 @@
                           <m:sSup>
                             <m:sSupPr>
                               <m:ctrlPr>
-                                <a:rPr lang="en-US" sz="2400" b="0" i="1" smtClean="0">
+                                <a:rPr lang="en-US" sz="2000" b="0" i="1" smtClean="0">
                                   <a:latin typeface="Cambria Math" panose="02040503050406030204" pitchFamily="18" charset="0"/>
                                 </a:rPr>
                               </m:ctrlPr>
                             </m:sSupPr>
                             <m:e>
                               <m:r>
-                                <a:rPr lang="en-US" sz="2400" b="0" i="1" smtClean="0">
+                                <a:rPr lang="en-US" sz="2000" b="0" i="1" smtClean="0">
                                   <a:latin typeface="Cambria Math" panose="02040503050406030204" pitchFamily="18" charset="0"/>
                                 </a:rPr>
                                 <m:t>𝑝</m:t>
@@ -8884,7 +8907,7 @@
                             </m:e>
                             <m:sup>
                               <m:r>
-                                <a:rPr lang="en-US" sz="2400" b="0" i="1" smtClean="0">
+                                <a:rPr lang="en-US" sz="2000" b="0" i="1" smtClean="0">
                                   <a:latin typeface="Cambria Math" panose="02040503050406030204" pitchFamily="18" charset="0"/>
                                 </a:rPr>
                                 <m:t>′</m:t>
@@ -8892,19 +8915,19 @@
                             </m:sup>
                           </m:sSup>
                           <m:r>
-                            <a:rPr lang="en-US" sz="2400" b="0" i="1" smtClean="0">
+                            <a:rPr lang="en-US" sz="2000" b="0" i="1" smtClean="0">
                               <a:latin typeface="Cambria Math" panose="02040503050406030204" pitchFamily="18" charset="0"/>
                             </a:rPr>
                             <m:t>𝑠</m:t>
                           </m:r>
                           <m:r>
-                            <a:rPr lang="en-US" sz="2400" b="0" i="1" smtClean="0">
+                            <a:rPr lang="en-US" sz="2000" b="0" i="1" smtClean="0">
                               <a:latin typeface="Cambria Math" panose="02040503050406030204" pitchFamily="18" charset="0"/>
                             </a:rPr>
                             <m:t> </m:t>
                           </m:r>
                           <m:r>
-                            <a:rPr lang="en-US" sz="2400" b="0" i="1" smtClean="0">
+                            <a:rPr lang="en-US" sz="2000" b="0" i="1" smtClean="0">
                               <a:latin typeface="Cambria Math" panose="02040503050406030204" pitchFamily="18" charset="0"/>
                             </a:rPr>
                             <m:t>𝑠𝑐𝑜𝑟𝑒</m:t>
@@ -8928,7 +8951,7 @@
                   <a:rPr lang="en-US" sz="2400" dirty="0">
                     <a:latin typeface="Lato" panose="020F0502020204030203" pitchFamily="34" charset="0"/>
                   </a:rPr>
-                  <a:t>By looking at current competitions, we determined that this heuristic implies profitability at around 80% and greater. In other words, if we can score 80% of the maximum possible score, we can win. The figure below shows this relationship, where the last winning score is roughly 79</a:t>
+                  <a:t>By looking at competitions, we determined that this heuristic implies profitability at around 80% and greater. In other words, if we can score 80% of the maximum possible score, we can win. The figure below shows this relationship, where the last winning score is roughly 79</a:t>
                 </a:r>
                 <a:r>
                   <a:rPr lang="en-CA" sz="2400" dirty="0">
@@ -8943,7 +8966,7 @@
             </p:txBody>
           </p:sp>
         </mc:Choice>
-        <mc:Fallback>
+        <mc:Fallback xmlns="">
           <p:sp>
             <p:nvSpPr>
               <p:cNvPr id="150" name="TextBox 149">
@@ -8961,7 +8984,7 @@
             <p:spPr>
               <a:xfrm>
                 <a:off x="22419404" y="5270196"/>
-                <a:ext cx="10348275" cy="3901517"/>
+                <a:ext cx="10348275" cy="3978461"/>
               </a:xfrm>
               <a:prstGeom prst="rect">
                 <a:avLst/>
@@ -8969,7 +8992,7 @@
               <a:blipFill>
                 <a:blip r:embed="rId14"/>
                 <a:stretch>
-                  <a:fillRect l="-943" t="-1250" r="-943" b="-2656"/>
+                  <a:fillRect l="-943" t="-1074" r="-1650"/>
                 </a:stretch>
               </a:blipFill>
             </p:spPr>
@@ -8978,7 +9001,7 @@
               <a:lstStyle/>
               <a:p>
                 <a:r>
-                  <a:rPr lang="en-US">
+                  <a:rPr lang="en-CA">
                     <a:noFill/>
                   </a:rPr>
                   <a:t> </a:t>
@@ -9002,8 +9025,8 @@
         </p:nvSpPr>
         <p:spPr>
           <a:xfrm>
-            <a:off x="33415653" y="5440574"/>
-            <a:ext cx="9862558" cy="4231928"/>
+            <a:off x="33415652" y="5440574"/>
+            <a:ext cx="10062733" cy="3862596"/>
           </a:xfrm>
           <a:prstGeom prst="rect">
             <a:avLst/>
@@ -9037,7 +9060,7 @@
               <a:rPr lang="en-US" sz="2400" dirty="0">
                 <a:latin typeface="Lato" panose="020F0502020204030203" pitchFamily="34" charset="0"/>
               </a:rPr>
-              <a:t>Figure out noise better</a:t>
+              <a:t>Add additional valuable features</a:t>
             </a:r>
           </a:p>
           <a:p>
@@ -9049,7 +9072,7 @@
               <a:rPr lang="en-US" sz="2400" dirty="0">
                 <a:latin typeface="Lato" panose="020F0502020204030203" pitchFamily="34" charset="0"/>
               </a:rPr>
-              <a:t>Add additional valuable features</a:t>
+              <a:t>Define a better score function</a:t>
             </a:r>
           </a:p>
           <a:p>
@@ -9061,7 +9084,7 @@
               <a:rPr lang="en-US" sz="2400" dirty="0">
                 <a:latin typeface="Lato" panose="020F0502020204030203" pitchFamily="34" charset="0"/>
               </a:rPr>
-              <a:t>Define a better score function</a:t>
+              <a:t>Perform more cross-validation (e.g. on data amount used)</a:t>
             </a:r>
           </a:p>
           <a:p>
@@ -9073,19 +9096,7 @@
               <a:rPr lang="en-US" sz="2400" dirty="0">
                 <a:latin typeface="Lato" panose="020F0502020204030203" pitchFamily="34" charset="0"/>
               </a:rPr>
-              <a:t>Perform more thorough cross-validation (e.g. on data amount used)</a:t>
-            </a:r>
-          </a:p>
-          <a:p>
-            <a:pPr marL="800100" lvl="1" indent="-342900">
-              <a:buFont typeface="Arial" panose="020B0604020202020204" pitchFamily="34" charset="0"/>
-              <a:buChar char="•"/>
-            </a:pPr>
-            <a:r>
-              <a:rPr lang="en-US" sz="2400" dirty="0">
-                <a:latin typeface="Lato" panose="020F0502020204030203" pitchFamily="34" charset="0"/>
-              </a:rPr>
-              <a:t>Performing Boosting or Bagging</a:t>
+              <a:t>Performing Boosting and/or Bagging</a:t>
             </a:r>
           </a:p>
           <a:p>
@@ -9128,7 +9139,7 @@
         </p:nvSpPr>
         <p:spPr>
           <a:xfrm>
-            <a:off x="33251182" y="30655278"/>
+            <a:off x="33194032" y="30521928"/>
             <a:ext cx="10366876" cy="2308324"/>
           </a:xfrm>
           <a:prstGeom prst="rect">
@@ -9241,7 +9252,7 @@
         <p:spPr>
           <a:xfrm>
             <a:off x="14417628" y="1783948"/>
-            <a:ext cx="15055944" cy="1323439"/>
+            <a:ext cx="15055944" cy="1200329"/>
           </a:xfrm>
           <a:prstGeom prst="rect">
             <a:avLst/>
@@ -9256,19 +9267,19 @@
           <a:p>
             <a:pPr algn="ctr"/>
             <a:r>
-              <a:rPr lang="en-US" sz="4000" dirty="0">
+              <a:rPr lang="en-US" sz="3600" dirty="0">
                 <a:latin typeface="Lato" panose="020F0502020204030203" pitchFamily="34" charset="0"/>
               </a:rPr>
               <a:t>Authors: Ege Aydede, Stephen Poole, Florence </a:t>
             </a:r>
             <a:r>
-              <a:rPr lang="en-US" sz="4000" dirty="0" err="1">
+              <a:rPr lang="en-US" sz="3600" dirty="0" err="1">
                 <a:latin typeface="Lato" panose="020F0502020204030203" pitchFamily="34" charset="0"/>
               </a:rPr>
               <a:t>Regol</a:t>
             </a:r>
             <a:r>
-              <a:rPr lang="en-US" sz="4000" dirty="0">
+              <a:rPr lang="en-US" sz="3600" dirty="0">
                 <a:latin typeface="Lato" panose="020F0502020204030203" pitchFamily="34" charset="0"/>
               </a:rPr>
               <a:t>, Asher Wright</a:t>
@@ -9277,18 +9288,18 @@
           <a:p>
             <a:pPr algn="ctr"/>
             <a:r>
-              <a:rPr lang="en-US" sz="4000" dirty="0">
+              <a:rPr lang="en-US" sz="3600" dirty="0">
                 <a:latin typeface="Lato" panose="020F0502020204030203" pitchFamily="34" charset="0"/>
               </a:rPr>
               <a:t>Supervisor: Dr. </a:t>
             </a:r>
             <a:r>
-              <a:rPr lang="en-US" sz="4000" dirty="0" err="1">
+              <a:rPr lang="en-US" sz="3600" dirty="0" err="1">
                 <a:latin typeface="Lato" panose="020F0502020204030203" pitchFamily="34" charset="0"/>
               </a:rPr>
               <a:t>Psaromiligkos</a:t>
             </a:r>
-            <a:endParaRPr lang="en-CA" sz="4000" dirty="0">
+            <a:endParaRPr lang="en-CA" sz="3600" dirty="0">
               <a:latin typeface="Lato" panose="020F0502020204030203" pitchFamily="34" charset="0"/>
             </a:endParaRPr>
           </a:p>
@@ -9322,7 +9333,7 @@
         </p:blipFill>
         <p:spPr>
           <a:xfrm>
-            <a:off x="24200475" y="9225744"/>
+            <a:off x="24200475" y="9162244"/>
             <a:ext cx="6383507" cy="1174437"/>
           </a:xfrm>
           <a:prstGeom prst="rect">
@@ -9344,8 +9355,8 @@
         </p:nvSpPr>
         <p:spPr>
           <a:xfrm>
-            <a:off x="22493821" y="10410992"/>
-            <a:ext cx="9990505" cy="6524863"/>
+            <a:off x="22530061" y="10399153"/>
+            <a:ext cx="9990505" cy="6309420"/>
           </a:xfrm>
           <a:prstGeom prst="rect">
             <a:avLst/>
@@ -9362,7 +9373,7 @@
               <a:rPr lang="en-US" sz="2400" dirty="0">
                 <a:latin typeface="Lato" panose="020F0502020204030203" pitchFamily="34" charset="0"/>
               </a:rPr>
-              <a:t>In order to improve performance, we performed cross-validation – a method of selecting the best hyperparameters of our NN. These hyperparameters include the number of hidden nodes, hidden layers, and the learning rate. This is a computationally heavy process, and so we rented a GPU from </a:t>
+              <a:t>In order to improve this metric (started at ~60%), we performed cross-validation – a method of selecting the best hyperparameters of our NN. These hyperparameters include the number of hidden nodes, hidden layers, and the learning rate. This is a computationally heavy process, and so we rented a GPU from </a:t>
             </a:r>
             <a:r>
               <a:rPr lang="en-US" sz="2400" dirty="0" err="1">
@@ -9387,11 +9398,11 @@
             </a:endParaRPr>
           </a:p>
           <a:p>
-            <a:endParaRPr lang="en-US" sz="2400" dirty="0">
-              <a:latin typeface="Lato" panose="020F0502020204030203" pitchFamily="34" charset="0"/>
-            </a:endParaRPr>
-          </a:p>
-          <a:p>
+            <a:pPr>
+              <a:spcBef>
+                <a:spcPts val="1200"/>
+              </a:spcBef>
+            </a:pPr>
             <a:r>
               <a:rPr lang="en-US" sz="2400" dirty="0">
                 <a:latin typeface="Lato" panose="020F0502020204030203" pitchFamily="34" charset="0"/>
@@ -9489,7 +9500,7 @@
         </p:blipFill>
         <p:spPr>
           <a:xfrm>
-            <a:off x="23089686" y="16317294"/>
+            <a:off x="23059347" y="16720412"/>
             <a:ext cx="8798773" cy="2600688"/>
           </a:xfrm>
           <a:prstGeom prst="rect">
@@ -9511,7 +9522,7 @@
         </p:nvSpPr>
         <p:spPr>
           <a:xfrm>
-            <a:off x="22493480" y="19016019"/>
+            <a:off x="22552597" y="19361173"/>
             <a:ext cx="10101106" cy="1569660"/>
           </a:xfrm>
           <a:prstGeom prst="rect">
@@ -9554,7 +9565,7 @@
         </p:nvSpPr>
         <p:spPr>
           <a:xfrm>
-            <a:off x="22493480" y="22893293"/>
+            <a:off x="22535106" y="23425230"/>
             <a:ext cx="10219341" cy="830997"/>
           </a:xfrm>
           <a:prstGeom prst="rect">
@@ -9611,7 +9622,7 @@
         </p:blipFill>
         <p:spPr>
           <a:xfrm>
-            <a:off x="24810091" y="20342888"/>
+            <a:off x="25119715" y="20870431"/>
             <a:ext cx="4402708" cy="2486455"/>
           </a:xfrm>
           <a:prstGeom prst="rect">
@@ -9683,8 +9694,8 @@
         </p:blipFill>
         <p:spPr>
           <a:xfrm>
-            <a:off x="22963428" y="23808005"/>
-            <a:ext cx="8715282" cy="3793966"/>
+            <a:off x="23363512" y="24314727"/>
+            <a:ext cx="8167653" cy="3555571"/>
           </a:xfrm>
           <a:prstGeom prst="rect">
             <a:avLst/>
@@ -9705,8 +9716,8 @@
         </p:nvSpPr>
         <p:spPr>
           <a:xfrm>
-            <a:off x="22519896" y="27635651"/>
-            <a:ext cx="10147290" cy="5262979"/>
+            <a:off x="22519896" y="27929121"/>
+            <a:ext cx="10147290" cy="5139869"/>
           </a:xfrm>
           <a:prstGeom prst="rect">
             <a:avLst/>
@@ -9727,6 +9738,11 @@
             </a:r>
           </a:p>
           <a:p>
+            <a:pPr>
+              <a:spcBef>
+                <a:spcPts val="1200"/>
+              </a:spcBef>
+            </a:pPr>
             <a:r>
               <a:rPr lang="en-US" sz="2400" dirty="0">
                 <a:latin typeface="Lato" panose="020F0502020204030203" pitchFamily="34" charset="0"/>
@@ -9735,11 +9751,11 @@
             </a:r>
           </a:p>
           <a:p>
-            <a:endParaRPr lang="en-US" sz="2400" dirty="0">
-              <a:latin typeface="Lato" panose="020F0502020204030203" pitchFamily="34" charset="0"/>
-            </a:endParaRPr>
-          </a:p>
-          <a:p>
+            <a:pPr>
+              <a:spcBef>
+                <a:spcPts val="1200"/>
+              </a:spcBef>
+            </a:pPr>
             <a:r>
               <a:rPr lang="en-US" sz="2400" dirty="0">
                 <a:latin typeface="Lato" panose="020F0502020204030203" pitchFamily="34" charset="0"/>
@@ -9748,11 +9764,11 @@
             </a:r>
           </a:p>
           <a:p>
-            <a:endParaRPr lang="en-US" sz="2400" dirty="0">
-              <a:latin typeface="Lato" panose="020F0502020204030203" pitchFamily="34" charset="0"/>
-            </a:endParaRPr>
-          </a:p>
-          <a:p>
+            <a:pPr>
+              <a:spcBef>
+                <a:spcPts val="1200"/>
+              </a:spcBef>
+            </a:pPr>
             <a:r>
               <a:rPr lang="en-US" sz="2400" dirty="0">
                 <a:latin typeface="Lato" panose="020F0502020204030203" pitchFamily="34" charset="0"/>
@@ -9761,11 +9777,11 @@
             </a:r>
           </a:p>
           <a:p>
-            <a:endParaRPr lang="en-US" sz="2400" dirty="0">
-              <a:latin typeface="Lato" panose="020F0502020204030203" pitchFamily="34" charset="0"/>
-            </a:endParaRPr>
-          </a:p>
-          <a:p>
+            <a:pPr>
+              <a:spcBef>
+                <a:spcPts val="1200"/>
+              </a:spcBef>
+            </a:pPr>
             <a:r>
               <a:rPr lang="en-US" sz="2400" dirty="0">
                 <a:latin typeface="Lato" panose="020F0502020204030203" pitchFamily="34" charset="0"/>
@@ -9778,53 +9794,6 @@
           </a:p>
           <a:p>
             <a:endParaRPr lang="en-CA" sz="2400" dirty="0">
-              <a:latin typeface="Lato" panose="020F0502020204030203" pitchFamily="34" charset="0"/>
-            </a:endParaRPr>
-          </a:p>
-        </p:txBody>
-      </p:sp>
-      <p:sp>
-        <p:nvSpPr>
-          <p:cNvPr id="48" name="AutoShape 4" descr="{\displaystyle E(y,y')={\tfrac {1}{2}}\lVert y-y'\rVert ^{2}}">
-            <a:extLst>
-              <a:ext uri="{FF2B5EF4-FFF2-40B4-BE49-F238E27FC236}">
-                <a16:creationId xmlns:a16="http://schemas.microsoft.com/office/drawing/2014/main" id="{E6D94C3F-1583-4F03-9F62-982B168CD902}"/>
-              </a:ext>
-            </a:extLst>
-          </p:cNvPr>
-          <p:cNvSpPr>
-            <a:spLocks noChangeAspect="1" noChangeArrowheads="1"/>
-          </p:cNvSpPr>
-          <p:nvPr/>
-        </p:nvSpPr>
-        <p:spPr bwMode="auto">
-          <a:xfrm>
-            <a:off x="21524565" y="16306800"/>
-            <a:ext cx="304800" cy="304800"/>
-          </a:xfrm>
-          <a:prstGeom prst="rect">
-            <a:avLst/>
-          </a:prstGeom>
-          <a:noFill/>
-          <a:extLst>
-            <a:ext uri="{909E8E84-426E-40DD-AFC4-6F175D3DCCD1}">
-              <a14:hiddenFill xmlns:a14="http://schemas.microsoft.com/office/drawing/2010/main">
-                <a:solidFill>
-                  <a:srgbClr val="FFFFFF"/>
-                </a:solidFill>
-              </a14:hiddenFill>
-            </a:ext>
-          </a:extLst>
-        </p:spPr>
-        <p:txBody>
-          <a:bodyPr vert="horz" wrap="square" lIns="91440" tIns="45720" rIns="91440" bIns="45720" numCol="1" anchor="t" anchorCtr="0" compatLnSpc="1">
-            <a:prstTxWarp prst="textNoShape">
-              <a:avLst/>
-            </a:prstTxWarp>
-          </a:bodyPr>
-          <a:lstStyle/>
-          <a:p>
-            <a:endParaRPr lang="en-CA">
               <a:latin typeface="Lato" panose="020F0502020204030203" pitchFamily="34" charset="0"/>
             </a:endParaRPr>
           </a:p>
@@ -9892,7 +9861,7 @@
           <a:p>
             <a:pPr algn="ctr"/>
             <a:r>
-              <a:rPr lang="en-US" sz="5400" b="1" dirty="0">
+              <a:rPr lang="en-US" sz="4800" b="1" dirty="0">
                 <a:solidFill>
                   <a:schemeClr val="tx1"/>
                 </a:solidFill>
@@ -9991,7 +9960,7 @@
         </p:nvSpPr>
         <p:spPr>
           <a:xfrm>
-            <a:off x="11312201" y="3971756"/>
+            <a:off x="11370257" y="3971756"/>
             <a:ext cx="10639020" cy="1088172"/>
           </a:xfrm>
           <a:prstGeom prst="snip2DiagRect">
@@ -10039,7 +10008,7 @@
           <a:p>
             <a:pPr algn="ctr"/>
             <a:r>
-              <a:rPr lang="en-US" sz="5400" b="1" dirty="0">
+              <a:rPr lang="en-US" sz="4800" b="1" dirty="0">
                 <a:solidFill>
                   <a:schemeClr val="tx1"/>
                 </a:solidFill>
@@ -10066,7 +10035,7 @@
         </p:nvSpPr>
         <p:spPr>
           <a:xfrm>
-            <a:off x="11088764" y="3794570"/>
+            <a:off x="11146820" y="3794570"/>
             <a:ext cx="1543448" cy="1398628"/>
           </a:xfrm>
           <a:prstGeom prst="homePlate">
@@ -10138,7 +10107,7 @@
         </p:nvSpPr>
         <p:spPr>
           <a:xfrm>
-            <a:off x="11297116" y="12853868"/>
+            <a:off x="11355172" y="12853868"/>
             <a:ext cx="10606866" cy="1088172"/>
           </a:xfrm>
           <a:prstGeom prst="snip2DiagRect">
@@ -10186,7 +10155,7 @@
           <a:p>
             <a:pPr algn="ctr"/>
             <a:r>
-              <a:rPr lang="en-US" sz="5400" b="1" dirty="0">
+              <a:rPr lang="en-US" sz="4800" b="1" dirty="0">
                 <a:solidFill>
                   <a:schemeClr val="tx1"/>
                 </a:solidFill>
@@ -10213,7 +10182,7 @@
         </p:nvSpPr>
         <p:spPr>
           <a:xfrm>
-            <a:off x="11136990" y="12672665"/>
+            <a:off x="11195046" y="12672665"/>
             <a:ext cx="1543448" cy="1398628"/>
           </a:xfrm>
           <a:prstGeom prst="homePlate">
@@ -10330,7 +10299,7 @@
           <a:p>
             <a:pPr algn="ctr"/>
             <a:r>
-              <a:rPr lang="en-US" sz="5400" b="1" dirty="0">
+              <a:rPr lang="en-US" sz="4800" b="1" dirty="0">
                 <a:solidFill>
                   <a:schemeClr val="tx1"/>
                 </a:solidFill>
@@ -10471,7 +10440,7 @@
           <a:p>
             <a:pPr algn="ctr"/>
             <a:r>
-              <a:rPr lang="en-US" sz="5400" b="1" dirty="0">
+              <a:rPr lang="en-US" sz="4800" b="1" dirty="0">
                 <a:solidFill>
                   <a:schemeClr val="tx1"/>
                 </a:solidFill>
@@ -10612,7 +10581,7 @@
           <a:p>
             <a:pPr algn="ctr"/>
             <a:r>
-              <a:rPr lang="en-US" sz="5400" b="1" dirty="0">
+              <a:rPr lang="en-US" sz="4800" b="1" dirty="0">
                 <a:solidFill>
                   <a:schemeClr val="tx1"/>
                 </a:solidFill>

</xml_diff>

<commit_message>
Add final draft of poster
</commit_message>
<xml_diff>
--- a/Poster/DP Poster.pptx
+++ b/Poster/DP Poster.pptx
@@ -109,7 +109,7 @@
   </p:defaultTextStyle>
   <p:extLst>
     <p:ext uri="{EFAFB233-063F-42B5-8137-9DF3F51BA10A}">
-      <p15:sldGuideLst xmlns:p15="http://schemas.microsoft.com/office/powerpoint/2012/main"/>
+      <p15:sldGuideLst xmlns:p15="http://schemas.microsoft.com/office/powerpoint/2012/main" xmlns=""/>
     </p:ext>
   </p:extLst>
 </p:presentation>
@@ -125,7 +125,7 @@
 </file>
 
 <file path=ppt/charts/chart1.xml><?xml version="1.0" encoding="utf-8"?>
-<c:chartSpace xmlns:c="http://schemas.openxmlformats.org/drawingml/2006/chart" xmlns:a="http://schemas.openxmlformats.org/drawingml/2006/main" xmlns:r="http://schemas.openxmlformats.org/officeDocument/2006/relationships" xmlns:c16r2="http://schemas.microsoft.com/office/drawing/2015/06/chart">
+<c:chartSpace xmlns:c="http://schemas.openxmlformats.org/drawingml/2006/chart" xmlns:a="http://schemas.openxmlformats.org/drawingml/2006/main" xmlns:r="http://schemas.openxmlformats.org/officeDocument/2006/relationships">
   <c:date1904 val="0"/>
   <c:lang val="en-US"/>
   <c:roundedCorners val="0"/>
@@ -164,6 +164,7 @@
           </a:p>
         </c:rich>
       </c:tx>
+      <c:layout/>
       <c:overlay val="0"/>
       <c:spPr>
         <a:noFill/>
@@ -172,26 +173,6 @@
         </a:ln>
         <a:effectLst/>
       </c:spPr>
-      <c:txPr>
-        <a:bodyPr rot="0" spcFirstLastPara="1" vertOverflow="ellipsis" vert="horz" wrap="square" anchor="ctr" anchorCtr="1"/>
-        <a:lstStyle/>
-        <a:p>
-          <a:pPr>
-            <a:defRPr sz="2160" b="1" i="0" u="none" strike="noStrike" kern="1200" baseline="0">
-              <a:solidFill>
-                <a:schemeClr val="dk1">
-                  <a:lumMod val="75000"/>
-                  <a:lumOff val="25000"/>
-                </a:schemeClr>
-              </a:solidFill>
-              <a:latin typeface="+mn-lt"/>
-              <a:ea typeface="+mn-ea"/>
-              <a:cs typeface="+mn-cs"/>
-            </a:defRPr>
-          </a:pPr>
-          <a:endParaRPr lang="en-US"/>
-        </a:p>
-      </c:txPr>
     </c:title>
     <c:autoTitleDeleted val="0"/>
     <c:plotArea>
@@ -264,7 +245,7 @@
             <c:showPercent val="0"/>
             <c:showBubbleSize val="0"/>
             <c:showLeaderLines val="0"/>
-            <c:extLst>
+            <c:extLst xmlns:c16r2="http://schemas.microsoft.com/office/drawing/2015/06/chart">
               <c:ext xmlns:c15="http://schemas.microsoft.com/office/drawing/2012/chart" uri="{CE6537A1-D6FC-4f65-9D91-7224C49458BB}">
                 <c15:showLeaderLines val="1"/>
                 <c15:leaderLines>
@@ -310,21 +291,21 @@
                 <c:formatCode>General</c:formatCode>
                 <c:ptCount val="4"/>
                 <c:pt idx="0">
-                  <c:v>339884</c:v>
+                  <c:v>339884.0</c:v>
                 </c:pt>
                 <c:pt idx="1">
-                  <c:v>10011</c:v>
+                  <c:v>10011.0</c:v>
                 </c:pt>
                 <c:pt idx="2">
-                  <c:v>45693</c:v>
+                  <c:v>45693.0</c:v>
                 </c:pt>
                 <c:pt idx="3">
-                  <c:v>2007</c:v>
+                  <c:v>2007.0</c:v>
                 </c:pt>
               </c:numCache>
             </c:numRef>
           </c:val>
-          <c:extLst>
+          <c:extLst xmlns:c16r2="http://schemas.microsoft.com/office/drawing/2015/06/chart">
             <c:ext xmlns:c16="http://schemas.microsoft.com/office/drawing/2014/chart" uri="{C3380CC4-5D6E-409C-BE32-E72D297353CC}">
               <c16:uniqueId val="{00000000-3357-472C-8186-9EE2589D57CB}"/>
             </c:ext>
@@ -340,11 +321,11 @@
           <c:showBubbleSize val="0"/>
         </c:dLbls>
         <c:gapWidth val="65"/>
-        <c:axId val="786340312"/>
-        <c:axId val="786340968"/>
+        <c:axId val="2128018008"/>
+        <c:axId val="2128881624"/>
       </c:barChart>
       <c:catAx>
-        <c:axId val="786340312"/>
+        <c:axId val="2128018008"/>
         <c:scaling>
           <c:orientation val="minMax"/>
         </c:scaling>
@@ -387,7 +368,7 @@
             <a:endParaRPr lang="en-US"/>
           </a:p>
         </c:txPr>
-        <c:crossAx val="786340968"/>
+        <c:crossAx val="2128881624"/>
         <c:crosses val="autoZero"/>
         <c:auto val="1"/>
         <c:lblAlgn val="ctr"/>
@@ -395,9 +376,9 @@
         <c:noMultiLvlLbl val="0"/>
       </c:catAx>
       <c:valAx>
-        <c:axId val="786340968"/>
+        <c:axId val="2128881624"/>
         <c:scaling>
-          <c:logBase val="10"/>
+          <c:logBase val="10.0"/>
           <c:orientation val="minMax"/>
         </c:scaling>
         <c:delete val="0"/>
@@ -459,7 +440,7 @@
             <a:endParaRPr lang="en-US"/>
           </a:p>
         </c:txPr>
-        <c:crossAx val="786340312"/>
+        <c:crossAx val="2128018008"/>
         <c:crosses val="autoZero"/>
         <c:crossBetween val="between"/>
       </c:valAx>
@@ -516,7 +497,7 @@
       <a:endParaRPr lang="en-US"/>
     </a:p>
   </c:txPr>
-  <c:externalData r:id="rId3">
+  <c:externalData r:id="rId1">
     <c:autoUpdate val="0"/>
   </c:externalData>
 </c:chartSpace>
@@ -1214,7 +1195,7 @@
           <a:p>
             <a:fld id="{BACB7DF9-8540-406D-8DE8-292B5AF9BA59}" type="datetimeFigureOut">
               <a:rPr lang="en-CA" smtClean="0"/>
-              <a:t>2018-04-05</a:t>
+              <a:t>18-04-09</a:t>
             </a:fld>
             <a:endParaRPr lang="en-CA"/>
           </a:p>
@@ -1695,7 +1676,7 @@
           <a:p>
             <a:fld id="{846CE7D5-CF57-46EF-B807-FDD0502418D4}" type="datetimeFigureOut">
               <a:rPr lang="en-US" smtClean="0"/>
-              <a:t>4/5/2018</a:t>
+              <a:t>18-04-09</a:t>
             </a:fld>
             <a:endParaRPr lang="en-US"/>
           </a:p>
@@ -1863,7 +1844,7 @@
           <a:p>
             <a:fld id="{846CE7D5-CF57-46EF-B807-FDD0502418D4}" type="datetimeFigureOut">
               <a:rPr lang="en-US" smtClean="0"/>
-              <a:t>4/5/2018</a:t>
+              <a:t>18-04-09</a:t>
             </a:fld>
             <a:endParaRPr lang="en-US"/>
           </a:p>
@@ -2041,7 +2022,7 @@
           <a:p>
             <a:fld id="{846CE7D5-CF57-46EF-B807-FDD0502418D4}" type="datetimeFigureOut">
               <a:rPr lang="en-US" smtClean="0"/>
-              <a:t>4/5/2018</a:t>
+              <a:t>18-04-09</a:t>
             </a:fld>
             <a:endParaRPr lang="en-US"/>
           </a:p>
@@ -2209,7 +2190,7 @@
           <a:p>
             <a:fld id="{846CE7D5-CF57-46EF-B807-FDD0502418D4}" type="datetimeFigureOut">
               <a:rPr lang="en-US" smtClean="0"/>
-              <a:t>4/5/2018</a:t>
+              <a:t>18-04-09</a:t>
             </a:fld>
             <a:endParaRPr lang="en-US"/>
           </a:p>
@@ -2452,7 +2433,7 @@
           <a:p>
             <a:fld id="{846CE7D5-CF57-46EF-B807-FDD0502418D4}" type="datetimeFigureOut">
               <a:rPr lang="en-US" smtClean="0"/>
-              <a:t>4/5/2018</a:t>
+              <a:t>18-04-09</a:t>
             </a:fld>
             <a:endParaRPr lang="en-US"/>
           </a:p>
@@ -2681,7 +2662,7 @@
           <a:p>
             <a:fld id="{846CE7D5-CF57-46EF-B807-FDD0502418D4}" type="datetimeFigureOut">
               <a:rPr lang="en-US" smtClean="0"/>
-              <a:t>4/5/2018</a:t>
+              <a:t>18-04-09</a:t>
             </a:fld>
             <a:endParaRPr lang="en-US"/>
           </a:p>
@@ -3045,7 +3026,7 @@
           <a:p>
             <a:fld id="{846CE7D5-CF57-46EF-B807-FDD0502418D4}" type="datetimeFigureOut">
               <a:rPr lang="en-US" smtClean="0"/>
-              <a:t>4/5/2018</a:t>
+              <a:t>18-04-09</a:t>
             </a:fld>
             <a:endParaRPr lang="en-US"/>
           </a:p>
@@ -3162,7 +3143,7 @@
           <a:p>
             <a:fld id="{846CE7D5-CF57-46EF-B807-FDD0502418D4}" type="datetimeFigureOut">
               <a:rPr lang="en-US" smtClean="0"/>
-              <a:t>4/5/2018</a:t>
+              <a:t>18-04-09</a:t>
             </a:fld>
             <a:endParaRPr lang="en-US"/>
           </a:p>
@@ -3257,7 +3238,7 @@
           <a:p>
             <a:fld id="{846CE7D5-CF57-46EF-B807-FDD0502418D4}" type="datetimeFigureOut">
               <a:rPr lang="en-US" smtClean="0"/>
-              <a:t>4/5/2018</a:t>
+              <a:t>18-04-09</a:t>
             </a:fld>
             <a:endParaRPr lang="en-US"/>
           </a:p>
@@ -3532,7 +3513,7 @@
           <a:p>
             <a:fld id="{846CE7D5-CF57-46EF-B807-FDD0502418D4}" type="datetimeFigureOut">
               <a:rPr lang="en-US" smtClean="0"/>
-              <a:t>4/5/2018</a:t>
+              <a:t>18-04-09</a:t>
             </a:fld>
             <a:endParaRPr lang="en-US"/>
           </a:p>
@@ -3784,7 +3765,7 @@
           <a:p>
             <a:fld id="{846CE7D5-CF57-46EF-B807-FDD0502418D4}" type="datetimeFigureOut">
               <a:rPr lang="en-US" smtClean="0"/>
-              <a:t>4/5/2018</a:t>
+              <a:t>18-04-09</a:t>
             </a:fld>
             <a:endParaRPr lang="en-US"/>
           </a:p>
@@ -3995,7 +3976,7 @@
           <a:p>
             <a:fld id="{846CE7D5-CF57-46EF-B807-FDD0502418D4}" type="datetimeFigureOut">
               <a:rPr lang="en-US" smtClean="0"/>
-              <a:t>4/5/2018</a:t>
+              <a:t>18-04-09</a:t>
             </a:fld>
             <a:endParaRPr lang="en-US"/>
           </a:p>
@@ -4413,7 +4394,7 @@
           <p:cNvPr id="9" name="Rectangle: Rounded Corners 8">
             <a:extLst>
               <a:ext uri="{FF2B5EF4-FFF2-40B4-BE49-F238E27FC236}">
-                <a16:creationId xmlns:a16="http://schemas.microsoft.com/office/drawing/2014/main" id="{2F67C871-AEF0-4723-85EE-26337E090063}"/>
+                <a16:creationId xmlns:a16="http://schemas.microsoft.com/office/drawing/2014/main" xmlns="" id="{2F67C871-AEF0-4723-85EE-26337E090063}"/>
               </a:ext>
             </a:extLst>
           </p:cNvPr>
@@ -4471,7 +4452,7 @@
           <p:cNvPr id="4" name="TextBox 3">
             <a:extLst>
               <a:ext uri="{FF2B5EF4-FFF2-40B4-BE49-F238E27FC236}">
-                <a16:creationId xmlns:a16="http://schemas.microsoft.com/office/drawing/2014/main" id="{45097468-3AE6-4BEC-95D7-1BD1267E1F6D}"/>
+                <a16:creationId xmlns:a16="http://schemas.microsoft.com/office/drawing/2014/main" xmlns="" id="{45097468-3AE6-4BEC-95D7-1BD1267E1F6D}"/>
               </a:ext>
             </a:extLst>
           </p:cNvPr>
@@ -4513,7 +4494,7 @@
           <p:cNvPr id="10" name="Picture 10" descr="A close up of a sign&#10;&#10;Description generated with very high confidence">
             <a:extLst>
               <a:ext uri="{FF2B5EF4-FFF2-40B4-BE49-F238E27FC236}">
-                <a16:creationId xmlns:a16="http://schemas.microsoft.com/office/drawing/2014/main" id="{B7B0B0D7-20A4-49BB-BBA3-CC2399BE5913}"/>
+                <a16:creationId xmlns:a16="http://schemas.microsoft.com/office/drawing/2014/main" xmlns="" id="{B7B0B0D7-20A4-49BB-BBA3-CC2399BE5913}"/>
               </a:ext>
             </a:extLst>
           </p:cNvPr>
@@ -4543,7 +4524,7 @@
           <p:cNvPr id="15" name="TextBox 14">
             <a:extLst>
               <a:ext uri="{FF2B5EF4-FFF2-40B4-BE49-F238E27FC236}">
-                <a16:creationId xmlns:a16="http://schemas.microsoft.com/office/drawing/2014/main" id="{01B5D745-8498-43D5-B4CB-DFCCA9E2272E}"/>
+                <a16:creationId xmlns:a16="http://schemas.microsoft.com/office/drawing/2014/main" xmlns="" id="{01B5D745-8498-43D5-B4CB-DFCCA9E2272E}"/>
               </a:ext>
             </a:extLst>
           </p:cNvPr>
@@ -4604,7 +4585,7 @@
           <p:cNvPr id="43" name="Rectangle 42">
             <a:extLst>
               <a:ext uri="{FF2B5EF4-FFF2-40B4-BE49-F238E27FC236}">
-                <a16:creationId xmlns:a16="http://schemas.microsoft.com/office/drawing/2014/main" id="{B41EAB0B-9AB0-484D-B676-80AB5164521C}"/>
+                <a16:creationId xmlns:a16="http://schemas.microsoft.com/office/drawing/2014/main" xmlns="" id="{B41EAB0B-9AB0-484D-B676-80AB5164521C}"/>
               </a:ext>
             </a:extLst>
           </p:cNvPr>
@@ -4658,7 +4639,7 @@
           <p:cNvPr id="53" name="Rectangle 52">
             <a:extLst>
               <a:ext uri="{FF2B5EF4-FFF2-40B4-BE49-F238E27FC236}">
-                <a16:creationId xmlns:a16="http://schemas.microsoft.com/office/drawing/2014/main" id="{D57D2CAB-A850-4AB6-9030-0412504CFF12}"/>
+                <a16:creationId xmlns:a16="http://schemas.microsoft.com/office/drawing/2014/main" xmlns="" id="{D57D2CAB-A850-4AB6-9030-0412504CFF12}"/>
               </a:ext>
             </a:extLst>
           </p:cNvPr>
@@ -4714,7 +4695,7 @@
           <p:cNvPr id="14" name="Rectangle: Diagonal Corners Snipped 13">
             <a:extLst>
               <a:ext uri="{FF2B5EF4-FFF2-40B4-BE49-F238E27FC236}">
-                <a16:creationId xmlns:a16="http://schemas.microsoft.com/office/drawing/2014/main" id="{1F9625E0-1A30-484F-B183-F18E4C51E0A3}"/>
+                <a16:creationId xmlns:a16="http://schemas.microsoft.com/office/drawing/2014/main" xmlns="" id="{1F9625E0-1A30-484F-B183-F18E4C51E0A3}"/>
               </a:ext>
             </a:extLst>
           </p:cNvPr>
@@ -4789,7 +4770,7 @@
           <p:cNvPr id="58" name="Rectangle 57">
             <a:extLst>
               <a:ext uri="{FF2B5EF4-FFF2-40B4-BE49-F238E27FC236}">
-                <a16:creationId xmlns:a16="http://schemas.microsoft.com/office/drawing/2014/main" id="{CDBA202B-DE6D-4FF8-93B2-3F97FFDC64CC}"/>
+                <a16:creationId xmlns:a16="http://schemas.microsoft.com/office/drawing/2014/main" xmlns="" id="{CDBA202B-DE6D-4FF8-93B2-3F97FFDC64CC}"/>
               </a:ext>
             </a:extLst>
           </p:cNvPr>
@@ -4843,7 +4824,7 @@
           <p:cNvPr id="59" name="Rectangle 58">
             <a:extLst>
               <a:ext uri="{FF2B5EF4-FFF2-40B4-BE49-F238E27FC236}">
-                <a16:creationId xmlns:a16="http://schemas.microsoft.com/office/drawing/2014/main" id="{E52646FA-B40F-4800-9488-4811540F5308}"/>
+                <a16:creationId xmlns:a16="http://schemas.microsoft.com/office/drawing/2014/main" xmlns="" id="{E52646FA-B40F-4800-9488-4811540F5308}"/>
               </a:ext>
             </a:extLst>
           </p:cNvPr>
@@ -4897,7 +4878,7 @@
           <p:cNvPr id="63" name="Rectangle 62">
             <a:extLst>
               <a:ext uri="{FF2B5EF4-FFF2-40B4-BE49-F238E27FC236}">
-                <a16:creationId xmlns:a16="http://schemas.microsoft.com/office/drawing/2014/main" id="{D2F79908-08E4-43C6-9BE3-A6CD5853666D}"/>
+                <a16:creationId xmlns:a16="http://schemas.microsoft.com/office/drawing/2014/main" xmlns="" id="{D2F79908-08E4-43C6-9BE3-A6CD5853666D}"/>
               </a:ext>
             </a:extLst>
           </p:cNvPr>
@@ -4951,7 +4932,7 @@
           <p:cNvPr id="64" name="Rectangle 63">
             <a:extLst>
               <a:ext uri="{FF2B5EF4-FFF2-40B4-BE49-F238E27FC236}">
-                <a16:creationId xmlns:a16="http://schemas.microsoft.com/office/drawing/2014/main" id="{97D40F41-5227-49D0-A3F4-54F0D6E688D9}"/>
+                <a16:creationId xmlns:a16="http://schemas.microsoft.com/office/drawing/2014/main" xmlns="" id="{97D40F41-5227-49D0-A3F4-54F0D6E688D9}"/>
               </a:ext>
             </a:extLst>
           </p:cNvPr>
@@ -5005,7 +4986,7 @@
           <p:cNvPr id="78" name="Arrow: Pentagon 77">
             <a:extLst>
               <a:ext uri="{FF2B5EF4-FFF2-40B4-BE49-F238E27FC236}">
-                <a16:creationId xmlns:a16="http://schemas.microsoft.com/office/drawing/2014/main" id="{098D3053-A435-4F39-A451-2BFA502D6F3B}"/>
+                <a16:creationId xmlns:a16="http://schemas.microsoft.com/office/drawing/2014/main" xmlns="" id="{098D3053-A435-4F39-A451-2BFA502D6F3B}"/>
               </a:ext>
             </a:extLst>
           </p:cNvPr>
@@ -5077,7 +5058,7 @@
           <p:cNvPr id="84" name="Rectangle 83">
             <a:extLst>
               <a:ext uri="{FF2B5EF4-FFF2-40B4-BE49-F238E27FC236}">
-                <a16:creationId xmlns:a16="http://schemas.microsoft.com/office/drawing/2014/main" id="{6418F831-103A-436A-9063-C00E1771046B}"/>
+                <a16:creationId xmlns:a16="http://schemas.microsoft.com/office/drawing/2014/main" xmlns="" id="{6418F831-103A-436A-9063-C00E1771046B}"/>
               </a:ext>
             </a:extLst>
           </p:cNvPr>
@@ -5131,7 +5112,7 @@
           <p:cNvPr id="85" name="Rectangle 84">
             <a:extLst>
               <a:ext uri="{FF2B5EF4-FFF2-40B4-BE49-F238E27FC236}">
-                <a16:creationId xmlns:a16="http://schemas.microsoft.com/office/drawing/2014/main" id="{4E9D6DE2-7BC2-4435-8362-E57D299AEE1C}"/>
+                <a16:creationId xmlns:a16="http://schemas.microsoft.com/office/drawing/2014/main" xmlns="" id="{4E9D6DE2-7BC2-4435-8362-E57D299AEE1C}"/>
               </a:ext>
             </a:extLst>
           </p:cNvPr>
@@ -5185,7 +5166,7 @@
           <p:cNvPr id="2" name="TextBox 1">
             <a:extLst>
               <a:ext uri="{FF2B5EF4-FFF2-40B4-BE49-F238E27FC236}">
-                <a16:creationId xmlns:a16="http://schemas.microsoft.com/office/drawing/2014/main" id="{CB5AC68F-23F8-4EF3-9377-D23B0E70ABB3}"/>
+                <a16:creationId xmlns:a16="http://schemas.microsoft.com/office/drawing/2014/main" xmlns="" id="{CB5AC68F-23F8-4EF3-9377-D23B0E70ABB3}"/>
               </a:ext>
             </a:extLst>
           </p:cNvPr>
@@ -5369,7 +5350,7 @@
           <p:cNvPr id="8" name="Group 7">
             <a:extLst>
               <a:ext uri="{FF2B5EF4-FFF2-40B4-BE49-F238E27FC236}">
-                <a16:creationId xmlns:a16="http://schemas.microsoft.com/office/drawing/2014/main" id="{821EA8F7-25FB-49D4-9698-8794A0836927}"/>
+                <a16:creationId xmlns:a16="http://schemas.microsoft.com/office/drawing/2014/main" xmlns="" id="{821EA8F7-25FB-49D4-9698-8794A0836927}"/>
               </a:ext>
             </a:extLst>
           </p:cNvPr>
@@ -5389,7 +5370,7 @@
             <p:cNvPr id="5" name="Picture 4">
               <a:extLst>
                 <a:ext uri="{FF2B5EF4-FFF2-40B4-BE49-F238E27FC236}">
-                  <a16:creationId xmlns:a16="http://schemas.microsoft.com/office/drawing/2014/main" id="{E0D8214D-D6F8-491C-8D63-A5C0C41719BD}"/>
+                  <a16:creationId xmlns:a16="http://schemas.microsoft.com/office/drawing/2014/main" xmlns="" id="{E0D8214D-D6F8-491C-8D63-A5C0C41719BD}"/>
                 </a:ext>
               </a:extLst>
             </p:cNvPr>
@@ -5425,7 +5406,7 @@
             <p:cNvPr id="6" name="TextBox 5">
               <a:extLst>
                 <a:ext uri="{FF2B5EF4-FFF2-40B4-BE49-F238E27FC236}">
-                  <a16:creationId xmlns:a16="http://schemas.microsoft.com/office/drawing/2014/main" id="{01E3B165-BCAD-4406-8A8A-7203E7433D9B}"/>
+                  <a16:creationId xmlns:a16="http://schemas.microsoft.com/office/drawing/2014/main" xmlns="" id="{01E3B165-BCAD-4406-8A8A-7203E7433D9B}"/>
                 </a:ext>
               </a:extLst>
             </p:cNvPr>
@@ -5473,7 +5454,7 @@
             <p:cNvPr id="7" name="TextBox 6">
               <a:extLst>
                 <a:ext uri="{FF2B5EF4-FFF2-40B4-BE49-F238E27FC236}">
-                  <a16:creationId xmlns:a16="http://schemas.microsoft.com/office/drawing/2014/main" id="{3E5DCBB4-39E3-4489-A3A0-DD1E22F50A80}"/>
+                  <a16:creationId xmlns:a16="http://schemas.microsoft.com/office/drawing/2014/main" xmlns="" id="{3E5DCBB4-39E3-4489-A3A0-DD1E22F50A80}"/>
                 </a:ext>
               </a:extLst>
             </p:cNvPr>
@@ -5521,7 +5502,7 @@
             <p:cNvPr id="54" name="TextBox 53">
               <a:extLst>
                 <a:ext uri="{FF2B5EF4-FFF2-40B4-BE49-F238E27FC236}">
-                  <a16:creationId xmlns:a16="http://schemas.microsoft.com/office/drawing/2014/main" id="{85F2CB6D-EB50-498B-BB61-33F1F3C7C11B}"/>
+                  <a16:creationId xmlns:a16="http://schemas.microsoft.com/office/drawing/2014/main" xmlns="" id="{85F2CB6D-EB50-498B-BB61-33F1F3C7C11B}"/>
                 </a:ext>
               </a:extLst>
             </p:cNvPr>
@@ -5569,7 +5550,7 @@
             <p:cNvPr id="55" name="TextBox 54">
               <a:extLst>
                 <a:ext uri="{FF2B5EF4-FFF2-40B4-BE49-F238E27FC236}">
-                  <a16:creationId xmlns:a16="http://schemas.microsoft.com/office/drawing/2014/main" id="{85F62AA4-4D53-450B-9DB5-B9D2F9047DDA}"/>
+                  <a16:creationId xmlns:a16="http://schemas.microsoft.com/office/drawing/2014/main" xmlns="" id="{85F62AA4-4D53-450B-9DB5-B9D2F9047DDA}"/>
                 </a:ext>
               </a:extLst>
             </p:cNvPr>
@@ -5609,7 +5590,7 @@
             <p:cNvPr id="56" name="TextBox 55">
               <a:extLst>
                 <a:ext uri="{FF2B5EF4-FFF2-40B4-BE49-F238E27FC236}">
-                  <a16:creationId xmlns:a16="http://schemas.microsoft.com/office/drawing/2014/main" id="{4E89FCB7-A108-486C-9319-E71EB98C57E1}"/>
+                  <a16:creationId xmlns:a16="http://schemas.microsoft.com/office/drawing/2014/main" xmlns="" id="{4E89FCB7-A108-486C-9319-E71EB98C57E1}"/>
                 </a:ext>
               </a:extLst>
             </p:cNvPr>
@@ -5658,7 +5639,7 @@
           <p:cNvPr id="13" name="Rectangle: Rounded Corners 12">
             <a:extLst>
               <a:ext uri="{FF2B5EF4-FFF2-40B4-BE49-F238E27FC236}">
-                <a16:creationId xmlns:a16="http://schemas.microsoft.com/office/drawing/2014/main" id="{E30E3378-6C32-4A43-82D4-1BC783162BFD}"/>
+                <a16:creationId xmlns:a16="http://schemas.microsoft.com/office/drawing/2014/main" xmlns="" id="{E30E3378-6C32-4A43-82D4-1BC783162BFD}"/>
               </a:ext>
             </a:extLst>
           </p:cNvPr>
@@ -5710,7 +5691,7 @@
           <p:cNvPr id="24" name="TextBox 23">
             <a:extLst>
               <a:ext uri="{FF2B5EF4-FFF2-40B4-BE49-F238E27FC236}">
-                <a16:creationId xmlns:a16="http://schemas.microsoft.com/office/drawing/2014/main" id="{0952AC77-B277-4231-9D22-906E4D734C70}"/>
+                <a16:creationId xmlns:a16="http://schemas.microsoft.com/office/drawing/2014/main" xmlns="" id="{0952AC77-B277-4231-9D22-906E4D734C70}"/>
               </a:ext>
             </a:extLst>
           </p:cNvPr>
@@ -5747,7 +5728,7 @@
           <p:cNvPr id="35" name="Chart 34">
             <a:extLst>
               <a:ext uri="{FF2B5EF4-FFF2-40B4-BE49-F238E27FC236}">
-                <a16:creationId xmlns:a16="http://schemas.microsoft.com/office/drawing/2014/main" id="{77AEEE02-681B-41D9-B2BF-446D7D063B65}"/>
+                <a16:creationId xmlns:a16="http://schemas.microsoft.com/office/drawing/2014/main" xmlns="" id="{77AEEE02-681B-41D9-B2BF-446D7D063B65}"/>
               </a:ext>
             </a:extLst>
           </p:cNvPr>
@@ -5775,7 +5756,7 @@
           <p:cNvPr id="37" name="Group 36">
             <a:extLst>
               <a:ext uri="{FF2B5EF4-FFF2-40B4-BE49-F238E27FC236}">
-                <a16:creationId xmlns:a16="http://schemas.microsoft.com/office/drawing/2014/main" id="{B77D6245-B15C-40EF-A057-385CAAAFC80D}"/>
+                <a16:creationId xmlns:a16="http://schemas.microsoft.com/office/drawing/2014/main" xmlns="" id="{B77D6245-B15C-40EF-A057-385CAAAFC80D}"/>
               </a:ext>
             </a:extLst>
           </p:cNvPr>
@@ -5795,7 +5776,7 @@
             <p:cNvPr id="36" name="TextBox 35">
               <a:extLst>
                 <a:ext uri="{FF2B5EF4-FFF2-40B4-BE49-F238E27FC236}">
-                  <a16:creationId xmlns:a16="http://schemas.microsoft.com/office/drawing/2014/main" id="{7BD44FCF-BF61-4F62-81D1-12FD0EA4DC20}"/>
+                  <a16:creationId xmlns:a16="http://schemas.microsoft.com/office/drawing/2014/main" xmlns="" id="{7BD44FCF-BF61-4F62-81D1-12FD0EA4DC20}"/>
                 </a:ext>
               </a:extLst>
             </p:cNvPr>
@@ -5894,7 +5875,7 @@
             <p:cNvPr id="61" name="Shape 221">
               <a:extLst>
                 <a:ext uri="{FF2B5EF4-FFF2-40B4-BE49-F238E27FC236}">
-                  <a16:creationId xmlns:a16="http://schemas.microsoft.com/office/drawing/2014/main" id="{28588562-63C9-4EFE-884B-148F084B8517}"/>
+                  <a16:creationId xmlns:a16="http://schemas.microsoft.com/office/drawing/2014/main" xmlns="" id="{28588562-63C9-4EFE-884B-148F084B8517}"/>
                 </a:ext>
               </a:extLst>
             </p:cNvPr>
@@ -5928,7 +5909,7 @@
             <p:cNvPr id="65" name="Shape 225">
               <a:extLst>
                 <a:ext uri="{FF2B5EF4-FFF2-40B4-BE49-F238E27FC236}">
-                  <a16:creationId xmlns:a16="http://schemas.microsoft.com/office/drawing/2014/main" id="{3C48B24E-F9E1-46B5-B15C-F296F58906EF}"/>
+                  <a16:creationId xmlns:a16="http://schemas.microsoft.com/office/drawing/2014/main" xmlns="" id="{3C48B24E-F9E1-46B5-B15C-F296F58906EF}"/>
                 </a:ext>
               </a:extLst>
             </p:cNvPr>
@@ -5962,7 +5943,7 @@
             <p:cNvPr id="66" name="Shape 224">
               <a:extLst>
                 <a:ext uri="{FF2B5EF4-FFF2-40B4-BE49-F238E27FC236}">
-                  <a16:creationId xmlns:a16="http://schemas.microsoft.com/office/drawing/2014/main" id="{0DF11DFE-F3B8-4E45-ABD7-188CEB945DC8}"/>
+                  <a16:creationId xmlns:a16="http://schemas.microsoft.com/office/drawing/2014/main" xmlns="" id="{0DF11DFE-F3B8-4E45-ABD7-188CEB945DC8}"/>
                 </a:ext>
               </a:extLst>
             </p:cNvPr>
@@ -5997,7 +5978,7 @@
           <p:cNvPr id="70" name="Rectangle 69">
             <a:extLst>
               <a:ext uri="{FF2B5EF4-FFF2-40B4-BE49-F238E27FC236}">
-                <a16:creationId xmlns:a16="http://schemas.microsoft.com/office/drawing/2014/main" id="{9C5A5C05-628F-4993-9802-0A504BDC628B}"/>
+                <a16:creationId xmlns:a16="http://schemas.microsoft.com/office/drawing/2014/main" xmlns="" id="{9C5A5C05-628F-4993-9802-0A504BDC628B}"/>
               </a:ext>
             </a:extLst>
           </p:cNvPr>
@@ -6051,7 +6032,7 @@
           <p:cNvPr id="73" name="Rectangle 72">
             <a:extLst>
               <a:ext uri="{FF2B5EF4-FFF2-40B4-BE49-F238E27FC236}">
-                <a16:creationId xmlns:a16="http://schemas.microsoft.com/office/drawing/2014/main" id="{587282DD-B32C-416B-BD7E-790C872F27EF}"/>
+                <a16:creationId xmlns:a16="http://schemas.microsoft.com/office/drawing/2014/main" xmlns="" id="{587282DD-B32C-416B-BD7E-790C872F27EF}"/>
               </a:ext>
             </a:extLst>
           </p:cNvPr>
@@ -6105,7 +6086,7 @@
           <p:cNvPr id="3" name="TextBox 2">
             <a:extLst>
               <a:ext uri="{FF2B5EF4-FFF2-40B4-BE49-F238E27FC236}">
-                <a16:creationId xmlns:a16="http://schemas.microsoft.com/office/drawing/2014/main" id="{1DB29ECD-F818-4373-8C09-ADC7F15D4E17}"/>
+                <a16:creationId xmlns:a16="http://schemas.microsoft.com/office/drawing/2014/main" xmlns="" id="{1DB29ECD-F818-4373-8C09-ADC7F15D4E17}"/>
               </a:ext>
             </a:extLst>
           </p:cNvPr>
@@ -6213,7 +6194,7 @@
               <p:cNvPr id="33" name="TextBox 32">
                 <a:extLst>
                   <a:ext uri="{FF2B5EF4-FFF2-40B4-BE49-F238E27FC236}">
-                    <a16:creationId xmlns:a16="http://schemas.microsoft.com/office/drawing/2014/main" id="{E82B1971-562C-4F83-86B6-09BECC42CC78}"/>
+                    <a16:creationId xmlns:a16="http://schemas.microsoft.com/office/drawing/2014/main" xmlns="" id="{E82B1971-562C-4F83-86B6-09BECC42CC78}"/>
                   </a:ext>
                 </a:extLst>
               </p:cNvPr>
@@ -6294,7 +6275,7 @@
               <a:p>
                 <a:pPr lvl="1"/>
                 <a14:m>
-                  <m:oMathPara xmlns:m="http://schemas.openxmlformats.org/officeDocument/2006/math">
+                  <m:oMathPara xmlns:m="http://schemas.openxmlformats.org/officeDocument/2006/math" xmlns="">
                     <m:oMathParaPr>
                       <m:jc m:val="centerGroup"/>
                     </m:oMathParaPr>
@@ -6455,7 +6436,7 @@
           <p:cNvPr id="38" name="Group 37">
             <a:extLst>
               <a:ext uri="{FF2B5EF4-FFF2-40B4-BE49-F238E27FC236}">
-                <a16:creationId xmlns:a16="http://schemas.microsoft.com/office/drawing/2014/main" id="{0897C3FD-9B32-43E6-8BD0-0639ED90E6EF}"/>
+                <a16:creationId xmlns:a16="http://schemas.microsoft.com/office/drawing/2014/main" xmlns="" id="{0897C3FD-9B32-43E6-8BD0-0639ED90E6EF}"/>
               </a:ext>
             </a:extLst>
           </p:cNvPr>
@@ -6475,7 +6456,7 @@
             <p:cNvPr id="29" name="Picture 28">
               <a:extLst>
                 <a:ext uri="{FF2B5EF4-FFF2-40B4-BE49-F238E27FC236}">
-                  <a16:creationId xmlns:a16="http://schemas.microsoft.com/office/drawing/2014/main" id="{9DE7B762-2EB9-4372-A512-49C1072CC017}"/>
+                  <a16:creationId xmlns:a16="http://schemas.microsoft.com/office/drawing/2014/main" xmlns="" id="{9DE7B762-2EB9-4372-A512-49C1072CC017}"/>
                 </a:ext>
               </a:extLst>
             </p:cNvPr>
@@ -6511,7 +6492,7 @@
             <p:cNvPr id="34" name="TextBox 33">
               <a:extLst>
                 <a:ext uri="{FF2B5EF4-FFF2-40B4-BE49-F238E27FC236}">
-                  <a16:creationId xmlns:a16="http://schemas.microsoft.com/office/drawing/2014/main" id="{F6D8C56C-B77A-4A84-B25C-D0C64D2DD84B}"/>
+                  <a16:creationId xmlns:a16="http://schemas.microsoft.com/office/drawing/2014/main" xmlns="" id="{F6D8C56C-B77A-4A84-B25C-D0C64D2DD84B}"/>
                 </a:ext>
               </a:extLst>
             </p:cNvPr>
@@ -6551,7 +6532,7 @@
             <p:cNvPr id="71" name="TextBox 70">
               <a:extLst>
                 <a:ext uri="{FF2B5EF4-FFF2-40B4-BE49-F238E27FC236}">
-                  <a16:creationId xmlns:a16="http://schemas.microsoft.com/office/drawing/2014/main" id="{FC1A939F-6375-42B8-BFD8-E01152C57871}"/>
+                  <a16:creationId xmlns:a16="http://schemas.microsoft.com/office/drawing/2014/main" xmlns="" id="{FC1A939F-6375-42B8-BFD8-E01152C57871}"/>
                 </a:ext>
               </a:extLst>
             </p:cNvPr>
@@ -6591,7 +6572,7 @@
             <p:cNvPr id="79" name="TextBox 78">
               <a:extLst>
                 <a:ext uri="{FF2B5EF4-FFF2-40B4-BE49-F238E27FC236}">
-                  <a16:creationId xmlns:a16="http://schemas.microsoft.com/office/drawing/2014/main" id="{1682AFF8-4675-4FF7-A7B4-B398059651EA}"/>
+                  <a16:creationId xmlns:a16="http://schemas.microsoft.com/office/drawing/2014/main" xmlns="" id="{1682AFF8-4675-4FF7-A7B4-B398059651EA}"/>
                 </a:ext>
               </a:extLst>
             </p:cNvPr>
@@ -6631,7 +6612,7 @@
             <p:cNvPr id="87" name="TextBox 86">
               <a:extLst>
                 <a:ext uri="{FF2B5EF4-FFF2-40B4-BE49-F238E27FC236}">
-                  <a16:creationId xmlns:a16="http://schemas.microsoft.com/office/drawing/2014/main" id="{C988F726-1687-4372-BBAB-9B1733A5A8BD}"/>
+                  <a16:creationId xmlns:a16="http://schemas.microsoft.com/office/drawing/2014/main" xmlns="" id="{C988F726-1687-4372-BBAB-9B1733A5A8BD}"/>
                 </a:ext>
               </a:extLst>
             </p:cNvPr>
@@ -6671,7 +6652,7 @@
             <p:cNvPr id="90" name="TextBox 89">
               <a:extLst>
                 <a:ext uri="{FF2B5EF4-FFF2-40B4-BE49-F238E27FC236}">
-                  <a16:creationId xmlns:a16="http://schemas.microsoft.com/office/drawing/2014/main" id="{7403A129-AAA6-490F-826C-F7F3939E0417}"/>
+                  <a16:creationId xmlns:a16="http://schemas.microsoft.com/office/drawing/2014/main" xmlns="" id="{7403A129-AAA6-490F-826C-F7F3939E0417}"/>
                 </a:ext>
               </a:extLst>
             </p:cNvPr>
@@ -6712,7 +6693,7 @@
           <p:cNvPr id="91" name="Rectangle 90">
             <a:extLst>
               <a:ext uri="{FF2B5EF4-FFF2-40B4-BE49-F238E27FC236}">
-                <a16:creationId xmlns:a16="http://schemas.microsoft.com/office/drawing/2014/main" id="{4EDBC0E4-C894-48EE-BB53-759D7DE96D76}"/>
+                <a16:creationId xmlns:a16="http://schemas.microsoft.com/office/drawing/2014/main" xmlns="" id="{4EDBC0E4-C894-48EE-BB53-759D7DE96D76}"/>
               </a:ext>
             </a:extLst>
           </p:cNvPr>
@@ -6766,7 +6747,7 @@
           <p:cNvPr id="92" name="Rectangle 91">
             <a:extLst>
               <a:ext uri="{FF2B5EF4-FFF2-40B4-BE49-F238E27FC236}">
-                <a16:creationId xmlns:a16="http://schemas.microsoft.com/office/drawing/2014/main" id="{A4AC62F0-7E33-475D-B3AA-C2B728749BFF}"/>
+                <a16:creationId xmlns:a16="http://schemas.microsoft.com/office/drawing/2014/main" xmlns="" id="{A4AC62F0-7E33-475D-B3AA-C2B728749BFF}"/>
               </a:ext>
             </a:extLst>
           </p:cNvPr>
@@ -6820,7 +6801,7 @@
           <p:cNvPr id="102" name="Rectangle 101">
             <a:extLst>
               <a:ext uri="{FF2B5EF4-FFF2-40B4-BE49-F238E27FC236}">
-                <a16:creationId xmlns:a16="http://schemas.microsoft.com/office/drawing/2014/main" id="{6B8BA022-2B61-4B03-AEDA-89DC5C0F235A}"/>
+                <a16:creationId xmlns:a16="http://schemas.microsoft.com/office/drawing/2014/main" xmlns="" id="{6B8BA022-2B61-4B03-AEDA-89DC5C0F235A}"/>
               </a:ext>
             </a:extLst>
           </p:cNvPr>
@@ -6874,7 +6855,7 @@
           <p:cNvPr id="103" name="Rectangle 102">
             <a:extLst>
               <a:ext uri="{FF2B5EF4-FFF2-40B4-BE49-F238E27FC236}">
-                <a16:creationId xmlns:a16="http://schemas.microsoft.com/office/drawing/2014/main" id="{6C305374-A81B-4BA1-82BA-9B0E860699F7}"/>
+                <a16:creationId xmlns:a16="http://schemas.microsoft.com/office/drawing/2014/main" xmlns="" id="{6C305374-A81B-4BA1-82BA-9B0E860699F7}"/>
               </a:ext>
             </a:extLst>
           </p:cNvPr>
@@ -6928,7 +6909,7 @@
           <p:cNvPr id="39" name="TextBox 38">
             <a:extLst>
               <a:ext uri="{FF2B5EF4-FFF2-40B4-BE49-F238E27FC236}">
-                <a16:creationId xmlns:a16="http://schemas.microsoft.com/office/drawing/2014/main" id="{B13C3ADE-FFD2-481C-9E07-1E8A3498A0DE}"/>
+                <a16:creationId xmlns:a16="http://schemas.microsoft.com/office/drawing/2014/main" xmlns="" id="{B13C3ADE-FFD2-481C-9E07-1E8A3498A0DE}"/>
               </a:ext>
             </a:extLst>
           </p:cNvPr>
@@ -6965,7 +6946,7 @@
           <p:cNvPr id="45" name="TextBox 44">
             <a:extLst>
               <a:ext uri="{FF2B5EF4-FFF2-40B4-BE49-F238E27FC236}">
-                <a16:creationId xmlns:a16="http://schemas.microsoft.com/office/drawing/2014/main" id="{BCE8F9D6-9DBF-40CF-940E-C08D6B6535B5}"/>
+                <a16:creationId xmlns:a16="http://schemas.microsoft.com/office/drawing/2014/main" xmlns="" id="{BCE8F9D6-9DBF-40CF-940E-C08D6B6535B5}"/>
               </a:ext>
             </a:extLst>
           </p:cNvPr>
@@ -7063,7 +7044,7 @@
           <p:cNvPr id="11" name="Group 10">
             <a:extLst>
               <a:ext uri="{FF2B5EF4-FFF2-40B4-BE49-F238E27FC236}">
-                <a16:creationId xmlns:a16="http://schemas.microsoft.com/office/drawing/2014/main" id="{8159CBC3-8908-47F4-942F-A1E17B227CEB}"/>
+                <a16:creationId xmlns:a16="http://schemas.microsoft.com/office/drawing/2014/main" xmlns="" id="{8159CBC3-8908-47F4-942F-A1E17B227CEB}"/>
               </a:ext>
             </a:extLst>
           </p:cNvPr>
@@ -7083,7 +7064,7 @@
             <p:cNvPr id="44" name="Picture 43">
               <a:extLst>
                 <a:ext uri="{FF2B5EF4-FFF2-40B4-BE49-F238E27FC236}">
-                  <a16:creationId xmlns:a16="http://schemas.microsoft.com/office/drawing/2014/main" id="{7AB3D377-34C5-4C7C-9FA3-07B1FCCA1DCC}"/>
+                  <a16:creationId xmlns:a16="http://schemas.microsoft.com/office/drawing/2014/main" xmlns="" id="{7AB3D377-34C5-4C7C-9FA3-07B1FCCA1DCC}"/>
                 </a:ext>
               </a:extLst>
             </p:cNvPr>
@@ -7119,7 +7100,7 @@
             <p:cNvPr id="46" name="TextBox 45">
               <a:extLst>
                 <a:ext uri="{FF2B5EF4-FFF2-40B4-BE49-F238E27FC236}">
-                  <a16:creationId xmlns:a16="http://schemas.microsoft.com/office/drawing/2014/main" id="{905F1E5B-7DFB-497B-B322-B7565590ABB9}"/>
+                  <a16:creationId xmlns:a16="http://schemas.microsoft.com/office/drawing/2014/main" xmlns="" id="{905F1E5B-7DFB-497B-B322-B7565590ABB9}"/>
                 </a:ext>
               </a:extLst>
             </p:cNvPr>
@@ -7160,7 +7141,7 @@
             <p:cNvPr id="110" name="TextBox 109">
               <a:extLst>
                 <a:ext uri="{FF2B5EF4-FFF2-40B4-BE49-F238E27FC236}">
-                  <a16:creationId xmlns:a16="http://schemas.microsoft.com/office/drawing/2014/main" id="{E808DBBE-10AC-4D6F-AE17-5325C702CEC6}"/>
+                  <a16:creationId xmlns:a16="http://schemas.microsoft.com/office/drawing/2014/main" xmlns="" id="{E808DBBE-10AC-4D6F-AE17-5325C702CEC6}"/>
                 </a:ext>
               </a:extLst>
             </p:cNvPr>
@@ -7201,7 +7182,7 @@
             <p:cNvPr id="111" name="TextBox 110">
               <a:extLst>
                 <a:ext uri="{FF2B5EF4-FFF2-40B4-BE49-F238E27FC236}">
-                  <a16:creationId xmlns:a16="http://schemas.microsoft.com/office/drawing/2014/main" id="{C616E66E-27D7-45F7-8287-395CBDFBFDE9}"/>
+                  <a16:creationId xmlns:a16="http://schemas.microsoft.com/office/drawing/2014/main" xmlns="" id="{C616E66E-27D7-45F7-8287-395CBDFBFDE9}"/>
                 </a:ext>
               </a:extLst>
             </p:cNvPr>
@@ -7251,7 +7232,7 @@
             <p:cNvPr id="112" name="TextBox 111">
               <a:extLst>
                 <a:ext uri="{FF2B5EF4-FFF2-40B4-BE49-F238E27FC236}">
-                  <a16:creationId xmlns:a16="http://schemas.microsoft.com/office/drawing/2014/main" id="{AE571E21-55D1-4FBA-8984-075DBFF48AF5}"/>
+                  <a16:creationId xmlns:a16="http://schemas.microsoft.com/office/drawing/2014/main" xmlns="" id="{AE571E21-55D1-4FBA-8984-075DBFF48AF5}"/>
                 </a:ext>
               </a:extLst>
             </p:cNvPr>
@@ -7301,7 +7282,7 @@
             <p:cNvPr id="113" name="TextBox 112">
               <a:extLst>
                 <a:ext uri="{FF2B5EF4-FFF2-40B4-BE49-F238E27FC236}">
-                  <a16:creationId xmlns:a16="http://schemas.microsoft.com/office/drawing/2014/main" id="{A6C43F66-9731-4BDD-A860-F7C4F8927B4E}"/>
+                  <a16:creationId xmlns:a16="http://schemas.microsoft.com/office/drawing/2014/main" xmlns="" id="{A6C43F66-9731-4BDD-A860-F7C4F8927B4E}"/>
                 </a:ext>
               </a:extLst>
             </p:cNvPr>
@@ -7342,7 +7323,7 @@
             <p:cNvPr id="114" name="TextBox 113">
               <a:extLst>
                 <a:ext uri="{FF2B5EF4-FFF2-40B4-BE49-F238E27FC236}">
-                  <a16:creationId xmlns:a16="http://schemas.microsoft.com/office/drawing/2014/main" id="{03D1A768-5B11-4F10-A6DD-9129B88014D5}"/>
+                  <a16:creationId xmlns:a16="http://schemas.microsoft.com/office/drawing/2014/main" xmlns="" id="{03D1A768-5B11-4F10-A6DD-9129B88014D5}"/>
                 </a:ext>
               </a:extLst>
             </p:cNvPr>
@@ -7383,7 +7364,7 @@
             <p:cNvPr id="115" name="TextBox 114">
               <a:extLst>
                 <a:ext uri="{FF2B5EF4-FFF2-40B4-BE49-F238E27FC236}">
-                  <a16:creationId xmlns:a16="http://schemas.microsoft.com/office/drawing/2014/main" id="{B25D524C-2CC1-40F3-BF8B-9F43916B1A3D}"/>
+                  <a16:creationId xmlns:a16="http://schemas.microsoft.com/office/drawing/2014/main" xmlns="" id="{B25D524C-2CC1-40F3-BF8B-9F43916B1A3D}"/>
                 </a:ext>
               </a:extLst>
             </p:cNvPr>
@@ -7425,7 +7406,7 @@
           <p:cNvPr id="47" name="TextBox 46">
             <a:extLst>
               <a:ext uri="{FF2B5EF4-FFF2-40B4-BE49-F238E27FC236}">
-                <a16:creationId xmlns:a16="http://schemas.microsoft.com/office/drawing/2014/main" id="{1FB7A52C-0310-4F3E-BE75-8AFDE0B5E88B}"/>
+                <a16:creationId xmlns:a16="http://schemas.microsoft.com/office/drawing/2014/main" xmlns="" id="{1FB7A52C-0310-4F3E-BE75-8AFDE0B5E88B}"/>
               </a:ext>
             </a:extLst>
           </p:cNvPr>
@@ -7487,7 +7468,7 @@
           <p:cNvPr id="57" name="Picture 56">
             <a:extLst>
               <a:ext uri="{FF2B5EF4-FFF2-40B4-BE49-F238E27FC236}">
-                <a16:creationId xmlns:a16="http://schemas.microsoft.com/office/drawing/2014/main" id="{2512834A-83CB-4DF6-B954-1C9B332E49E0}"/>
+                <a16:creationId xmlns:a16="http://schemas.microsoft.com/office/drawing/2014/main" xmlns="" id="{2512834A-83CB-4DF6-B954-1C9B332E49E0}"/>
               </a:ext>
             </a:extLst>
           </p:cNvPr>
@@ -7523,7 +7504,7 @@
           <p:cNvPr id="60" name="TextBox 59">
             <a:extLst>
               <a:ext uri="{FF2B5EF4-FFF2-40B4-BE49-F238E27FC236}">
-                <a16:creationId xmlns:a16="http://schemas.microsoft.com/office/drawing/2014/main" id="{5D5639DB-8686-4E13-B9F9-868CC01A85AB}"/>
+                <a16:creationId xmlns:a16="http://schemas.microsoft.com/office/drawing/2014/main" xmlns="" id="{5D5639DB-8686-4E13-B9F9-868CC01A85AB}"/>
               </a:ext>
             </a:extLst>
           </p:cNvPr>
@@ -7563,7 +7544,7 @@
           <p:cNvPr id="116" name="TextBox 115">
             <a:extLst>
               <a:ext uri="{FF2B5EF4-FFF2-40B4-BE49-F238E27FC236}">
-                <a16:creationId xmlns:a16="http://schemas.microsoft.com/office/drawing/2014/main" id="{39FB294D-5315-41B8-BC13-1A0829373350}"/>
+                <a16:creationId xmlns:a16="http://schemas.microsoft.com/office/drawing/2014/main" xmlns="" id="{39FB294D-5315-41B8-BC13-1A0829373350}"/>
               </a:ext>
             </a:extLst>
           </p:cNvPr>
@@ -7603,7 +7584,7 @@
           <p:cNvPr id="67" name="TextBox 66">
             <a:extLst>
               <a:ext uri="{FF2B5EF4-FFF2-40B4-BE49-F238E27FC236}">
-                <a16:creationId xmlns:a16="http://schemas.microsoft.com/office/drawing/2014/main" id="{A5676A54-5D30-4372-B68B-71D49226C7B6}"/>
+                <a16:creationId xmlns:a16="http://schemas.microsoft.com/office/drawing/2014/main" xmlns="" id="{A5676A54-5D30-4372-B68B-71D49226C7B6}"/>
               </a:ext>
             </a:extLst>
           </p:cNvPr>
@@ -7653,7 +7634,7 @@
           <p:cNvPr id="117" name="TextBox 116">
             <a:extLst>
               <a:ext uri="{FF2B5EF4-FFF2-40B4-BE49-F238E27FC236}">
-                <a16:creationId xmlns:a16="http://schemas.microsoft.com/office/drawing/2014/main" id="{069462F7-5C99-4CE5-81BF-0E0516883497}"/>
+                <a16:creationId xmlns:a16="http://schemas.microsoft.com/office/drawing/2014/main" xmlns="" id="{069462F7-5C99-4CE5-81BF-0E0516883497}"/>
               </a:ext>
             </a:extLst>
           </p:cNvPr>
@@ -7703,7 +7684,7 @@
           <p:cNvPr id="118" name="TextBox 117">
             <a:extLst>
               <a:ext uri="{FF2B5EF4-FFF2-40B4-BE49-F238E27FC236}">
-                <a16:creationId xmlns:a16="http://schemas.microsoft.com/office/drawing/2014/main" id="{FBA3E143-5C2C-45EE-92A0-7CD88737A3F7}"/>
+                <a16:creationId xmlns:a16="http://schemas.microsoft.com/office/drawing/2014/main" xmlns="" id="{FBA3E143-5C2C-45EE-92A0-7CD88737A3F7}"/>
               </a:ext>
             </a:extLst>
           </p:cNvPr>
@@ -7753,7 +7734,7 @@
           <p:cNvPr id="122" name="TextBox 121">
             <a:extLst>
               <a:ext uri="{FF2B5EF4-FFF2-40B4-BE49-F238E27FC236}">
-                <a16:creationId xmlns:a16="http://schemas.microsoft.com/office/drawing/2014/main" id="{CC339F5D-903F-4F86-8BCB-43A5C2E69DF9}"/>
+                <a16:creationId xmlns:a16="http://schemas.microsoft.com/office/drawing/2014/main" xmlns="" id="{CC339F5D-903F-4F86-8BCB-43A5C2E69DF9}"/>
               </a:ext>
             </a:extLst>
           </p:cNvPr>
@@ -7863,7 +7844,7 @@
           <p:cNvPr id="148" name="Group 147">
             <a:extLst>
               <a:ext uri="{FF2B5EF4-FFF2-40B4-BE49-F238E27FC236}">
-                <a16:creationId xmlns:a16="http://schemas.microsoft.com/office/drawing/2014/main" id="{01BE7348-1460-42B5-83A0-40EC5EBD195A}"/>
+                <a16:creationId xmlns:a16="http://schemas.microsoft.com/office/drawing/2014/main" xmlns="" id="{01BE7348-1460-42B5-83A0-40EC5EBD195A}"/>
               </a:ext>
             </a:extLst>
           </p:cNvPr>
@@ -7883,7 +7864,7 @@
             <p:cNvPr id="121" name="Picture 120">
               <a:extLst>
                 <a:ext uri="{FF2B5EF4-FFF2-40B4-BE49-F238E27FC236}">
-                  <a16:creationId xmlns:a16="http://schemas.microsoft.com/office/drawing/2014/main" id="{7128334C-4618-4548-915B-8804E96FFBB0}"/>
+                  <a16:creationId xmlns:a16="http://schemas.microsoft.com/office/drawing/2014/main" xmlns="" id="{7128334C-4618-4548-915B-8804E96FFBB0}"/>
                 </a:ext>
               </a:extLst>
             </p:cNvPr>
@@ -7919,7 +7900,7 @@
             <p:cNvPr id="123" name="TextBox 122">
               <a:extLst>
                 <a:ext uri="{FF2B5EF4-FFF2-40B4-BE49-F238E27FC236}">
-                  <a16:creationId xmlns:a16="http://schemas.microsoft.com/office/drawing/2014/main" id="{14CDE799-244C-4388-92E8-FBDCDEF6CCD0}"/>
+                  <a16:creationId xmlns:a16="http://schemas.microsoft.com/office/drawing/2014/main" xmlns="" id="{14CDE799-244C-4388-92E8-FBDCDEF6CCD0}"/>
                 </a:ext>
               </a:extLst>
             </p:cNvPr>
@@ -7960,7 +7941,7 @@
             <p:cNvPr id="124" name="TextBox 123">
               <a:extLst>
                 <a:ext uri="{FF2B5EF4-FFF2-40B4-BE49-F238E27FC236}">
-                  <a16:creationId xmlns:a16="http://schemas.microsoft.com/office/drawing/2014/main" id="{E4F8083F-6E37-4DFF-A05B-AEB19D0F0C28}"/>
+                  <a16:creationId xmlns:a16="http://schemas.microsoft.com/office/drawing/2014/main" xmlns="" id="{E4F8083F-6E37-4DFF-A05B-AEB19D0F0C28}"/>
                 </a:ext>
               </a:extLst>
             </p:cNvPr>
@@ -8001,7 +7982,7 @@
             <p:cNvPr id="126" name="TextBox 125">
               <a:extLst>
                 <a:ext uri="{FF2B5EF4-FFF2-40B4-BE49-F238E27FC236}">
-                  <a16:creationId xmlns:a16="http://schemas.microsoft.com/office/drawing/2014/main" id="{60366AD2-527A-4AAB-BFF2-A1C8EF0A4A8B}"/>
+                  <a16:creationId xmlns:a16="http://schemas.microsoft.com/office/drawing/2014/main" xmlns="" id="{60366AD2-527A-4AAB-BFF2-A1C8EF0A4A8B}"/>
                 </a:ext>
               </a:extLst>
             </p:cNvPr>
@@ -8041,7 +8022,7 @@
             <p:cNvPr id="129" name="Group 128">
               <a:extLst>
                 <a:ext uri="{FF2B5EF4-FFF2-40B4-BE49-F238E27FC236}">
-                  <a16:creationId xmlns:a16="http://schemas.microsoft.com/office/drawing/2014/main" id="{4809A327-C569-48D0-AEB5-4C67B1994645}"/>
+                  <a16:creationId xmlns:a16="http://schemas.microsoft.com/office/drawing/2014/main" xmlns="" id="{4809A327-C569-48D0-AEB5-4C67B1994645}"/>
                 </a:ext>
               </a:extLst>
             </p:cNvPr>
@@ -8061,7 +8042,7 @@
               <p:cNvPr id="125" name="TextBox 124">
                 <a:extLst>
                   <a:ext uri="{FF2B5EF4-FFF2-40B4-BE49-F238E27FC236}">
-                    <a16:creationId xmlns:a16="http://schemas.microsoft.com/office/drawing/2014/main" id="{4B1165C5-9D3B-48E1-96BF-30DEF3936B69}"/>
+                    <a16:creationId xmlns:a16="http://schemas.microsoft.com/office/drawing/2014/main" xmlns="" id="{4B1165C5-9D3B-48E1-96BF-30DEF3936B69}"/>
                   </a:ext>
                 </a:extLst>
               </p:cNvPr>
@@ -8101,7 +8082,7 @@
               <p:cNvPr id="127" name="TextBox 126">
                 <a:extLst>
                   <a:ext uri="{FF2B5EF4-FFF2-40B4-BE49-F238E27FC236}">
-                    <a16:creationId xmlns:a16="http://schemas.microsoft.com/office/drawing/2014/main" id="{78DD9240-42BA-4DA1-876C-1D3ABB186119}"/>
+                    <a16:creationId xmlns:a16="http://schemas.microsoft.com/office/drawing/2014/main" xmlns="" id="{78DD9240-42BA-4DA1-876C-1D3ABB186119}"/>
                   </a:ext>
                 </a:extLst>
               </p:cNvPr>
@@ -8141,7 +8122,7 @@
               <p:cNvPr id="128" name="TextBox 127">
                 <a:extLst>
                   <a:ext uri="{FF2B5EF4-FFF2-40B4-BE49-F238E27FC236}">
-                    <a16:creationId xmlns:a16="http://schemas.microsoft.com/office/drawing/2014/main" id="{B03B8CA2-9D4E-4911-A456-4D175AE11CC0}"/>
+                    <a16:creationId xmlns:a16="http://schemas.microsoft.com/office/drawing/2014/main" xmlns="" id="{B03B8CA2-9D4E-4911-A456-4D175AE11CC0}"/>
                   </a:ext>
                 </a:extLst>
               </p:cNvPr>
@@ -8182,7 +8163,7 @@
             <p:cNvPr id="130" name="Group 129">
               <a:extLst>
                 <a:ext uri="{FF2B5EF4-FFF2-40B4-BE49-F238E27FC236}">
-                  <a16:creationId xmlns:a16="http://schemas.microsoft.com/office/drawing/2014/main" id="{C893DAE4-65E1-4810-8873-25C17B55A1A0}"/>
+                  <a16:creationId xmlns:a16="http://schemas.microsoft.com/office/drawing/2014/main" xmlns="" id="{C893DAE4-65E1-4810-8873-25C17B55A1A0}"/>
                 </a:ext>
               </a:extLst>
             </p:cNvPr>
@@ -8202,7 +8183,7 @@
               <p:cNvPr id="131" name="TextBox 130">
                 <a:extLst>
                   <a:ext uri="{FF2B5EF4-FFF2-40B4-BE49-F238E27FC236}">
-                    <a16:creationId xmlns:a16="http://schemas.microsoft.com/office/drawing/2014/main" id="{6053B172-746D-4E56-8B07-22CB88A4B2DC}"/>
+                    <a16:creationId xmlns:a16="http://schemas.microsoft.com/office/drawing/2014/main" xmlns="" id="{6053B172-746D-4E56-8B07-22CB88A4B2DC}"/>
                   </a:ext>
                 </a:extLst>
               </p:cNvPr>
@@ -8242,7 +8223,7 @@
               <p:cNvPr id="132" name="TextBox 131">
                 <a:extLst>
                   <a:ext uri="{FF2B5EF4-FFF2-40B4-BE49-F238E27FC236}">
-                    <a16:creationId xmlns:a16="http://schemas.microsoft.com/office/drawing/2014/main" id="{7C3E771B-17AE-40E0-BEE4-97B86D221495}"/>
+                    <a16:creationId xmlns:a16="http://schemas.microsoft.com/office/drawing/2014/main" xmlns="" id="{7C3E771B-17AE-40E0-BEE4-97B86D221495}"/>
                   </a:ext>
                 </a:extLst>
               </p:cNvPr>
@@ -8282,7 +8263,7 @@
               <p:cNvPr id="133" name="TextBox 132">
                 <a:extLst>
                   <a:ext uri="{FF2B5EF4-FFF2-40B4-BE49-F238E27FC236}">
-                    <a16:creationId xmlns:a16="http://schemas.microsoft.com/office/drawing/2014/main" id="{E1EF9FD1-D20B-4487-BE3B-35AA064FE6B3}"/>
+                    <a16:creationId xmlns:a16="http://schemas.microsoft.com/office/drawing/2014/main" xmlns="" id="{E1EF9FD1-D20B-4487-BE3B-35AA064FE6B3}"/>
                   </a:ext>
                 </a:extLst>
               </p:cNvPr>
@@ -8323,7 +8304,7 @@
             <p:cNvPr id="134" name="TextBox 133">
               <a:extLst>
                 <a:ext uri="{FF2B5EF4-FFF2-40B4-BE49-F238E27FC236}">
-                  <a16:creationId xmlns:a16="http://schemas.microsoft.com/office/drawing/2014/main" id="{348F05E5-B995-47C2-A24F-E8E3EA83BC74}"/>
+                  <a16:creationId xmlns:a16="http://schemas.microsoft.com/office/drawing/2014/main" xmlns="" id="{348F05E5-B995-47C2-A24F-E8E3EA83BC74}"/>
                 </a:ext>
               </a:extLst>
             </p:cNvPr>
@@ -8363,7 +8344,7 @@
             <p:cNvPr id="139" name="TextBox 138">
               <a:extLst>
                 <a:ext uri="{FF2B5EF4-FFF2-40B4-BE49-F238E27FC236}">
-                  <a16:creationId xmlns:a16="http://schemas.microsoft.com/office/drawing/2014/main" id="{055526AD-8F37-4551-AA05-C3F47D23680A}"/>
+                  <a16:creationId xmlns:a16="http://schemas.microsoft.com/office/drawing/2014/main" xmlns="" id="{055526AD-8F37-4551-AA05-C3F47D23680A}"/>
                 </a:ext>
               </a:extLst>
             </p:cNvPr>
@@ -8403,7 +8384,7 @@
             <p:cNvPr id="140" name="TextBox 139">
               <a:extLst>
                 <a:ext uri="{FF2B5EF4-FFF2-40B4-BE49-F238E27FC236}">
-                  <a16:creationId xmlns:a16="http://schemas.microsoft.com/office/drawing/2014/main" id="{BC37198D-B3EE-41D7-BB95-952E53E8DA5A}"/>
+                  <a16:creationId xmlns:a16="http://schemas.microsoft.com/office/drawing/2014/main" xmlns="" id="{BC37198D-B3EE-41D7-BB95-952E53E8DA5A}"/>
                 </a:ext>
               </a:extLst>
             </p:cNvPr>
@@ -8443,7 +8424,7 @@
             <p:cNvPr id="141" name="TextBox 140">
               <a:extLst>
                 <a:ext uri="{FF2B5EF4-FFF2-40B4-BE49-F238E27FC236}">
-                  <a16:creationId xmlns:a16="http://schemas.microsoft.com/office/drawing/2014/main" id="{FE839F0D-7F20-422E-ACAB-0A8EFBAD4225}"/>
+                  <a16:creationId xmlns:a16="http://schemas.microsoft.com/office/drawing/2014/main" xmlns="" id="{FE839F0D-7F20-422E-ACAB-0A8EFBAD4225}"/>
                 </a:ext>
               </a:extLst>
             </p:cNvPr>
@@ -8483,7 +8464,7 @@
             <p:cNvPr id="142" name="TextBox 141">
               <a:extLst>
                 <a:ext uri="{FF2B5EF4-FFF2-40B4-BE49-F238E27FC236}">
-                  <a16:creationId xmlns:a16="http://schemas.microsoft.com/office/drawing/2014/main" id="{3EB2F020-BAD5-4416-A094-63A503D17AFF}"/>
+                  <a16:creationId xmlns:a16="http://schemas.microsoft.com/office/drawing/2014/main" xmlns="" id="{3EB2F020-BAD5-4416-A094-63A503D17AFF}"/>
                 </a:ext>
               </a:extLst>
             </p:cNvPr>
@@ -8523,7 +8504,7 @@
             <p:cNvPr id="143" name="TextBox 142">
               <a:extLst>
                 <a:ext uri="{FF2B5EF4-FFF2-40B4-BE49-F238E27FC236}">
-                  <a16:creationId xmlns:a16="http://schemas.microsoft.com/office/drawing/2014/main" id="{A78698C3-8B25-4B81-9B31-DF67353CFFF0}"/>
+                  <a16:creationId xmlns:a16="http://schemas.microsoft.com/office/drawing/2014/main" xmlns="" id="{A78698C3-8B25-4B81-9B31-DF67353CFFF0}"/>
                 </a:ext>
               </a:extLst>
             </p:cNvPr>
@@ -8563,7 +8544,7 @@
             <p:cNvPr id="144" name="TextBox 143">
               <a:extLst>
                 <a:ext uri="{FF2B5EF4-FFF2-40B4-BE49-F238E27FC236}">
-                  <a16:creationId xmlns:a16="http://schemas.microsoft.com/office/drawing/2014/main" id="{F7B0F630-2F26-43B2-8196-DF3EF14A0D21}"/>
+                  <a16:creationId xmlns:a16="http://schemas.microsoft.com/office/drawing/2014/main" xmlns="" id="{F7B0F630-2F26-43B2-8196-DF3EF14A0D21}"/>
                 </a:ext>
               </a:extLst>
             </p:cNvPr>
@@ -8603,7 +8584,7 @@
             <p:cNvPr id="145" name="TextBox 144">
               <a:extLst>
                 <a:ext uri="{FF2B5EF4-FFF2-40B4-BE49-F238E27FC236}">
-                  <a16:creationId xmlns:a16="http://schemas.microsoft.com/office/drawing/2014/main" id="{DBD0509B-2A10-4806-97F8-4EB1B2B8B956}"/>
+                  <a16:creationId xmlns:a16="http://schemas.microsoft.com/office/drawing/2014/main" xmlns="" id="{DBD0509B-2A10-4806-97F8-4EB1B2B8B956}"/>
                 </a:ext>
               </a:extLst>
             </p:cNvPr>
@@ -8643,7 +8624,7 @@
             <p:cNvPr id="146" name="TextBox 145">
               <a:extLst>
                 <a:ext uri="{FF2B5EF4-FFF2-40B4-BE49-F238E27FC236}">
-                  <a16:creationId xmlns:a16="http://schemas.microsoft.com/office/drawing/2014/main" id="{D094676F-8B72-4D45-9B36-0C770AC324D6}"/>
+                  <a16:creationId xmlns:a16="http://schemas.microsoft.com/office/drawing/2014/main" xmlns="" id="{D094676F-8B72-4D45-9B36-0C770AC324D6}"/>
                 </a:ext>
               </a:extLst>
             </p:cNvPr>
@@ -8683,7 +8664,7 @@
             <p:cNvPr id="147" name="TextBox 146">
               <a:extLst>
                 <a:ext uri="{FF2B5EF4-FFF2-40B4-BE49-F238E27FC236}">
-                  <a16:creationId xmlns:a16="http://schemas.microsoft.com/office/drawing/2014/main" id="{AD52C42C-4FB8-4AB5-A669-7C9600F88061}"/>
+                  <a16:creationId xmlns:a16="http://schemas.microsoft.com/office/drawing/2014/main" xmlns="" id="{AD52C42C-4FB8-4AB5-A669-7C9600F88061}"/>
                 </a:ext>
               </a:extLst>
             </p:cNvPr>
@@ -8727,7 +8708,7 @@
               <p:cNvPr id="150" name="TextBox 149">
                 <a:extLst>
                   <a:ext uri="{FF2B5EF4-FFF2-40B4-BE49-F238E27FC236}">
-                    <a16:creationId xmlns:a16="http://schemas.microsoft.com/office/drawing/2014/main" id="{CB1D601C-6A7D-4DDB-8233-2D1EAEAB98A9}"/>
+                    <a16:creationId xmlns:a16="http://schemas.microsoft.com/office/drawing/2014/main" xmlns="" id="{CB1D601C-6A7D-4DDB-8233-2D1EAEAB98A9}"/>
                   </a:ext>
                 </a:extLst>
               </p:cNvPr>
@@ -8763,9 +8744,8 @@
                 </a:r>
               </a:p>
               <a:p>
-                <a:pPr/>
                 <a14:m>
-                  <m:oMathPara xmlns:m="http://schemas.openxmlformats.org/officeDocument/2006/math">
+                  <m:oMathPara xmlns:m="http://schemas.openxmlformats.org/officeDocument/2006/math" xmlns="">
                     <m:oMathParaPr>
                       <m:jc m:val="centerGroup"/>
                     </m:oMathParaPr>
@@ -9016,7 +8996,7 @@
           <p:cNvPr id="151" name="TextBox 150">
             <a:extLst>
               <a:ext uri="{FF2B5EF4-FFF2-40B4-BE49-F238E27FC236}">
-                <a16:creationId xmlns:a16="http://schemas.microsoft.com/office/drawing/2014/main" id="{A2281F53-925E-4AAD-91B9-0E5A3202BD85}"/>
+                <a16:creationId xmlns:a16="http://schemas.microsoft.com/office/drawing/2014/main" xmlns="" id="{A2281F53-925E-4AAD-91B9-0E5A3202BD85}"/>
               </a:ext>
             </a:extLst>
           </p:cNvPr>
@@ -9130,7 +9110,7 @@
           <p:cNvPr id="152" name="TextBox 151">
             <a:extLst>
               <a:ext uri="{FF2B5EF4-FFF2-40B4-BE49-F238E27FC236}">
-                <a16:creationId xmlns:a16="http://schemas.microsoft.com/office/drawing/2014/main" id="{2472BB9D-05A0-4DE4-84F7-7C8ADADBFABF}"/>
+                <a16:creationId xmlns:a16="http://schemas.microsoft.com/office/drawing/2014/main" xmlns="" id="{2472BB9D-05A0-4DE4-84F7-7C8ADADBFABF}"/>
               </a:ext>
             </a:extLst>
           </p:cNvPr>
@@ -9242,7 +9222,7 @@
           <p:cNvPr id="153" name="TextBox 152">
             <a:extLst>
               <a:ext uri="{FF2B5EF4-FFF2-40B4-BE49-F238E27FC236}">
-                <a16:creationId xmlns:a16="http://schemas.microsoft.com/office/drawing/2014/main" id="{225656A5-6FE6-4F1D-8BD4-AAEE2D107914}"/>
+                <a16:creationId xmlns:a16="http://schemas.microsoft.com/office/drawing/2014/main" xmlns="" id="{225656A5-6FE6-4F1D-8BD4-AAEE2D107914}"/>
               </a:ext>
             </a:extLst>
           </p:cNvPr>
@@ -9310,7 +9290,7 @@
           <p:cNvPr id="12" name="Picture 11">
             <a:extLst>
               <a:ext uri="{FF2B5EF4-FFF2-40B4-BE49-F238E27FC236}">
-                <a16:creationId xmlns:a16="http://schemas.microsoft.com/office/drawing/2014/main" id="{AE1981BF-720B-43A5-95FB-B86E46EB6FE7}"/>
+                <a16:creationId xmlns:a16="http://schemas.microsoft.com/office/drawing/2014/main" xmlns="" id="{AE1981BF-720B-43A5-95FB-B86E46EB6FE7}"/>
               </a:ext>
             </a:extLst>
           </p:cNvPr>
@@ -9346,7 +9326,7 @@
           <p:cNvPr id="17" name="TextBox 16">
             <a:extLst>
               <a:ext uri="{FF2B5EF4-FFF2-40B4-BE49-F238E27FC236}">
-                <a16:creationId xmlns:a16="http://schemas.microsoft.com/office/drawing/2014/main" id="{F225BCD7-F608-499B-9429-80240FC62DB0}"/>
+                <a16:creationId xmlns:a16="http://schemas.microsoft.com/office/drawing/2014/main" xmlns="" id="{F225BCD7-F608-499B-9429-80240FC62DB0}"/>
               </a:ext>
             </a:extLst>
           </p:cNvPr>
@@ -9478,7 +9458,7 @@
           <p:cNvPr id="19" name="Picture 18">
             <a:extLst>
               <a:ext uri="{FF2B5EF4-FFF2-40B4-BE49-F238E27FC236}">
-                <a16:creationId xmlns:a16="http://schemas.microsoft.com/office/drawing/2014/main" id="{87CDC245-AA7B-4A89-A635-4036D80AD9CA}"/>
+                <a16:creationId xmlns:a16="http://schemas.microsoft.com/office/drawing/2014/main" xmlns="" id="{87CDC245-AA7B-4A89-A635-4036D80AD9CA}"/>
               </a:ext>
             </a:extLst>
           </p:cNvPr>
@@ -9513,7 +9493,7 @@
           <p:cNvPr id="20" name="TextBox 19">
             <a:extLst>
               <a:ext uri="{FF2B5EF4-FFF2-40B4-BE49-F238E27FC236}">
-                <a16:creationId xmlns:a16="http://schemas.microsoft.com/office/drawing/2014/main" id="{E8EFC17A-9394-4FD4-923E-B96A30D37C9B}"/>
+                <a16:creationId xmlns:a16="http://schemas.microsoft.com/office/drawing/2014/main" xmlns="" id="{E8EFC17A-9394-4FD4-923E-B96A30D37C9B}"/>
               </a:ext>
             </a:extLst>
           </p:cNvPr>
@@ -9556,7 +9536,7 @@
           <p:cNvPr id="23" name="TextBox 22">
             <a:extLst>
               <a:ext uri="{FF2B5EF4-FFF2-40B4-BE49-F238E27FC236}">
-                <a16:creationId xmlns:a16="http://schemas.microsoft.com/office/drawing/2014/main" id="{5BFE957C-7C09-4AD7-8814-7FD6F7483B37}"/>
+                <a16:creationId xmlns:a16="http://schemas.microsoft.com/office/drawing/2014/main" xmlns="" id="{5BFE957C-7C09-4AD7-8814-7FD6F7483B37}"/>
               </a:ext>
             </a:extLst>
           </p:cNvPr>
@@ -9599,7 +9579,7 @@
           <p:cNvPr id="26" name="Picture 25">
             <a:extLst>
               <a:ext uri="{FF2B5EF4-FFF2-40B4-BE49-F238E27FC236}">
-                <a16:creationId xmlns:a16="http://schemas.microsoft.com/office/drawing/2014/main" id="{C5C7CF87-A08E-439E-8425-B5DF29C5A90D}"/>
+                <a16:creationId xmlns:a16="http://schemas.microsoft.com/office/drawing/2014/main" xmlns="" id="{C5C7CF87-A08E-439E-8425-B5DF29C5A90D}"/>
               </a:ext>
             </a:extLst>
           </p:cNvPr>
@@ -9635,7 +9615,7 @@
           <p:cNvPr id="28" name="Picture 27">
             <a:extLst>
               <a:ext uri="{FF2B5EF4-FFF2-40B4-BE49-F238E27FC236}">
-                <a16:creationId xmlns:a16="http://schemas.microsoft.com/office/drawing/2014/main" id="{4F115063-D51F-4148-9142-463AB5F27CC3}"/>
+                <a16:creationId xmlns:a16="http://schemas.microsoft.com/office/drawing/2014/main" xmlns="" id="{4F115063-D51F-4148-9142-463AB5F27CC3}"/>
               </a:ext>
             </a:extLst>
           </p:cNvPr>
@@ -9671,7 +9651,7 @@
           <p:cNvPr id="40" name="Picture 39">
             <a:extLst>
               <a:ext uri="{FF2B5EF4-FFF2-40B4-BE49-F238E27FC236}">
-                <a16:creationId xmlns:a16="http://schemas.microsoft.com/office/drawing/2014/main" id="{B74E3F15-7723-4A55-AD69-3EF33529F0B5}"/>
+                <a16:creationId xmlns:a16="http://schemas.microsoft.com/office/drawing/2014/main" xmlns="" id="{B74E3F15-7723-4A55-AD69-3EF33529F0B5}"/>
               </a:ext>
             </a:extLst>
           </p:cNvPr>
@@ -9707,7 +9687,7 @@
           <p:cNvPr id="41" name="TextBox 40">
             <a:extLst>
               <a:ext uri="{FF2B5EF4-FFF2-40B4-BE49-F238E27FC236}">
-                <a16:creationId xmlns:a16="http://schemas.microsoft.com/office/drawing/2014/main" id="{FEAFA2AF-4E05-4BB1-BAF3-80D330419A8A}"/>
+                <a16:creationId xmlns:a16="http://schemas.microsoft.com/office/drawing/2014/main" xmlns="" id="{FEAFA2AF-4E05-4BB1-BAF3-80D330419A8A}"/>
               </a:ext>
             </a:extLst>
           </p:cNvPr>
@@ -9804,7 +9784,7 @@
           <p:cNvPr id="119" name="Rectangle: Diagonal Corners Snipped 118">
             <a:extLst>
               <a:ext uri="{FF2B5EF4-FFF2-40B4-BE49-F238E27FC236}">
-                <a16:creationId xmlns:a16="http://schemas.microsoft.com/office/drawing/2014/main" id="{0F9699D0-31D3-40AB-95EB-5E93F5052E02}"/>
+                <a16:creationId xmlns:a16="http://schemas.microsoft.com/office/drawing/2014/main" xmlns="" id="{0F9699D0-31D3-40AB-95EB-5E93F5052E02}"/>
               </a:ext>
             </a:extLst>
           </p:cNvPr>
@@ -9879,7 +9859,7 @@
           <p:cNvPr id="120" name="Arrow: Pentagon 119">
             <a:extLst>
               <a:ext uri="{FF2B5EF4-FFF2-40B4-BE49-F238E27FC236}">
-                <a16:creationId xmlns:a16="http://schemas.microsoft.com/office/drawing/2014/main" id="{3341252E-54C6-44C7-BA31-96220FEAC672}"/>
+                <a16:creationId xmlns:a16="http://schemas.microsoft.com/office/drawing/2014/main" xmlns="" id="{3341252E-54C6-44C7-BA31-96220FEAC672}"/>
               </a:ext>
             </a:extLst>
           </p:cNvPr>
@@ -9951,7 +9931,7 @@
           <p:cNvPr id="135" name="Rectangle: Diagonal Corners Snipped 134">
             <a:extLst>
               <a:ext uri="{FF2B5EF4-FFF2-40B4-BE49-F238E27FC236}">
-                <a16:creationId xmlns:a16="http://schemas.microsoft.com/office/drawing/2014/main" id="{058BF339-FF94-43FA-B35E-EB233B487863}"/>
+                <a16:creationId xmlns:a16="http://schemas.microsoft.com/office/drawing/2014/main" xmlns="" id="{058BF339-FF94-43FA-B35E-EB233B487863}"/>
               </a:ext>
             </a:extLst>
           </p:cNvPr>
@@ -10026,7 +10006,7 @@
           <p:cNvPr id="136" name="Arrow: Pentagon 135">
             <a:extLst>
               <a:ext uri="{FF2B5EF4-FFF2-40B4-BE49-F238E27FC236}">
-                <a16:creationId xmlns:a16="http://schemas.microsoft.com/office/drawing/2014/main" id="{4C56EBD1-5E4F-4660-B80E-205852F1B770}"/>
+                <a16:creationId xmlns:a16="http://schemas.microsoft.com/office/drawing/2014/main" xmlns="" id="{4C56EBD1-5E4F-4660-B80E-205852F1B770}"/>
               </a:ext>
             </a:extLst>
           </p:cNvPr>
@@ -10098,7 +10078,7 @@
           <p:cNvPr id="149" name="Rectangle: Diagonal Corners Snipped 148">
             <a:extLst>
               <a:ext uri="{FF2B5EF4-FFF2-40B4-BE49-F238E27FC236}">
-                <a16:creationId xmlns:a16="http://schemas.microsoft.com/office/drawing/2014/main" id="{BF6D295D-08A1-45E8-BFC3-B4D1478403AF}"/>
+                <a16:creationId xmlns:a16="http://schemas.microsoft.com/office/drawing/2014/main" xmlns="" id="{BF6D295D-08A1-45E8-BFC3-B4D1478403AF}"/>
               </a:ext>
             </a:extLst>
           </p:cNvPr>
@@ -10173,7 +10153,7 @@
           <p:cNvPr id="154" name="Arrow: Pentagon 153">
             <a:extLst>
               <a:ext uri="{FF2B5EF4-FFF2-40B4-BE49-F238E27FC236}">
-                <a16:creationId xmlns:a16="http://schemas.microsoft.com/office/drawing/2014/main" id="{4F5926E4-7B8A-4464-9520-FA72319C812E}"/>
+                <a16:creationId xmlns:a16="http://schemas.microsoft.com/office/drawing/2014/main" xmlns="" id="{4F5926E4-7B8A-4464-9520-FA72319C812E}"/>
               </a:ext>
             </a:extLst>
           </p:cNvPr>
@@ -10245,7 +10225,7 @@
           <p:cNvPr id="155" name="Rectangle: Diagonal Corners Snipped 154">
             <a:extLst>
               <a:ext uri="{FF2B5EF4-FFF2-40B4-BE49-F238E27FC236}">
-                <a16:creationId xmlns:a16="http://schemas.microsoft.com/office/drawing/2014/main" id="{AD696414-F218-4468-9C4B-0D28E2552B10}"/>
+                <a16:creationId xmlns:a16="http://schemas.microsoft.com/office/drawing/2014/main" xmlns="" id="{AD696414-F218-4468-9C4B-0D28E2552B10}"/>
               </a:ext>
             </a:extLst>
           </p:cNvPr>
@@ -10317,7 +10297,7 @@
           <p:cNvPr id="156" name="Arrow: Pentagon 155">
             <a:extLst>
               <a:ext uri="{FF2B5EF4-FFF2-40B4-BE49-F238E27FC236}">
-                <a16:creationId xmlns:a16="http://schemas.microsoft.com/office/drawing/2014/main" id="{37AB0811-12B2-47F8-9857-5D88E24AFC9E}"/>
+                <a16:creationId xmlns:a16="http://schemas.microsoft.com/office/drawing/2014/main" xmlns="" id="{37AB0811-12B2-47F8-9857-5D88E24AFC9E}"/>
               </a:ext>
             </a:extLst>
           </p:cNvPr>
@@ -10386,7 +10366,7 @@
           <p:cNvPr id="157" name="Rectangle: Diagonal Corners Snipped 156">
             <a:extLst>
               <a:ext uri="{FF2B5EF4-FFF2-40B4-BE49-F238E27FC236}">
-                <a16:creationId xmlns:a16="http://schemas.microsoft.com/office/drawing/2014/main" id="{64CFA07F-CAA4-43F8-8E36-73A7FC4588DF}"/>
+                <a16:creationId xmlns:a16="http://schemas.microsoft.com/office/drawing/2014/main" xmlns="" id="{64CFA07F-CAA4-43F8-8E36-73A7FC4588DF}"/>
               </a:ext>
             </a:extLst>
           </p:cNvPr>
@@ -10458,7 +10438,7 @@
           <p:cNvPr id="158" name="Arrow: Pentagon 157">
             <a:extLst>
               <a:ext uri="{FF2B5EF4-FFF2-40B4-BE49-F238E27FC236}">
-                <a16:creationId xmlns:a16="http://schemas.microsoft.com/office/drawing/2014/main" id="{4BEF609B-ADDF-4351-B299-BF8F27A3CB68}"/>
+                <a16:creationId xmlns:a16="http://schemas.microsoft.com/office/drawing/2014/main" xmlns="" id="{4BEF609B-ADDF-4351-B299-BF8F27A3CB68}"/>
               </a:ext>
             </a:extLst>
           </p:cNvPr>
@@ -10527,7 +10507,7 @@
           <p:cNvPr id="159" name="Rectangle: Diagonal Corners Snipped 158">
             <a:extLst>
               <a:ext uri="{FF2B5EF4-FFF2-40B4-BE49-F238E27FC236}">
-                <a16:creationId xmlns:a16="http://schemas.microsoft.com/office/drawing/2014/main" id="{30998432-0F3A-494D-AB03-2AF33024F0C9}"/>
+                <a16:creationId xmlns:a16="http://schemas.microsoft.com/office/drawing/2014/main" xmlns="" id="{30998432-0F3A-494D-AB03-2AF33024F0C9}"/>
               </a:ext>
             </a:extLst>
           </p:cNvPr>
@@ -10599,7 +10579,7 @@
           <p:cNvPr id="160" name="Arrow: Pentagon 159">
             <a:extLst>
               <a:ext uri="{FF2B5EF4-FFF2-40B4-BE49-F238E27FC236}">
-                <a16:creationId xmlns:a16="http://schemas.microsoft.com/office/drawing/2014/main" id="{454355A0-356D-421E-B505-6DCF00BA1311}"/>
+                <a16:creationId xmlns:a16="http://schemas.microsoft.com/office/drawing/2014/main" xmlns="" id="{454355A0-356D-421E-B505-6DCF00BA1311}"/>
               </a:ext>
             </a:extLst>
           </p:cNvPr>
@@ -10663,6 +10643,36 @@
           </a:p>
         </p:txBody>
       </p:sp>
+      <p:pic>
+        <p:nvPicPr>
+          <p:cNvPr id="16" name="Picture 15" descr="PosterTimelineVert.png"/>
+          <p:cNvPicPr>
+            <a:picLocks noChangeAspect="1"/>
+          </p:cNvPicPr>
+          <p:nvPr/>
+        </p:nvPicPr>
+        <p:blipFill>
+          <a:blip r:embed="rId20">
+            <a:extLst>
+              <a:ext uri="{28A0092B-C50C-407E-A947-70E740481C1C}">
+                <a14:useLocalDpi xmlns:a14="http://schemas.microsoft.com/office/drawing/2010/main" val="0"/>
+              </a:ext>
+            </a:extLst>
+          </a:blip>
+          <a:stretch>
+            <a:fillRect/>
+          </a:stretch>
+        </p:blipFill>
+        <p:spPr>
+          <a:xfrm>
+            <a:off x="33425963" y="11315093"/>
+            <a:ext cx="10097852" cy="18802465"/>
+          </a:xfrm>
+          <a:prstGeom prst="rect">
+            <a:avLst/>
+          </a:prstGeom>
+        </p:spPr>
+      </p:pic>
     </p:spTree>
     <p:extLst>
       <p:ext uri="{BB962C8B-B14F-4D97-AF65-F5344CB8AC3E}">
@@ -10719,7 +10729,7 @@
     </a:clrScheme>
     <a:fontScheme name="Office Theme">
       <a:majorFont>
-        <a:latin typeface="Calibri Light" panose="020F0302020204030204"/>
+        <a:latin typeface="Calibri Light"/>
         <a:ea typeface=""/>
         <a:cs typeface=""/>
         <a:font script="Jpan" typeface="游ゴシック Light"/>
@@ -10754,7 +10764,7 @@
         <a:font script="Geor" typeface="Sylfaen"/>
       </a:majorFont>
       <a:minorFont>
-        <a:latin typeface="Calibri" panose="020F0502020204030204"/>
+        <a:latin typeface="Calibri"/>
         <a:ea typeface=""/>
         <a:cs typeface=""/>
         <a:font script="Jpan" typeface="游ゴシック"/>
@@ -10931,7 +10941,7 @@
   <a:extraClrSchemeLst/>
   <a:extLst>
     <a:ext uri="{05A4C25C-085E-4340-85A3-A5531E510DB2}">
-      <thm15:themeFamily xmlns:thm15="http://schemas.microsoft.com/office/thememl/2012/main" name="Office Theme" id="{62F939B6-93AF-4DB8-9C6B-D6C7DFDC589F}" vid="{4A3C46E8-61CC-4603-A589-7422A47A8E4A}"/>
+      <thm15:themeFamily xmlns:thm15="http://schemas.microsoft.com/office/thememl/2012/main" xmlns="" name="Office Theme" id="{62F939B6-93AF-4DB8-9C6B-D6C7DFDC589F}" vid="{4A3C46E8-61CC-4603-A589-7422A47A8E4A}"/>
     </a:ext>
   </a:extLst>
 </a:theme>
@@ -10980,7 +10990,7 @@
     </a:clrScheme>
     <a:fontScheme name="Office">
       <a:majorFont>
-        <a:latin typeface="Calibri Light" panose="020F0302020204030204"/>
+        <a:latin typeface="Calibri Light"/>
         <a:ea typeface=""/>
         <a:cs typeface=""/>
         <a:font script="Jpan" typeface="游ゴシック Light"/>
@@ -11032,7 +11042,7 @@
         <a:font script="Tfng" typeface="Ebrima"/>
       </a:majorFont>
       <a:minorFont>
-        <a:latin typeface="Calibri" panose="020F0502020204030204"/>
+        <a:latin typeface="Calibri"/>
         <a:ea typeface=""/>
         <a:cs typeface=""/>
         <a:font script="Jpan" typeface="游ゴシック"/>
@@ -11226,7 +11236,7 @@
   <a:extraClrSchemeLst/>
   <a:extLst>
     <a:ext uri="{05A4C25C-085E-4340-85A3-A5531E510DB2}">
-      <thm15:themeFamily xmlns:thm15="http://schemas.microsoft.com/office/thememl/2012/main" name="Office Theme" id="{62F939B6-93AF-4DB8-9C6B-D6C7DFDC589F}" vid="{4A3C46E8-61CC-4603-A589-7422A47A8E4A}"/>
+      <thm15:themeFamily xmlns:thm15="http://schemas.microsoft.com/office/thememl/2012/main" xmlns="" name="Office Theme" id="{62F939B6-93AF-4DB8-9C6B-D6C7DFDC589F}" vid="{4A3C46E8-61CC-4603-A589-7422A47A8E4A}"/>
     </a:ext>
   </a:extLst>
 </a:theme>

</xml_diff>